<commit_message>
Updating/working on powerpoint presentation
</commit_message>
<xml_diff>
--- a/Project_1.pptx
+++ b/Project_1.pptx
@@ -5,7 +5,7 @@
     <p:sldMasterId id="2147483733" r:id="rId4"/>
   </p:sldMasterIdLst>
   <p:notesMasterIdLst>
-    <p:notesMasterId r:id="rId24"/>
+    <p:notesMasterId r:id="rId25"/>
   </p:notesMasterIdLst>
   <p:sldIdLst>
     <p:sldId id="401" r:id="rId5"/>
@@ -15,18 +15,19 @@
     <p:sldId id="402" r:id="rId9"/>
     <p:sldId id="414" r:id="rId10"/>
     <p:sldId id="415" r:id="rId11"/>
-    <p:sldId id="418" r:id="rId12"/>
-    <p:sldId id="396" r:id="rId13"/>
-    <p:sldId id="424" r:id="rId14"/>
-    <p:sldId id="397" r:id="rId15"/>
-    <p:sldId id="419" r:id="rId16"/>
-    <p:sldId id="423" r:id="rId17"/>
-    <p:sldId id="425" r:id="rId18"/>
-    <p:sldId id="420" r:id="rId19"/>
-    <p:sldId id="422" r:id="rId20"/>
-    <p:sldId id="405" r:id="rId21"/>
-    <p:sldId id="408" r:id="rId22"/>
-    <p:sldId id="409" r:id="rId23"/>
+    <p:sldId id="426" r:id="rId12"/>
+    <p:sldId id="418" r:id="rId13"/>
+    <p:sldId id="396" r:id="rId14"/>
+    <p:sldId id="424" r:id="rId15"/>
+    <p:sldId id="397" r:id="rId16"/>
+    <p:sldId id="419" r:id="rId17"/>
+    <p:sldId id="423" r:id="rId18"/>
+    <p:sldId id="425" r:id="rId19"/>
+    <p:sldId id="420" r:id="rId20"/>
+    <p:sldId id="422" r:id="rId21"/>
+    <p:sldId id="405" r:id="rId22"/>
+    <p:sldId id="408" r:id="rId23"/>
+    <p:sldId id="409" r:id="rId24"/>
   </p:sldIdLst>
   <p:sldSz cx="12192000" cy="6858000"/>
   <p:notesSz cx="6858000" cy="9144000"/>
@@ -141,6 +142,7 @@
         <p14:section name="Untitled Section" id="{442609BE-BD88-46FA-8DEF-CB70940D5537}">
           <p14:sldIdLst>
             <p14:sldId id="415"/>
+            <p14:sldId id="426"/>
             <p14:sldId id="418"/>
             <p14:sldId id="396"/>
             <p14:sldId id="424"/>
@@ -194,7 +196,7 @@
 <file path=ppt/revisionInfo.xml><?xml version="1.0" encoding="utf-8"?>
 <p1510:revInfo xmlns:a="http://schemas.openxmlformats.org/drawingml/2006/main" xmlns:r="http://schemas.openxmlformats.org/officeDocument/2006/relationships" xmlns:p1510="http://schemas.microsoft.com/office/powerpoint/2015/10/main">
   <p1510:revLst>
-    <p1510:client id="{F777C335-4339-49C5-8275-414B08422B2B}" v="8" dt="2022-04-29T02:39:47.044"/>
+    <p1510:client id="{F777C335-4339-49C5-8275-414B08422B2B}" v="12" dt="2022-04-29T15:00:13.767"/>
   </p1510:revLst>
 </p1510:revInfo>
 </file>
@@ -204,16 +206,47 @@
   <pc:docChgLst>
     <pc:chgData name="Stefanie Gagnon" userId="f874ef52da13a6b2" providerId="LiveId" clId="{F777C335-4339-49C5-8275-414B08422B2B}"/>
     <pc:docChg chg="undo custSel addSld delSld modSld sldOrd modSection">
-      <pc:chgData name="Stefanie Gagnon" userId="f874ef52da13a6b2" providerId="LiveId" clId="{F777C335-4339-49C5-8275-414B08422B2B}" dt="2022-04-29T02:42:59.620" v="1109" actId="20577"/>
+      <pc:chgData name="Stefanie Gagnon" userId="f874ef52da13a6b2" providerId="LiveId" clId="{F777C335-4339-49C5-8275-414B08422B2B}" dt="2022-04-29T15:17:01.031" v="1598" actId="33524"/>
       <pc:docMkLst>
         <pc:docMk/>
       </pc:docMkLst>
       <pc:sldChg chg="modSp mod">
-        <pc:chgData name="Stefanie Gagnon" userId="f874ef52da13a6b2" providerId="LiveId" clId="{F777C335-4339-49C5-8275-414B08422B2B}" dt="2022-04-28T23:19:56.902" v="121" actId="20577"/>
+        <pc:chgData name="Stefanie Gagnon" userId="f874ef52da13a6b2" providerId="LiveId" clId="{F777C335-4339-49C5-8275-414B08422B2B}" dt="2022-04-29T14:28:05.234" v="1125" actId="20577"/>
+        <pc:sldMkLst>
+          <pc:docMk/>
+          <pc:sldMk cId="4093317005" sldId="396"/>
+        </pc:sldMkLst>
+        <pc:spChg chg="mod">
+          <ac:chgData name="Stefanie Gagnon" userId="f874ef52da13a6b2" providerId="LiveId" clId="{F777C335-4339-49C5-8275-414B08422B2B}" dt="2022-04-29T14:28:05.234" v="1125" actId="20577"/>
+          <ac:spMkLst>
+            <pc:docMk/>
+            <pc:sldMk cId="4093317005" sldId="396"/>
+            <ac:spMk id="4" creationId="{523A727A-BD22-42EE-9500-BBEF455DA5DE}"/>
+          </ac:spMkLst>
+        </pc:spChg>
+        <pc:spChg chg="mod">
+          <ac:chgData name="Stefanie Gagnon" userId="f874ef52da13a6b2" providerId="LiveId" clId="{F777C335-4339-49C5-8275-414B08422B2B}" dt="2022-04-29T14:27:54.639" v="1116" actId="20577"/>
+          <ac:spMkLst>
+            <pc:docMk/>
+            <pc:sldMk cId="4093317005" sldId="396"/>
+            <ac:spMk id="5" creationId="{D00329E9-36A4-4FA9-9FBD-412BCEF20954}"/>
+          </ac:spMkLst>
+        </pc:spChg>
+      </pc:sldChg>
+      <pc:sldChg chg="modSp mod">
+        <pc:chgData name="Stefanie Gagnon" userId="f874ef52da13a6b2" providerId="LiveId" clId="{F777C335-4339-49C5-8275-414B08422B2B}" dt="2022-04-29T15:17:01.031" v="1598" actId="33524"/>
         <pc:sldMkLst>
           <pc:docMk/>
           <pc:sldMk cId="2849151971" sldId="402"/>
         </pc:sldMkLst>
+        <pc:spChg chg="mod">
+          <ac:chgData name="Stefanie Gagnon" userId="f874ef52da13a6b2" providerId="LiveId" clId="{F777C335-4339-49C5-8275-414B08422B2B}" dt="2022-04-29T15:17:01.031" v="1598" actId="33524"/>
+          <ac:spMkLst>
+            <pc:docMk/>
+            <pc:sldMk cId="2849151971" sldId="402"/>
+            <ac:spMk id="11" creationId="{7041F48D-F184-4F9F-B5AC-F127F0898F39}"/>
+          </ac:spMkLst>
+        </pc:spChg>
         <pc:spChg chg="mod">
           <ac:chgData name="Stefanie Gagnon" userId="f874ef52da13a6b2" providerId="LiveId" clId="{F777C335-4339-49C5-8275-414B08422B2B}" dt="2022-04-28T23:19:50.600" v="114" actId="20577"/>
           <ac:spMkLst>
@@ -442,8 +475,8 @@
           </ac:spMkLst>
         </pc:spChg>
       </pc:sldChg>
-      <pc:sldChg chg="modSp mod modNotesTx">
-        <pc:chgData name="Stefanie Gagnon" userId="f874ef52da13a6b2" providerId="LiveId" clId="{F777C335-4339-49C5-8275-414B08422B2B}" dt="2022-04-29T02:13:34.199" v="980" actId="20577"/>
+      <pc:sldChg chg="addSp delSp modSp mod modNotesTx">
+        <pc:chgData name="Stefanie Gagnon" userId="f874ef52da13a6b2" providerId="LiveId" clId="{F777C335-4339-49C5-8275-414B08422B2B}" dt="2022-04-29T15:00:08.232" v="1153" actId="21"/>
         <pc:sldMkLst>
           <pc:docMk/>
           <pc:sldMk cId="3762257380" sldId="415"/>
@@ -456,6 +489,22 @@
             <ac:spMk id="5" creationId="{6237BABF-398B-4F17-B288-42D7047C2B6E}"/>
           </ac:spMkLst>
         </pc:spChg>
+        <pc:picChg chg="add del mod">
+          <ac:chgData name="Stefanie Gagnon" userId="f874ef52da13a6b2" providerId="LiveId" clId="{F777C335-4339-49C5-8275-414B08422B2B}" dt="2022-04-29T14:59:54.045" v="1149" actId="21"/>
+          <ac:picMkLst>
+            <pc:docMk/>
+            <pc:sldMk cId="3762257380" sldId="415"/>
+            <ac:picMk id="3" creationId="{85817382-3EA6-47C6-9073-204FB21D67B8}"/>
+          </ac:picMkLst>
+        </pc:picChg>
+        <pc:picChg chg="add del mod">
+          <ac:chgData name="Stefanie Gagnon" userId="f874ef52da13a6b2" providerId="LiveId" clId="{F777C335-4339-49C5-8275-414B08422B2B}" dt="2022-04-29T15:00:08.232" v="1153" actId="21"/>
+          <ac:picMkLst>
+            <pc:docMk/>
+            <pc:sldMk cId="3762257380" sldId="415"/>
+            <ac:picMk id="6" creationId="{045FD2BD-ADFF-4A91-9807-BF2FEA736F4A}"/>
+          </ac:picMkLst>
+        </pc:picChg>
       </pc:sldChg>
       <pc:sldChg chg="ord">
         <pc:chgData name="Stefanie Gagnon" userId="f874ef52da13a6b2" providerId="LiveId" clId="{F777C335-4339-49C5-8275-414B08422B2B}" dt="2022-04-29T02:14:23.641" v="982"/>
@@ -603,7 +652,7 @@
         </pc:spChg>
       </pc:sldChg>
       <pc:sldChg chg="modSp new mod">
-        <pc:chgData name="Stefanie Gagnon" userId="f874ef52da13a6b2" providerId="LiveId" clId="{F777C335-4339-49C5-8275-414B08422B2B}" dt="2022-04-29T02:42:59.620" v="1109" actId="20577"/>
+        <pc:chgData name="Stefanie Gagnon" userId="f874ef52da13a6b2" providerId="LiveId" clId="{F777C335-4339-49C5-8275-414B08422B2B}" dt="2022-04-29T14:30:55.157" v="1132" actId="20577"/>
         <pc:sldMkLst>
           <pc:docMk/>
           <pc:sldMk cId="3226823812" sldId="425"/>
@@ -617,13 +666,124 @@
           </ac:spMkLst>
         </pc:spChg>
         <pc:spChg chg="mod">
-          <ac:chgData name="Stefanie Gagnon" userId="f874ef52da13a6b2" providerId="LiveId" clId="{F777C335-4339-49C5-8275-414B08422B2B}" dt="2022-04-29T02:42:59.620" v="1109" actId="20577"/>
+          <ac:chgData name="Stefanie Gagnon" userId="f874ef52da13a6b2" providerId="LiveId" clId="{F777C335-4339-49C5-8275-414B08422B2B}" dt="2022-04-29T14:30:55.157" v="1132" actId="20577"/>
           <ac:spMkLst>
             <pc:docMk/>
             <pc:sldMk cId="3226823812" sldId="425"/>
             <ac:spMk id="3" creationId="{625AF70B-2B23-485A-B11E-4B4CBD2F07E7}"/>
           </ac:spMkLst>
         </pc:spChg>
+      </pc:sldChg>
+      <pc:sldChg chg="addSp delSp modSp new mod modClrScheme chgLayout">
+        <pc:chgData name="Stefanie Gagnon" userId="f874ef52da13a6b2" providerId="LiveId" clId="{F777C335-4339-49C5-8275-414B08422B2B}" dt="2022-04-29T15:13:56.813" v="1350" actId="1076"/>
+        <pc:sldMkLst>
+          <pc:docMk/>
+          <pc:sldMk cId="1571354348" sldId="426"/>
+        </pc:sldMkLst>
+        <pc:spChg chg="del mod ord">
+          <ac:chgData name="Stefanie Gagnon" userId="f874ef52da13a6b2" providerId="LiveId" clId="{F777C335-4339-49C5-8275-414B08422B2B}" dt="2022-04-29T15:10:26.373" v="1194" actId="700"/>
+          <ac:spMkLst>
+            <pc:docMk/>
+            <pc:sldMk cId="1571354348" sldId="426"/>
+            <ac:spMk id="2" creationId="{A67CC79E-A4EE-4275-952C-9CA4290B8A12}"/>
+          </ac:spMkLst>
+        </pc:spChg>
+        <pc:spChg chg="del mod ord">
+          <ac:chgData name="Stefanie Gagnon" userId="f874ef52da13a6b2" providerId="LiveId" clId="{F777C335-4339-49C5-8275-414B08422B2B}" dt="2022-04-29T15:10:26.373" v="1194" actId="700"/>
+          <ac:spMkLst>
+            <pc:docMk/>
+            <pc:sldMk cId="1571354348" sldId="426"/>
+            <ac:spMk id="3" creationId="{A099B2EB-0B53-4FB4-881A-377E64D443C5}"/>
+          </ac:spMkLst>
+        </pc:spChg>
+        <pc:spChg chg="del mod ord">
+          <ac:chgData name="Stefanie Gagnon" userId="f874ef52da13a6b2" providerId="LiveId" clId="{F777C335-4339-49C5-8275-414B08422B2B}" dt="2022-04-29T15:10:26.373" v="1194" actId="700"/>
+          <ac:spMkLst>
+            <pc:docMk/>
+            <pc:sldMk cId="1571354348" sldId="426"/>
+            <ac:spMk id="4" creationId="{69BDE87B-71E4-43B1-A253-68260F2F8692}"/>
+          </ac:spMkLst>
+        </pc:spChg>
+        <pc:spChg chg="del mod">
+          <ac:chgData name="Stefanie Gagnon" userId="f874ef52da13a6b2" providerId="LiveId" clId="{F777C335-4339-49C5-8275-414B08422B2B}" dt="2022-04-29T15:09:53.896" v="1193" actId="478"/>
+          <ac:spMkLst>
+            <pc:docMk/>
+            <pc:sldMk cId="1571354348" sldId="426"/>
+            <ac:spMk id="5" creationId="{F265D779-7144-4861-8BB3-C17C6FCF5FE3}"/>
+          </ac:spMkLst>
+        </pc:spChg>
+        <pc:spChg chg="add del mod ord">
+          <ac:chgData name="Stefanie Gagnon" userId="f874ef52da13a6b2" providerId="LiveId" clId="{F777C335-4339-49C5-8275-414B08422B2B}" dt="2022-04-29T15:10:36.994" v="1195" actId="26606"/>
+          <ac:spMkLst>
+            <pc:docMk/>
+            <pc:sldMk cId="1571354348" sldId="426"/>
+            <ac:spMk id="8" creationId="{C5D1DA31-0D00-434F-B929-E449131F7CBE}"/>
+          </ac:spMkLst>
+        </pc:spChg>
+        <pc:spChg chg="add del mod ord">
+          <ac:chgData name="Stefanie Gagnon" userId="f874ef52da13a6b2" providerId="LiveId" clId="{F777C335-4339-49C5-8275-414B08422B2B}" dt="2022-04-29T15:10:36.994" v="1195" actId="26606"/>
+          <ac:spMkLst>
+            <pc:docMk/>
+            <pc:sldMk cId="1571354348" sldId="426"/>
+            <ac:spMk id="9" creationId="{98D21678-B695-4AC7-8EF9-3741A0B75D2B}"/>
+          </ac:spMkLst>
+        </pc:spChg>
+        <pc:spChg chg="add del mod ord">
+          <ac:chgData name="Stefanie Gagnon" userId="f874ef52da13a6b2" providerId="LiveId" clId="{F777C335-4339-49C5-8275-414B08422B2B}" dt="2022-04-29T15:10:36.994" v="1195" actId="26606"/>
+          <ac:spMkLst>
+            <pc:docMk/>
+            <pc:sldMk cId="1571354348" sldId="426"/>
+            <ac:spMk id="10" creationId="{876D263F-D0EE-4411-BFCB-0F64C70E318B}"/>
+          </ac:spMkLst>
+        </pc:spChg>
+        <pc:spChg chg="add mod">
+          <ac:chgData name="Stefanie Gagnon" userId="f874ef52da13a6b2" providerId="LiveId" clId="{F777C335-4339-49C5-8275-414B08422B2B}" dt="2022-04-29T15:11:16.954" v="1283" actId="20577"/>
+          <ac:spMkLst>
+            <pc:docMk/>
+            <pc:sldMk cId="1571354348" sldId="426"/>
+            <ac:spMk id="15" creationId="{87A0A042-FEA8-3A41-EFB5-69EBF531FDE5}"/>
+          </ac:spMkLst>
+        </pc:spChg>
+        <pc:spChg chg="add mod">
+          <ac:chgData name="Stefanie Gagnon" userId="f874ef52da13a6b2" providerId="LiveId" clId="{F777C335-4339-49C5-8275-414B08422B2B}" dt="2022-04-29T15:13:13.193" v="1336" actId="20577"/>
+          <ac:spMkLst>
+            <pc:docMk/>
+            <pc:sldMk cId="1571354348" sldId="426"/>
+            <ac:spMk id="17" creationId="{5B56281B-EC47-3351-3BF6-1528E2DB5DE0}"/>
+          </ac:spMkLst>
+        </pc:spChg>
+        <pc:spChg chg="add mod">
+          <ac:chgData name="Stefanie Gagnon" userId="f874ef52da13a6b2" providerId="LiveId" clId="{F777C335-4339-49C5-8275-414B08422B2B}" dt="2022-04-29T15:13:21.876" v="1349" actId="20577"/>
+          <ac:spMkLst>
+            <pc:docMk/>
+            <pc:sldMk cId="1571354348" sldId="426"/>
+            <ac:spMk id="19" creationId="{99E76F9A-64BA-0776-9E18-53A1C38E15D8}"/>
+          </ac:spMkLst>
+        </pc:spChg>
+        <pc:spChg chg="add">
+          <ac:chgData name="Stefanie Gagnon" userId="f874ef52da13a6b2" providerId="LiveId" clId="{F777C335-4339-49C5-8275-414B08422B2B}" dt="2022-04-29T15:10:36.994" v="1195" actId="26606"/>
+          <ac:spMkLst>
+            <pc:docMk/>
+            <pc:sldMk cId="1571354348" sldId="426"/>
+            <ac:spMk id="21" creationId="{C6DF1FFF-F579-985C-AD10-0C47010A08C6}"/>
+          </ac:spMkLst>
+        </pc:spChg>
+        <pc:picChg chg="add mod">
+          <ac:chgData name="Stefanie Gagnon" userId="f874ef52da13a6b2" providerId="LiveId" clId="{F777C335-4339-49C5-8275-414B08422B2B}" dt="2022-04-29T15:12:20.417" v="1310" actId="1076"/>
+          <ac:picMkLst>
+            <pc:docMk/>
+            <pc:sldMk cId="1571354348" sldId="426"/>
+            <ac:picMk id="6" creationId="{A9E9B182-3741-43BB-A142-74EE2FF97891}"/>
+          </ac:picMkLst>
+        </pc:picChg>
+        <pc:picChg chg="add mod">
+          <ac:chgData name="Stefanie Gagnon" userId="f874ef52da13a6b2" providerId="LiveId" clId="{F777C335-4339-49C5-8275-414B08422B2B}" dt="2022-04-29T15:13:56.813" v="1350" actId="1076"/>
+          <ac:picMkLst>
+            <pc:docMk/>
+            <pc:sldMk cId="1571354348" sldId="426"/>
+            <ac:picMk id="7" creationId="{0F7AD724-8038-4CBF-9B55-8B9500562E90}"/>
+          </ac:picMkLst>
+        </pc:picChg>
       </pc:sldChg>
     </pc:docChg>
   </pc:docChgLst>
@@ -5284,7 +5444,7 @@
           <a:p>
             <a:fld id="{B860B616-BCB2-4E7C-BAA6-B90DF21B9EDF}" type="datetimeFigureOut">
               <a:rPr lang="en-US" smtClean="0"/>
-              <a:t>4/28/2022</a:t>
+              <a:t>4/29/2022</a:t>
             </a:fld>
             <a:endParaRPr lang="en-US" dirty="0"/>
           </a:p>
@@ -5761,7 +5921,7 @@
           <a:p>
             <a:fld id="{0D0EDF81-139F-488C-872B-4720FBA6BF98}" type="slidenum">
               <a:rPr lang="en-US" smtClean="0"/>
-              <a:t>13</a:t>
+              <a:t>14</a:t>
             </a:fld>
             <a:endParaRPr lang="en-US" dirty="0"/>
           </a:p>
@@ -5860,7 +6020,7 @@
           <a:p>
             <a:fld id="{0D0EDF81-139F-488C-872B-4720FBA6BF98}" type="slidenum">
               <a:rPr lang="en-US" smtClean="0"/>
-              <a:t>15</a:t>
+              <a:t>16</a:t>
             </a:fld>
             <a:endParaRPr lang="en-US" dirty="0"/>
           </a:p>
@@ -5953,7 +6113,7 @@
           <a:p>
             <a:fld id="{0D0EDF81-139F-488C-872B-4720FBA6BF98}" type="slidenum">
               <a:rPr lang="en-US" smtClean="0"/>
-              <a:t>16</a:t>
+              <a:t>17</a:t>
             </a:fld>
             <a:endParaRPr lang="en-US" dirty="0"/>
           </a:p>
@@ -38563,6 +38723,323 @@
           <a:p>
             <a:r>
               <a:rPr lang="en-US" dirty="0"/>
+              <a:t>Percentages of</a:t>
+            </a:r>
+          </a:p>
+        </p:txBody>
+      </p:sp>
+      <p:sp>
+        <p:nvSpPr>
+          <p:cNvPr id="46" name="Text Placeholder 2">
+            <a:extLst>
+              <a:ext uri="{FF2B5EF4-FFF2-40B4-BE49-F238E27FC236}">
+                <a16:creationId xmlns:a16="http://schemas.microsoft.com/office/drawing/2014/main" id="{E35F34B1-55CF-2AA3-8AC6-949E3396103C}"/>
+              </a:ext>
+            </a:extLst>
+          </p:cNvPr>
+          <p:cNvSpPr>
+            <a:spLocks noGrp="1"/>
+          </p:cNvSpPr>
+          <p:nvPr>
+            <p:ph type="body" idx="1"/>
+          </p:nvPr>
+        </p:nvSpPr>
+        <p:spPr>
+          <a:xfrm>
+            <a:off x="839788" y="1614120"/>
+            <a:ext cx="4937760" cy="950976"/>
+          </a:xfrm>
+        </p:spPr>
+        <p:txBody>
+          <a:bodyPr/>
+          <a:lstStyle/>
+          <a:p>
+            <a:r>
+              <a:rPr lang="en-US" dirty="0"/>
+              <a:t>Content types</a:t>
+            </a:r>
+          </a:p>
+        </p:txBody>
+      </p:sp>
+      <p:pic>
+        <p:nvPicPr>
+          <p:cNvPr id="37" name="Content Placeholder 36" descr="A picture containing pie chart&#10;&#10;Description automatically generated">
+            <a:extLst>
+              <a:ext uri="{FF2B5EF4-FFF2-40B4-BE49-F238E27FC236}">
+                <a16:creationId xmlns:a16="http://schemas.microsoft.com/office/drawing/2014/main" id="{4A9C06AE-8973-40F1-B860-BAEFCC9CDC4E}"/>
+              </a:ext>
+            </a:extLst>
+          </p:cNvPr>
+          <p:cNvPicPr>
+            <a:picLocks noGrp="1" noChangeAspect="1"/>
+          </p:cNvPicPr>
+          <p:nvPr>
+            <p:ph sz="half" idx="2"/>
+          </p:nvPr>
+        </p:nvPicPr>
+        <p:blipFill>
+          <a:blip r:embed="rId2"/>
+          <a:stretch>
+            <a:fillRect/>
+          </a:stretch>
+        </p:blipFill>
+        <p:spPr>
+          <a:xfrm>
+            <a:off x="1777048" y="2194624"/>
+            <a:ext cx="3995864" cy="3995864"/>
+          </a:xfrm>
+          <a:noFill/>
+        </p:spPr>
+      </p:pic>
+      <p:sp>
+        <p:nvSpPr>
+          <p:cNvPr id="48" name="Text Placeholder 4">
+            <a:extLst>
+              <a:ext uri="{FF2B5EF4-FFF2-40B4-BE49-F238E27FC236}">
+                <a16:creationId xmlns:a16="http://schemas.microsoft.com/office/drawing/2014/main" id="{5776AB68-59B6-875F-6C60-0C2D9EB6B761}"/>
+              </a:ext>
+            </a:extLst>
+          </p:cNvPr>
+          <p:cNvSpPr>
+            <a:spLocks noGrp="1"/>
+          </p:cNvSpPr>
+          <p:nvPr>
+            <p:ph type="body" sz="quarter" idx="3"/>
+          </p:nvPr>
+        </p:nvSpPr>
+        <p:spPr>
+          <a:xfrm>
+            <a:off x="6419088" y="1614120"/>
+            <a:ext cx="4937760" cy="950976"/>
+          </a:xfrm>
+        </p:spPr>
+        <p:txBody>
+          <a:bodyPr/>
+          <a:lstStyle/>
+          <a:p>
+            <a:r>
+              <a:rPr lang="en-US" dirty="0"/>
+              <a:t>Rating types</a:t>
+            </a:r>
+          </a:p>
+        </p:txBody>
+      </p:sp>
+      <p:pic>
+        <p:nvPicPr>
+          <p:cNvPr id="41" name="Content Placeholder 40" descr="Chart, pie chart&#10;&#10;Description automatically generated">
+            <a:extLst>
+              <a:ext uri="{FF2B5EF4-FFF2-40B4-BE49-F238E27FC236}">
+                <a16:creationId xmlns:a16="http://schemas.microsoft.com/office/drawing/2014/main" id="{D67CA551-B856-4FBC-9D20-BD732A0DDDE5}"/>
+              </a:ext>
+            </a:extLst>
+          </p:cNvPr>
+          <p:cNvPicPr>
+            <a:picLocks noGrp="1" noChangeAspect="1"/>
+          </p:cNvPicPr>
+          <p:nvPr>
+            <p:ph sz="quarter" idx="4"/>
+          </p:nvPr>
+        </p:nvPicPr>
+        <p:blipFill>
+          <a:blip r:embed="rId3"/>
+          <a:stretch>
+            <a:fillRect/>
+          </a:stretch>
+        </p:blipFill>
+        <p:spPr>
+          <a:xfrm>
+            <a:off x="7356348" y="2194624"/>
+            <a:ext cx="3995864" cy="3995864"/>
+          </a:xfrm>
+          <a:noFill/>
+        </p:spPr>
+      </p:pic>
+      <p:sp>
+        <p:nvSpPr>
+          <p:cNvPr id="4" name="Date Placeholder 5">
+            <a:extLst>
+              <a:ext uri="{FF2B5EF4-FFF2-40B4-BE49-F238E27FC236}">
+                <a16:creationId xmlns:a16="http://schemas.microsoft.com/office/drawing/2014/main" id="{523A727A-BD22-42EE-9500-BBEF455DA5DE}"/>
+              </a:ext>
+            </a:extLst>
+          </p:cNvPr>
+          <p:cNvSpPr>
+            <a:spLocks noGrp="1"/>
+          </p:cNvSpPr>
+          <p:nvPr>
+            <p:ph type="dt" sz="half" idx="10"/>
+          </p:nvPr>
+        </p:nvSpPr>
+        <p:spPr>
+          <a:xfrm>
+            <a:off x="838200" y="6356350"/>
+            <a:ext cx="2743200" cy="365125"/>
+          </a:xfrm>
+        </p:spPr>
+        <p:txBody>
+          <a:bodyPr anchor="ctr">
+            <a:normAutofit/>
+          </a:bodyPr>
+          <a:lstStyle/>
+          <a:p>
+            <a:pPr>
+              <a:spcAft>
+                <a:spcPts val="600"/>
+              </a:spcAft>
+            </a:pPr>
+            <a:r>
+              <a:rPr lang="en-US" dirty="0"/>
+              <a:t>4/29/2022</a:t>
+            </a:r>
+          </a:p>
+        </p:txBody>
+      </p:sp>
+      <p:sp>
+        <p:nvSpPr>
+          <p:cNvPr id="5" name="Footer Placeholder 6">
+            <a:extLst>
+              <a:ext uri="{FF2B5EF4-FFF2-40B4-BE49-F238E27FC236}">
+                <a16:creationId xmlns:a16="http://schemas.microsoft.com/office/drawing/2014/main" id="{D00329E9-36A4-4FA9-9FBD-412BCEF20954}"/>
+              </a:ext>
+            </a:extLst>
+          </p:cNvPr>
+          <p:cNvSpPr>
+            <a:spLocks noGrp="1"/>
+          </p:cNvSpPr>
+          <p:nvPr>
+            <p:ph type="ftr" sz="quarter" idx="11"/>
+          </p:nvPr>
+        </p:nvSpPr>
+        <p:spPr>
+          <a:xfrm>
+            <a:off x="4038600" y="6356350"/>
+            <a:ext cx="4114800" cy="365125"/>
+          </a:xfrm>
+        </p:spPr>
+        <p:txBody>
+          <a:bodyPr anchor="ctr">
+            <a:normAutofit/>
+          </a:bodyPr>
+          <a:lstStyle/>
+          <a:p>
+            <a:pPr>
+              <a:spcAft>
+                <a:spcPts val="600"/>
+              </a:spcAft>
+            </a:pPr>
+            <a:r>
+              <a:rPr lang="en-US" dirty="0"/>
+              <a:t>Netflix</a:t>
+            </a:r>
+          </a:p>
+        </p:txBody>
+      </p:sp>
+      <p:sp>
+        <p:nvSpPr>
+          <p:cNvPr id="7" name="Slide Number Placeholder 7">
+            <a:extLst>
+              <a:ext uri="{FF2B5EF4-FFF2-40B4-BE49-F238E27FC236}">
+                <a16:creationId xmlns:a16="http://schemas.microsoft.com/office/drawing/2014/main" id="{F13D5288-11C4-425C-8C20-5E8A7E726773}"/>
+              </a:ext>
+            </a:extLst>
+          </p:cNvPr>
+          <p:cNvSpPr>
+            <a:spLocks noGrp="1"/>
+          </p:cNvSpPr>
+          <p:nvPr>
+            <p:ph type="sldNum" sz="quarter" idx="12"/>
+          </p:nvPr>
+        </p:nvSpPr>
+        <p:spPr>
+          <a:xfrm>
+            <a:off x="8610600" y="6356350"/>
+            <a:ext cx="2743200" cy="365125"/>
+          </a:xfrm>
+        </p:spPr>
+        <p:txBody>
+          <a:bodyPr anchor="ctr">
+            <a:normAutofit/>
+          </a:bodyPr>
+          <a:lstStyle/>
+          <a:p>
+            <a:pPr>
+              <a:spcAft>
+                <a:spcPts val="600"/>
+              </a:spcAft>
+            </a:pPr>
+            <a:fld id="{590024A9-0184-448B-881E-CC722A916CB1}" type="slidenum">
+              <a:rPr lang="en-US" smtClean="0"/>
+              <a:pPr>
+                <a:spcAft>
+                  <a:spcPts val="600"/>
+                </a:spcAft>
+              </a:pPr>
+              <a:t>10</a:t>
+            </a:fld>
+            <a:endParaRPr lang="en-US"/>
+          </a:p>
+        </p:txBody>
+      </p:sp>
+    </p:spTree>
+    <p:extLst>
+      <p:ext uri="{BB962C8B-B14F-4D97-AF65-F5344CB8AC3E}">
+        <p14:creationId xmlns:p14="http://schemas.microsoft.com/office/powerpoint/2010/main" val="4093317005"/>
+      </p:ext>
+    </p:extLst>
+  </p:cSld>
+  <p:clrMapOvr>
+    <a:masterClrMapping/>
+  </p:clrMapOvr>
+</p:sld>
+</file>
+
+<file path=ppt/slides/slide11.xml><?xml version="1.0" encoding="utf-8"?>
+<p:sld xmlns:a="http://schemas.openxmlformats.org/drawingml/2006/main" xmlns:r="http://schemas.openxmlformats.org/officeDocument/2006/relationships" xmlns:p="http://schemas.openxmlformats.org/presentationml/2006/main">
+  <p:cSld>
+    <p:spTree>
+      <p:nvGrpSpPr>
+        <p:cNvPr id="1" name=""/>
+        <p:cNvGrpSpPr/>
+        <p:nvPr/>
+      </p:nvGrpSpPr>
+      <p:grpSpPr>
+        <a:xfrm>
+          <a:off x="0" y="0"/>
+          <a:ext cx="0" cy="0"/>
+          <a:chOff x="0" y="0"/>
+          <a:chExt cx="0" cy="0"/>
+        </a:xfrm>
+      </p:grpSpPr>
+      <p:sp>
+        <p:nvSpPr>
+          <p:cNvPr id="2" name="Title 1">
+            <a:extLst>
+              <a:ext uri="{FF2B5EF4-FFF2-40B4-BE49-F238E27FC236}">
+                <a16:creationId xmlns:a16="http://schemas.microsoft.com/office/drawing/2014/main" id="{6D602820-7F02-4F5F-8933-C0B61CFA2E08}"/>
+              </a:ext>
+            </a:extLst>
+          </p:cNvPr>
+          <p:cNvSpPr>
+            <a:spLocks noGrp="1"/>
+          </p:cNvSpPr>
+          <p:nvPr>
+            <p:ph type="title"/>
+          </p:nvPr>
+        </p:nvSpPr>
+        <p:spPr>
+          <a:xfrm>
+            <a:off x="838200" y="365125"/>
+            <a:ext cx="10515600" cy="1325563"/>
+          </a:xfrm>
+        </p:spPr>
+        <p:txBody>
+          <a:bodyPr anchor="ctr">
+            <a:normAutofit/>
+          </a:bodyPr>
+          <a:lstStyle/>
+          <a:p>
+            <a:r>
+              <a:rPr lang="en-US" dirty="0"/>
               <a:t>Number of movies per year</a:t>
             </a:r>
           </a:p>
@@ -38718,7 +39195,7 @@
                   <a:spcPts val="600"/>
                 </a:spcAft>
               </a:pPr>
-              <a:t>10</a:t>
+              <a:t>11</a:t>
             </a:fld>
             <a:endParaRPr lang="en-US"/>
           </a:p>
@@ -38737,7 +39214,7 @@
 </p:sld>
 </file>
 
-<file path=ppt/slides/slide11.xml><?xml version="1.0" encoding="utf-8"?>
+<file path=ppt/slides/slide12.xml><?xml version="1.0" encoding="utf-8"?>
 <p:sld xmlns:a="http://schemas.openxmlformats.org/drawingml/2006/main" xmlns:r="http://schemas.openxmlformats.org/officeDocument/2006/relationships" xmlns:p="http://schemas.openxmlformats.org/presentationml/2006/main">
   <p:cSld>
     <p:spTree>
@@ -38861,7 +39338,7 @@
           <a:p>
             <a:fld id="{B9713C8C-8E70-45D5-AE59-23E60168254E}" type="slidenum">
               <a:rPr lang="en-US" smtClean="0"/>
-              <a:t>11</a:t>
+              <a:t>12</a:t>
             </a:fld>
             <a:endParaRPr lang="en-US" dirty="0"/>
           </a:p>
@@ -38909,7 +39386,7 @@
 </p:sld>
 </file>
 
-<file path=ppt/slides/slide12.xml><?xml version="1.0" encoding="utf-8"?>
+<file path=ppt/slides/slide13.xml><?xml version="1.0" encoding="utf-8"?>
 <p:sld xmlns:a="http://schemas.openxmlformats.org/drawingml/2006/main" xmlns:r="http://schemas.openxmlformats.org/officeDocument/2006/relationships" xmlns:p="http://schemas.openxmlformats.org/presentationml/2006/main">
   <p:cSld>
     <p:spTree>
@@ -39033,7 +39510,7 @@
           <a:p>
             <a:fld id="{B9713C8C-8E70-45D5-AE59-23E60168254E}" type="slidenum">
               <a:rPr lang="en-US" smtClean="0"/>
-              <a:t>12</a:t>
+              <a:t>13</a:t>
             </a:fld>
             <a:endParaRPr lang="en-US" dirty="0"/>
           </a:p>
@@ -39081,7 +39558,7 @@
 </p:sld>
 </file>
 
-<file path=ppt/slides/slide13.xml><?xml version="1.0" encoding="utf-8"?>
+<file path=ppt/slides/slide14.xml><?xml version="1.0" encoding="utf-8"?>
 <p:sld xmlns:a="http://schemas.openxmlformats.org/drawingml/2006/main" xmlns:r="http://schemas.openxmlformats.org/officeDocument/2006/relationships" xmlns:p="http://schemas.openxmlformats.org/presentationml/2006/main">
   <p:cSld>
     <p:spTree>
@@ -39236,7 +39713,7 @@
           <a:p>
             <a:fld id="{B9713C8C-8E70-45D5-AE59-23E60168254E}" type="slidenum">
               <a:rPr lang="en-US" smtClean="0"/>
-              <a:t>13</a:t>
+              <a:t>14</a:t>
             </a:fld>
             <a:endParaRPr lang="en-US" dirty="0"/>
           </a:p>
@@ -39255,7 +39732,7 @@
 </p:sld>
 </file>
 
-<file path=ppt/slides/slide14.xml><?xml version="1.0" encoding="utf-8"?>
+<file path=ppt/slides/slide15.xml><?xml version="1.0" encoding="utf-8"?>
 <p:sld xmlns:a="http://schemas.openxmlformats.org/drawingml/2006/main" xmlns:r="http://schemas.openxmlformats.org/officeDocument/2006/relationships" xmlns:p="http://schemas.openxmlformats.org/presentationml/2006/main">
   <p:cSld>
     <p:spTree>
@@ -39322,8 +39799,16 @@
           <a:lstStyle/>
           <a:p>
             <a:r>
+              <a:rPr lang="en-US" dirty="0" err="1"/>
+              <a:t>Imbd</a:t>
+            </a:r>
+            <a:r>
+              <a:rPr lang="en-US"/>
+              <a:t> rating </a:t>
+            </a:r>
+            <a:r>
               <a:rPr lang="en-US" dirty="0"/>
-              <a:t>Rating of movies produced in the listed year</a:t>
+              <a:t>of movies produced in the listed year</a:t>
             </a:r>
           </a:p>
           <a:p>
@@ -39412,7 +39897,7 @@
           <a:p>
             <a:fld id="{B9713C8C-8E70-45D5-AE59-23E60168254E}" type="slidenum">
               <a:rPr lang="en-US" smtClean="0"/>
-              <a:t>14</a:t>
+              <a:t>15</a:t>
             </a:fld>
             <a:endParaRPr lang="en-US" dirty="0"/>
           </a:p>
@@ -39431,7 +39916,7 @@
 </p:sld>
 </file>
 
-<file path=ppt/slides/slide15.xml><?xml version="1.0" encoding="utf-8"?>
+<file path=ppt/slides/slide16.xml><?xml version="1.0" encoding="utf-8"?>
 <p:sld xmlns:a="http://schemas.openxmlformats.org/drawingml/2006/main" xmlns:r="http://schemas.openxmlformats.org/officeDocument/2006/relationships" xmlns:p="http://schemas.openxmlformats.org/presentationml/2006/main">
   <p:cSld>
     <p:spTree>
@@ -39555,7 +40040,7 @@
           <a:p>
             <a:fld id="{B9713C8C-8E70-45D5-AE59-23E60168254E}" type="slidenum">
               <a:rPr lang="en-US" smtClean="0"/>
-              <a:t>15</a:t>
+              <a:t>16</a:t>
             </a:fld>
             <a:endParaRPr lang="en-US" dirty="0"/>
           </a:p>
@@ -39633,7 +40118,7 @@
 </p:sld>
 </file>
 
-<file path=ppt/slides/slide16.xml><?xml version="1.0" encoding="utf-8"?>
+<file path=ppt/slides/slide17.xml><?xml version="1.0" encoding="utf-8"?>
 <p:sld xmlns:a="http://schemas.openxmlformats.org/drawingml/2006/main" xmlns:r="http://schemas.openxmlformats.org/officeDocument/2006/relationships" xmlns:p="http://schemas.openxmlformats.org/presentationml/2006/main">
   <p:cSld>
     <p:spTree>
@@ -39788,7 +40273,7 @@
           <a:p>
             <a:fld id="{B9713C8C-8E70-45D5-AE59-23E60168254E}" type="slidenum">
               <a:rPr lang="en-US" smtClean="0"/>
-              <a:t>16</a:t>
+              <a:t>17</a:t>
             </a:fld>
             <a:endParaRPr lang="en-US" dirty="0"/>
           </a:p>
@@ -39807,7 +40292,7 @@
 </p:sld>
 </file>
 
-<file path=ppt/slides/slide17.xml><?xml version="1.0" encoding="utf-8"?>
+<file path=ppt/slides/slide18.xml><?xml version="1.0" encoding="utf-8"?>
 <p:sld xmlns:a="http://schemas.openxmlformats.org/drawingml/2006/main" xmlns:r="http://schemas.openxmlformats.org/officeDocument/2006/relationships" xmlns:p="http://schemas.openxmlformats.org/presentationml/2006/main">
   <p:cSld>
     <p:spTree>
@@ -39931,7 +40416,7 @@
           <a:p>
             <a:fld id="{B9713C8C-8E70-45D5-AE59-23E60168254E}" type="slidenum">
               <a:rPr lang="en-US" smtClean="0"/>
-              <a:t>17</a:t>
+              <a:t>18</a:t>
             </a:fld>
             <a:endParaRPr lang="en-US" dirty="0"/>
           </a:p>
@@ -39950,7 +40435,7 @@
 </p:sld>
 </file>
 
-<file path=ppt/slides/slide18.xml><?xml version="1.0" encoding="utf-8"?>
+<file path=ppt/slides/slide19.xml><?xml version="1.0" encoding="utf-8"?>
 <p:sld xmlns:a="http://schemas.openxmlformats.org/drawingml/2006/main" xmlns:r="http://schemas.openxmlformats.org/officeDocument/2006/relationships" xmlns:p="http://schemas.openxmlformats.org/presentationml/2006/main">
   <p:cSld>
     <p:spTree>
@@ -40075,7 +40560,7 @@
           <a:p>
             <a:fld id="{B9713C8C-8E70-45D5-AE59-23E60168254E}" type="slidenum">
               <a:rPr lang="en-US" smtClean="0"/>
-              <a:t>18</a:t>
+              <a:t>19</a:t>
             </a:fld>
             <a:endParaRPr lang="en-US" dirty="0"/>
           </a:p>
@@ -40110,182 +40595,6 @@
     <p:extLst>
       <p:ext uri="{BB962C8B-B14F-4D97-AF65-F5344CB8AC3E}">
         <p14:creationId xmlns:p14="http://schemas.microsoft.com/office/powerpoint/2010/main" val="3958427157"/>
-      </p:ext>
-    </p:extLst>
-  </p:cSld>
-  <p:clrMapOvr>
-    <a:masterClrMapping/>
-  </p:clrMapOvr>
-</p:sld>
-</file>
-
-<file path=ppt/slides/slide19.xml><?xml version="1.0" encoding="utf-8"?>
-<p:sld xmlns:a="http://schemas.openxmlformats.org/drawingml/2006/main" xmlns:r="http://schemas.openxmlformats.org/officeDocument/2006/relationships" xmlns:p="http://schemas.openxmlformats.org/presentationml/2006/main">
-  <p:cSld>
-    <p:spTree>
-      <p:nvGrpSpPr>
-        <p:cNvPr id="1" name=""/>
-        <p:cNvGrpSpPr/>
-        <p:nvPr/>
-      </p:nvGrpSpPr>
-      <p:grpSpPr>
-        <a:xfrm>
-          <a:off x="0" y="0"/>
-          <a:ext cx="0" cy="0"/>
-          <a:chOff x="0" y="0"/>
-          <a:chExt cx="0" cy="0"/>
-        </a:xfrm>
-      </p:grpSpPr>
-      <p:pic>
-        <p:nvPicPr>
-          <p:cNvPr id="17" name="Picture Placeholder 16" descr="A group of people posing for the camera&#10;&#10;Description automatically generated">
-            <a:extLst>
-              <a:ext uri="{FF2B5EF4-FFF2-40B4-BE49-F238E27FC236}">
-                <a16:creationId xmlns:a16="http://schemas.microsoft.com/office/drawing/2014/main" id="{CBAD6E17-CBCF-41A0-AFA6-40E7F7808E7C}"/>
-              </a:ext>
-            </a:extLst>
-          </p:cNvPr>
-          <p:cNvPicPr>
-            <a:picLocks noGrp="1" noChangeAspect="1"/>
-          </p:cNvPicPr>
-          <p:nvPr>
-            <p:ph type="pic" sz="quarter" idx="13"/>
-          </p:nvPr>
-        </p:nvPicPr>
-        <p:blipFill rotWithShape="1">
-          <a:blip r:embed="rId2"/>
-          <a:srcRect l="13582" r="13582"/>
-          <a:stretch/>
-        </p:blipFill>
-        <p:spPr>
-          <a:xfrm>
-            <a:off x="20" y="10"/>
-            <a:ext cx="6105116" cy="4190990"/>
-          </a:xfrm>
-          <a:noFill/>
-        </p:spPr>
-      </p:pic>
-      <p:sp>
-        <p:nvSpPr>
-          <p:cNvPr id="4" name="Title 3">
-            <a:extLst>
-              <a:ext uri="{FF2B5EF4-FFF2-40B4-BE49-F238E27FC236}">
-                <a16:creationId xmlns:a16="http://schemas.microsoft.com/office/drawing/2014/main" id="{8CA6E381-7CDD-4999-B9C7-CD31E749FD95}"/>
-              </a:ext>
-            </a:extLst>
-          </p:cNvPr>
-          <p:cNvSpPr>
-            <a:spLocks noGrp="1"/>
-          </p:cNvSpPr>
-          <p:nvPr>
-            <p:ph type="title"/>
-          </p:nvPr>
-        </p:nvSpPr>
-        <p:spPr>
-          <a:xfrm>
-            <a:off x="6739128" y="365760"/>
-            <a:ext cx="4617720" cy="2578608"/>
-          </a:xfrm>
-        </p:spPr>
-        <p:txBody>
-          <a:bodyPr anchor="b">
-            <a:normAutofit/>
-          </a:bodyPr>
-          <a:lstStyle/>
-          <a:p>
-            <a:r>
-              <a:rPr lang="en-US" dirty="0"/>
-              <a:t>Thank you</a:t>
-            </a:r>
-          </a:p>
-        </p:txBody>
-      </p:sp>
-      <p:sp>
-        <p:nvSpPr>
-          <p:cNvPr id="26" name="Footer Placeholder 5">
-            <a:extLst>
-              <a:ext uri="{FF2B5EF4-FFF2-40B4-BE49-F238E27FC236}">
-                <a16:creationId xmlns:a16="http://schemas.microsoft.com/office/drawing/2014/main" id="{EADA098B-F015-5FF4-2A19-2D32BD753ECC}"/>
-              </a:ext>
-            </a:extLst>
-          </p:cNvPr>
-          <p:cNvSpPr>
-            <a:spLocks noGrp="1"/>
-          </p:cNvSpPr>
-          <p:nvPr>
-            <p:ph type="ftr" sz="quarter" idx="11"/>
-          </p:nvPr>
-        </p:nvSpPr>
-        <p:spPr>
-          <a:xfrm>
-            <a:off x="6739128" y="6356350"/>
-            <a:ext cx="4114800" cy="365125"/>
-          </a:xfrm>
-        </p:spPr>
-        <p:txBody>
-          <a:bodyPr/>
-          <a:lstStyle/>
-          <a:p>
-            <a:pPr algn="l">
-              <a:spcAft>
-                <a:spcPts val="600"/>
-              </a:spcAft>
-            </a:pPr>
-            <a:r>
-              <a:rPr lang="en-US"/>
-              <a:t>Presentation Title</a:t>
-            </a:r>
-          </a:p>
-        </p:txBody>
-      </p:sp>
-      <p:sp>
-        <p:nvSpPr>
-          <p:cNvPr id="32" name="Slide Number Placeholder 6">
-            <a:extLst>
-              <a:ext uri="{FF2B5EF4-FFF2-40B4-BE49-F238E27FC236}">
-                <a16:creationId xmlns:a16="http://schemas.microsoft.com/office/drawing/2014/main" id="{DE3F7F6C-80AA-3E4C-87DC-4A9234EB5D77}"/>
-              </a:ext>
-            </a:extLst>
-          </p:cNvPr>
-          <p:cNvSpPr>
-            <a:spLocks noGrp="1"/>
-          </p:cNvSpPr>
-          <p:nvPr>
-            <p:ph type="sldNum" sz="quarter" idx="12"/>
-          </p:nvPr>
-        </p:nvSpPr>
-        <p:spPr>
-          <a:xfrm>
-            <a:off x="8610600" y="6356350"/>
-            <a:ext cx="2743200" cy="365125"/>
-          </a:xfrm>
-        </p:spPr>
-        <p:txBody>
-          <a:bodyPr/>
-          <a:lstStyle/>
-          <a:p>
-            <a:pPr>
-              <a:spcAft>
-                <a:spcPts val="600"/>
-              </a:spcAft>
-            </a:pPr>
-            <a:fld id="{B9713C8C-8E70-45D5-AE59-23E60168254E}" type="slidenum">
-              <a:rPr lang="en-US" smtClean="0"/>
-              <a:pPr>
-                <a:spcAft>
-                  <a:spcPts val="600"/>
-                </a:spcAft>
-              </a:pPr>
-              <a:t>19</a:t>
-            </a:fld>
-            <a:endParaRPr lang="en-US"/>
-          </a:p>
-        </p:txBody>
-      </p:sp>
-    </p:spTree>
-    <p:extLst>
-      <p:ext uri="{BB962C8B-B14F-4D97-AF65-F5344CB8AC3E}">
-        <p14:creationId xmlns:p14="http://schemas.microsoft.com/office/powerpoint/2010/main" val="2420767862"/>
       </p:ext>
     </p:extLst>
   </p:cSld>
@@ -40527,6 +40836,182 @@
     <p:extLst>
       <p:ext uri="{BB962C8B-B14F-4D97-AF65-F5344CB8AC3E}">
         <p14:creationId xmlns:p14="http://schemas.microsoft.com/office/powerpoint/2010/main" val="3386965950"/>
+      </p:ext>
+    </p:extLst>
+  </p:cSld>
+  <p:clrMapOvr>
+    <a:masterClrMapping/>
+  </p:clrMapOvr>
+</p:sld>
+</file>
+
+<file path=ppt/slides/slide20.xml><?xml version="1.0" encoding="utf-8"?>
+<p:sld xmlns:a="http://schemas.openxmlformats.org/drawingml/2006/main" xmlns:r="http://schemas.openxmlformats.org/officeDocument/2006/relationships" xmlns:p="http://schemas.openxmlformats.org/presentationml/2006/main">
+  <p:cSld>
+    <p:spTree>
+      <p:nvGrpSpPr>
+        <p:cNvPr id="1" name=""/>
+        <p:cNvGrpSpPr/>
+        <p:nvPr/>
+      </p:nvGrpSpPr>
+      <p:grpSpPr>
+        <a:xfrm>
+          <a:off x="0" y="0"/>
+          <a:ext cx="0" cy="0"/>
+          <a:chOff x="0" y="0"/>
+          <a:chExt cx="0" cy="0"/>
+        </a:xfrm>
+      </p:grpSpPr>
+      <p:pic>
+        <p:nvPicPr>
+          <p:cNvPr id="17" name="Picture Placeholder 16" descr="A group of people posing for the camera&#10;&#10;Description automatically generated">
+            <a:extLst>
+              <a:ext uri="{FF2B5EF4-FFF2-40B4-BE49-F238E27FC236}">
+                <a16:creationId xmlns:a16="http://schemas.microsoft.com/office/drawing/2014/main" id="{CBAD6E17-CBCF-41A0-AFA6-40E7F7808E7C}"/>
+              </a:ext>
+            </a:extLst>
+          </p:cNvPr>
+          <p:cNvPicPr>
+            <a:picLocks noGrp="1" noChangeAspect="1"/>
+          </p:cNvPicPr>
+          <p:nvPr>
+            <p:ph type="pic" sz="quarter" idx="13"/>
+          </p:nvPr>
+        </p:nvPicPr>
+        <p:blipFill rotWithShape="1">
+          <a:blip r:embed="rId2"/>
+          <a:srcRect l="13582" r="13582"/>
+          <a:stretch/>
+        </p:blipFill>
+        <p:spPr>
+          <a:xfrm>
+            <a:off x="20" y="10"/>
+            <a:ext cx="6105116" cy="4190990"/>
+          </a:xfrm>
+          <a:noFill/>
+        </p:spPr>
+      </p:pic>
+      <p:sp>
+        <p:nvSpPr>
+          <p:cNvPr id="4" name="Title 3">
+            <a:extLst>
+              <a:ext uri="{FF2B5EF4-FFF2-40B4-BE49-F238E27FC236}">
+                <a16:creationId xmlns:a16="http://schemas.microsoft.com/office/drawing/2014/main" id="{8CA6E381-7CDD-4999-B9C7-CD31E749FD95}"/>
+              </a:ext>
+            </a:extLst>
+          </p:cNvPr>
+          <p:cNvSpPr>
+            <a:spLocks noGrp="1"/>
+          </p:cNvSpPr>
+          <p:nvPr>
+            <p:ph type="title"/>
+          </p:nvPr>
+        </p:nvSpPr>
+        <p:spPr>
+          <a:xfrm>
+            <a:off x="6739128" y="365760"/>
+            <a:ext cx="4617720" cy="2578608"/>
+          </a:xfrm>
+        </p:spPr>
+        <p:txBody>
+          <a:bodyPr anchor="b">
+            <a:normAutofit/>
+          </a:bodyPr>
+          <a:lstStyle/>
+          <a:p>
+            <a:r>
+              <a:rPr lang="en-US" dirty="0"/>
+              <a:t>Thank you</a:t>
+            </a:r>
+          </a:p>
+        </p:txBody>
+      </p:sp>
+      <p:sp>
+        <p:nvSpPr>
+          <p:cNvPr id="26" name="Footer Placeholder 5">
+            <a:extLst>
+              <a:ext uri="{FF2B5EF4-FFF2-40B4-BE49-F238E27FC236}">
+                <a16:creationId xmlns:a16="http://schemas.microsoft.com/office/drawing/2014/main" id="{EADA098B-F015-5FF4-2A19-2D32BD753ECC}"/>
+              </a:ext>
+            </a:extLst>
+          </p:cNvPr>
+          <p:cNvSpPr>
+            <a:spLocks noGrp="1"/>
+          </p:cNvSpPr>
+          <p:nvPr>
+            <p:ph type="ftr" sz="quarter" idx="11"/>
+          </p:nvPr>
+        </p:nvSpPr>
+        <p:spPr>
+          <a:xfrm>
+            <a:off x="6739128" y="6356350"/>
+            <a:ext cx="4114800" cy="365125"/>
+          </a:xfrm>
+        </p:spPr>
+        <p:txBody>
+          <a:bodyPr/>
+          <a:lstStyle/>
+          <a:p>
+            <a:pPr algn="l">
+              <a:spcAft>
+                <a:spcPts val="600"/>
+              </a:spcAft>
+            </a:pPr>
+            <a:r>
+              <a:rPr lang="en-US"/>
+              <a:t>Presentation Title</a:t>
+            </a:r>
+          </a:p>
+        </p:txBody>
+      </p:sp>
+      <p:sp>
+        <p:nvSpPr>
+          <p:cNvPr id="32" name="Slide Number Placeholder 6">
+            <a:extLst>
+              <a:ext uri="{FF2B5EF4-FFF2-40B4-BE49-F238E27FC236}">
+                <a16:creationId xmlns:a16="http://schemas.microsoft.com/office/drawing/2014/main" id="{DE3F7F6C-80AA-3E4C-87DC-4A9234EB5D77}"/>
+              </a:ext>
+            </a:extLst>
+          </p:cNvPr>
+          <p:cNvSpPr>
+            <a:spLocks noGrp="1"/>
+          </p:cNvSpPr>
+          <p:nvPr>
+            <p:ph type="sldNum" sz="quarter" idx="12"/>
+          </p:nvPr>
+        </p:nvSpPr>
+        <p:spPr>
+          <a:xfrm>
+            <a:off x="8610600" y="6356350"/>
+            <a:ext cx="2743200" cy="365125"/>
+          </a:xfrm>
+        </p:spPr>
+        <p:txBody>
+          <a:bodyPr/>
+          <a:lstStyle/>
+          <a:p>
+            <a:pPr>
+              <a:spcAft>
+                <a:spcPts val="600"/>
+              </a:spcAft>
+            </a:pPr>
+            <a:fld id="{B9713C8C-8E70-45D5-AE59-23E60168254E}" type="slidenum">
+              <a:rPr lang="en-US" smtClean="0"/>
+              <a:pPr>
+                <a:spcAft>
+                  <a:spcPts val="600"/>
+                </a:spcAft>
+              </a:pPr>
+              <a:t>20</a:t>
+            </a:fld>
+            <a:endParaRPr lang="en-US"/>
+          </a:p>
+        </p:txBody>
+      </p:sp>
+    </p:spTree>
+    <p:extLst>
+      <p:ext uri="{BB962C8B-B14F-4D97-AF65-F5344CB8AC3E}">
+        <p14:creationId xmlns:p14="http://schemas.microsoft.com/office/powerpoint/2010/main" val="2420767862"/>
       </p:ext>
     </p:extLst>
   </p:cSld>
@@ -41028,7 +41513,10 @@
             </a:r>
           </a:p>
           <a:p>
-            <a:endParaRPr lang="en-US" sz="1800" dirty="0"/>
+            <a:r>
+              <a:rPr lang="en-US" sz="1800" dirty="0"/>
+              <a:t>In our exploratory data analysis, we’ll be exploring details about what Netflix has available in different categories across the board.</a:t>
+            </a:r>
           </a:p>
         </p:txBody>
       </p:sp>
@@ -41321,6 +41809,251 @@
       </p:grpSpPr>
       <p:sp>
         <p:nvSpPr>
+          <p:cNvPr id="15" name="Title 1">
+            <a:extLst>
+              <a:ext uri="{FF2B5EF4-FFF2-40B4-BE49-F238E27FC236}">
+                <a16:creationId xmlns:a16="http://schemas.microsoft.com/office/drawing/2014/main" id="{87A0A042-FEA8-3A41-EFB5-69EBF531FDE5}"/>
+              </a:ext>
+            </a:extLst>
+          </p:cNvPr>
+          <p:cNvSpPr>
+            <a:spLocks noGrp="1"/>
+          </p:cNvSpPr>
+          <p:nvPr>
+            <p:ph type="title"/>
+          </p:nvPr>
+        </p:nvSpPr>
+        <p:spPr>
+          <a:xfrm>
+            <a:off x="838200" y="365125"/>
+            <a:ext cx="10515600" cy="1325563"/>
+          </a:xfrm>
+        </p:spPr>
+        <p:txBody>
+          <a:bodyPr/>
+          <a:lstStyle/>
+          <a:p>
+            <a:r>
+              <a:rPr lang="en-US" dirty="0"/>
+              <a:t>Before and After Data Clean-up</a:t>
+            </a:r>
+          </a:p>
+        </p:txBody>
+      </p:sp>
+      <p:pic>
+        <p:nvPicPr>
+          <p:cNvPr id="6" name="Picture 5" descr="Chart, pie chart&#10;&#10;Description automatically generated">
+            <a:extLst>
+              <a:ext uri="{FF2B5EF4-FFF2-40B4-BE49-F238E27FC236}">
+                <a16:creationId xmlns:a16="http://schemas.microsoft.com/office/drawing/2014/main" id="{A9E9B182-3741-43BB-A142-74EE2FF97891}"/>
+              </a:ext>
+            </a:extLst>
+          </p:cNvPr>
+          <p:cNvPicPr>
+            <a:picLocks noChangeAspect="1"/>
+          </p:cNvPicPr>
+          <p:nvPr/>
+        </p:nvPicPr>
+        <p:blipFill>
+          <a:blip r:embed="rId2"/>
+          <a:stretch>
+            <a:fillRect/>
+          </a:stretch>
+        </p:blipFill>
+        <p:spPr>
+          <a:xfrm>
+            <a:off x="1228697" y="1690688"/>
+            <a:ext cx="5121807" cy="5121807"/>
+          </a:xfrm>
+          <a:prstGeom prst="rect">
+            <a:avLst/>
+          </a:prstGeom>
+          <a:noFill/>
+        </p:spPr>
+      </p:pic>
+      <p:pic>
+        <p:nvPicPr>
+          <p:cNvPr id="7" name="Picture 6" descr="Chart, pie chart&#10;&#10;Description automatically generated">
+            <a:extLst>
+              <a:ext uri="{FF2B5EF4-FFF2-40B4-BE49-F238E27FC236}">
+                <a16:creationId xmlns:a16="http://schemas.microsoft.com/office/drawing/2014/main" id="{0F7AD724-8038-4CBF-9B55-8B9500562E90}"/>
+              </a:ext>
+            </a:extLst>
+          </p:cNvPr>
+          <p:cNvPicPr>
+            <a:picLocks noChangeAspect="1"/>
+          </p:cNvPicPr>
+          <p:nvPr/>
+        </p:nvPicPr>
+        <p:blipFill>
+          <a:blip r:embed="rId3"/>
+          <a:stretch>
+            <a:fillRect/>
+          </a:stretch>
+        </p:blipFill>
+        <p:spPr>
+          <a:xfrm>
+            <a:off x="6807704" y="1462616"/>
+            <a:ext cx="5121807" cy="5121807"/>
+          </a:xfrm>
+          <a:prstGeom prst="rect">
+            <a:avLst/>
+          </a:prstGeom>
+          <a:noFill/>
+        </p:spPr>
+      </p:pic>
+      <p:sp>
+        <p:nvSpPr>
+          <p:cNvPr id="17" name="Date Placeholder 4">
+            <a:extLst>
+              <a:ext uri="{FF2B5EF4-FFF2-40B4-BE49-F238E27FC236}">
+                <a16:creationId xmlns:a16="http://schemas.microsoft.com/office/drawing/2014/main" id="{5B56281B-EC47-3351-3BF6-1528E2DB5DE0}"/>
+              </a:ext>
+            </a:extLst>
+          </p:cNvPr>
+          <p:cNvSpPr>
+            <a:spLocks noGrp="1"/>
+          </p:cNvSpPr>
+          <p:nvPr>
+            <p:ph type="dt" sz="half" idx="10"/>
+          </p:nvPr>
+        </p:nvSpPr>
+        <p:spPr>
+          <a:xfrm>
+            <a:off x="838200" y="6356350"/>
+            <a:ext cx="2743200" cy="365125"/>
+          </a:xfrm>
+        </p:spPr>
+        <p:txBody>
+          <a:bodyPr/>
+          <a:lstStyle/>
+          <a:p>
+            <a:pPr>
+              <a:spcAft>
+                <a:spcPts val="600"/>
+              </a:spcAft>
+            </a:pPr>
+            <a:r>
+              <a:rPr lang="en-US" dirty="0"/>
+              <a:t>4/29/2022</a:t>
+            </a:r>
+          </a:p>
+        </p:txBody>
+      </p:sp>
+      <p:sp>
+        <p:nvSpPr>
+          <p:cNvPr id="19" name="Footer Placeholder 5">
+            <a:extLst>
+              <a:ext uri="{FF2B5EF4-FFF2-40B4-BE49-F238E27FC236}">
+                <a16:creationId xmlns:a16="http://schemas.microsoft.com/office/drawing/2014/main" id="{99E76F9A-64BA-0776-9E18-53A1C38E15D8}"/>
+              </a:ext>
+            </a:extLst>
+          </p:cNvPr>
+          <p:cNvSpPr>
+            <a:spLocks noGrp="1"/>
+          </p:cNvSpPr>
+          <p:nvPr>
+            <p:ph type="ftr" sz="quarter" idx="11"/>
+          </p:nvPr>
+        </p:nvSpPr>
+        <p:spPr>
+          <a:xfrm>
+            <a:off x="4038600" y="6356350"/>
+            <a:ext cx="4114800" cy="365125"/>
+          </a:xfrm>
+        </p:spPr>
+        <p:txBody>
+          <a:bodyPr/>
+          <a:lstStyle/>
+          <a:p>
+            <a:pPr>
+              <a:spcAft>
+                <a:spcPts val="600"/>
+              </a:spcAft>
+            </a:pPr>
+            <a:r>
+              <a:rPr lang="en-US" dirty="0"/>
+              <a:t>Netflix</a:t>
+            </a:r>
+          </a:p>
+        </p:txBody>
+      </p:sp>
+      <p:sp>
+        <p:nvSpPr>
+          <p:cNvPr id="21" name="Slide Number Placeholder 6">
+            <a:extLst>
+              <a:ext uri="{FF2B5EF4-FFF2-40B4-BE49-F238E27FC236}">
+                <a16:creationId xmlns:a16="http://schemas.microsoft.com/office/drawing/2014/main" id="{C6DF1FFF-F579-985C-AD10-0C47010A08C6}"/>
+              </a:ext>
+            </a:extLst>
+          </p:cNvPr>
+          <p:cNvSpPr>
+            <a:spLocks noGrp="1"/>
+          </p:cNvSpPr>
+          <p:nvPr>
+            <p:ph type="sldNum" sz="quarter" idx="12"/>
+          </p:nvPr>
+        </p:nvSpPr>
+        <p:spPr>
+          <a:xfrm>
+            <a:off x="8610600" y="6356350"/>
+            <a:ext cx="2743200" cy="365125"/>
+          </a:xfrm>
+        </p:spPr>
+        <p:txBody>
+          <a:bodyPr/>
+          <a:lstStyle/>
+          <a:p>
+            <a:pPr>
+              <a:spcAft>
+                <a:spcPts val="600"/>
+              </a:spcAft>
+            </a:pPr>
+            <a:fld id="{B9713C8C-8E70-45D5-AE59-23E60168254E}" type="slidenum">
+              <a:rPr lang="en-US" smtClean="0"/>
+              <a:pPr>
+                <a:spcAft>
+                  <a:spcPts val="600"/>
+                </a:spcAft>
+              </a:pPr>
+              <a:t>8</a:t>
+            </a:fld>
+            <a:endParaRPr lang="en-US"/>
+          </a:p>
+        </p:txBody>
+      </p:sp>
+    </p:spTree>
+    <p:extLst>
+      <p:ext uri="{BB962C8B-B14F-4D97-AF65-F5344CB8AC3E}">
+        <p14:creationId xmlns:p14="http://schemas.microsoft.com/office/powerpoint/2010/main" val="1571354348"/>
+      </p:ext>
+    </p:extLst>
+  </p:cSld>
+  <p:clrMapOvr>
+    <a:masterClrMapping/>
+  </p:clrMapOvr>
+</p:sld>
+</file>
+
+<file path=ppt/slides/slide9.xml><?xml version="1.0" encoding="utf-8"?>
+<p:sld xmlns:a="http://schemas.openxmlformats.org/drawingml/2006/main" xmlns:r="http://schemas.openxmlformats.org/officeDocument/2006/relationships" xmlns:p="http://schemas.openxmlformats.org/presentationml/2006/main">
+  <p:cSld>
+    <p:spTree>
+      <p:nvGrpSpPr>
+        <p:cNvPr id="1" name=""/>
+        <p:cNvGrpSpPr/>
+        <p:nvPr/>
+      </p:nvGrpSpPr>
+      <p:grpSpPr>
+        <a:xfrm>
+          <a:off x="0" y="0"/>
+          <a:ext cx="0" cy="0"/>
+          <a:chOff x="0" y="0"/>
+          <a:chExt cx="0" cy="0"/>
+        </a:xfrm>
+      </p:grpSpPr>
+      <p:sp>
+        <p:nvSpPr>
           <p:cNvPr id="5" name="Subtitle 4">
             <a:extLst>
               <a:ext uri="{FF2B5EF4-FFF2-40B4-BE49-F238E27FC236}">
@@ -41376,323 +42109,6 @@
     <p:extLst>
       <p:ext uri="{BB962C8B-B14F-4D97-AF65-F5344CB8AC3E}">
         <p14:creationId xmlns:p14="http://schemas.microsoft.com/office/powerpoint/2010/main" val="149221881"/>
-      </p:ext>
-    </p:extLst>
-  </p:cSld>
-  <p:clrMapOvr>
-    <a:masterClrMapping/>
-  </p:clrMapOvr>
-</p:sld>
-</file>
-
-<file path=ppt/slides/slide9.xml><?xml version="1.0" encoding="utf-8"?>
-<p:sld xmlns:a="http://schemas.openxmlformats.org/drawingml/2006/main" xmlns:r="http://schemas.openxmlformats.org/officeDocument/2006/relationships" xmlns:p="http://schemas.openxmlformats.org/presentationml/2006/main">
-  <p:cSld>
-    <p:spTree>
-      <p:nvGrpSpPr>
-        <p:cNvPr id="1" name=""/>
-        <p:cNvGrpSpPr/>
-        <p:nvPr/>
-      </p:nvGrpSpPr>
-      <p:grpSpPr>
-        <a:xfrm>
-          <a:off x="0" y="0"/>
-          <a:ext cx="0" cy="0"/>
-          <a:chOff x="0" y="0"/>
-          <a:chExt cx="0" cy="0"/>
-        </a:xfrm>
-      </p:grpSpPr>
-      <p:sp>
-        <p:nvSpPr>
-          <p:cNvPr id="2" name="Title 1">
-            <a:extLst>
-              <a:ext uri="{FF2B5EF4-FFF2-40B4-BE49-F238E27FC236}">
-                <a16:creationId xmlns:a16="http://schemas.microsoft.com/office/drawing/2014/main" id="{6D602820-7F02-4F5F-8933-C0B61CFA2E08}"/>
-              </a:ext>
-            </a:extLst>
-          </p:cNvPr>
-          <p:cNvSpPr>
-            <a:spLocks noGrp="1"/>
-          </p:cNvSpPr>
-          <p:nvPr>
-            <p:ph type="title"/>
-          </p:nvPr>
-        </p:nvSpPr>
-        <p:spPr>
-          <a:xfrm>
-            <a:off x="838200" y="365125"/>
-            <a:ext cx="10515600" cy="1325563"/>
-          </a:xfrm>
-        </p:spPr>
-        <p:txBody>
-          <a:bodyPr anchor="ctr">
-            <a:normAutofit/>
-          </a:bodyPr>
-          <a:lstStyle/>
-          <a:p>
-            <a:r>
-              <a:rPr lang="en-US" dirty="0"/>
-              <a:t>Percentages of</a:t>
-            </a:r>
-          </a:p>
-        </p:txBody>
-      </p:sp>
-      <p:sp>
-        <p:nvSpPr>
-          <p:cNvPr id="46" name="Text Placeholder 2">
-            <a:extLst>
-              <a:ext uri="{FF2B5EF4-FFF2-40B4-BE49-F238E27FC236}">
-                <a16:creationId xmlns:a16="http://schemas.microsoft.com/office/drawing/2014/main" id="{E35F34B1-55CF-2AA3-8AC6-949E3396103C}"/>
-              </a:ext>
-            </a:extLst>
-          </p:cNvPr>
-          <p:cNvSpPr>
-            <a:spLocks noGrp="1"/>
-          </p:cNvSpPr>
-          <p:nvPr>
-            <p:ph type="body" idx="1"/>
-          </p:nvPr>
-        </p:nvSpPr>
-        <p:spPr>
-          <a:xfrm>
-            <a:off x="839788" y="1614120"/>
-            <a:ext cx="4937760" cy="950976"/>
-          </a:xfrm>
-        </p:spPr>
-        <p:txBody>
-          <a:bodyPr/>
-          <a:lstStyle/>
-          <a:p>
-            <a:r>
-              <a:rPr lang="en-US" dirty="0"/>
-              <a:t>Content types</a:t>
-            </a:r>
-          </a:p>
-        </p:txBody>
-      </p:sp>
-      <p:pic>
-        <p:nvPicPr>
-          <p:cNvPr id="37" name="Content Placeholder 36" descr="A picture containing pie chart&#10;&#10;Description automatically generated">
-            <a:extLst>
-              <a:ext uri="{FF2B5EF4-FFF2-40B4-BE49-F238E27FC236}">
-                <a16:creationId xmlns:a16="http://schemas.microsoft.com/office/drawing/2014/main" id="{4A9C06AE-8973-40F1-B860-BAEFCC9CDC4E}"/>
-              </a:ext>
-            </a:extLst>
-          </p:cNvPr>
-          <p:cNvPicPr>
-            <a:picLocks noGrp="1" noChangeAspect="1"/>
-          </p:cNvPicPr>
-          <p:nvPr>
-            <p:ph sz="half" idx="2"/>
-          </p:nvPr>
-        </p:nvPicPr>
-        <p:blipFill>
-          <a:blip r:embed="rId2"/>
-          <a:stretch>
-            <a:fillRect/>
-          </a:stretch>
-        </p:blipFill>
-        <p:spPr>
-          <a:xfrm>
-            <a:off x="1777048" y="2194624"/>
-            <a:ext cx="3995864" cy="3995864"/>
-          </a:xfrm>
-          <a:noFill/>
-        </p:spPr>
-      </p:pic>
-      <p:sp>
-        <p:nvSpPr>
-          <p:cNvPr id="48" name="Text Placeholder 4">
-            <a:extLst>
-              <a:ext uri="{FF2B5EF4-FFF2-40B4-BE49-F238E27FC236}">
-                <a16:creationId xmlns:a16="http://schemas.microsoft.com/office/drawing/2014/main" id="{5776AB68-59B6-875F-6C60-0C2D9EB6B761}"/>
-              </a:ext>
-            </a:extLst>
-          </p:cNvPr>
-          <p:cNvSpPr>
-            <a:spLocks noGrp="1"/>
-          </p:cNvSpPr>
-          <p:nvPr>
-            <p:ph type="body" sz="quarter" idx="3"/>
-          </p:nvPr>
-        </p:nvSpPr>
-        <p:spPr>
-          <a:xfrm>
-            <a:off x="6419088" y="1614120"/>
-            <a:ext cx="4937760" cy="950976"/>
-          </a:xfrm>
-        </p:spPr>
-        <p:txBody>
-          <a:bodyPr/>
-          <a:lstStyle/>
-          <a:p>
-            <a:r>
-              <a:rPr lang="en-US" dirty="0"/>
-              <a:t>Rating types</a:t>
-            </a:r>
-          </a:p>
-        </p:txBody>
-      </p:sp>
-      <p:pic>
-        <p:nvPicPr>
-          <p:cNvPr id="41" name="Content Placeholder 40" descr="Chart, pie chart&#10;&#10;Description automatically generated">
-            <a:extLst>
-              <a:ext uri="{FF2B5EF4-FFF2-40B4-BE49-F238E27FC236}">
-                <a16:creationId xmlns:a16="http://schemas.microsoft.com/office/drawing/2014/main" id="{D67CA551-B856-4FBC-9D20-BD732A0DDDE5}"/>
-              </a:ext>
-            </a:extLst>
-          </p:cNvPr>
-          <p:cNvPicPr>
-            <a:picLocks noGrp="1" noChangeAspect="1"/>
-          </p:cNvPicPr>
-          <p:nvPr>
-            <p:ph sz="quarter" idx="4"/>
-          </p:nvPr>
-        </p:nvPicPr>
-        <p:blipFill>
-          <a:blip r:embed="rId3"/>
-          <a:stretch>
-            <a:fillRect/>
-          </a:stretch>
-        </p:blipFill>
-        <p:spPr>
-          <a:xfrm>
-            <a:off x="7356348" y="2194624"/>
-            <a:ext cx="3995864" cy="3995864"/>
-          </a:xfrm>
-          <a:noFill/>
-        </p:spPr>
-      </p:pic>
-      <p:sp>
-        <p:nvSpPr>
-          <p:cNvPr id="4" name="Date Placeholder 5">
-            <a:extLst>
-              <a:ext uri="{FF2B5EF4-FFF2-40B4-BE49-F238E27FC236}">
-                <a16:creationId xmlns:a16="http://schemas.microsoft.com/office/drawing/2014/main" id="{523A727A-BD22-42EE-9500-BBEF455DA5DE}"/>
-              </a:ext>
-            </a:extLst>
-          </p:cNvPr>
-          <p:cNvSpPr>
-            <a:spLocks noGrp="1"/>
-          </p:cNvSpPr>
-          <p:nvPr>
-            <p:ph type="dt" sz="half" idx="10"/>
-          </p:nvPr>
-        </p:nvSpPr>
-        <p:spPr>
-          <a:xfrm>
-            <a:off x="838200" y="6356350"/>
-            <a:ext cx="2743200" cy="365125"/>
-          </a:xfrm>
-        </p:spPr>
-        <p:txBody>
-          <a:bodyPr anchor="ctr">
-            <a:normAutofit/>
-          </a:bodyPr>
-          <a:lstStyle/>
-          <a:p>
-            <a:pPr>
-              <a:spcAft>
-                <a:spcPts val="600"/>
-              </a:spcAft>
-            </a:pPr>
-            <a:r>
-              <a:rPr lang="en-US" dirty="0"/>
-              <a:t>9/3/20XX</a:t>
-            </a:r>
-          </a:p>
-        </p:txBody>
-      </p:sp>
-      <p:sp>
-        <p:nvSpPr>
-          <p:cNvPr id="5" name="Footer Placeholder 6">
-            <a:extLst>
-              <a:ext uri="{FF2B5EF4-FFF2-40B4-BE49-F238E27FC236}">
-                <a16:creationId xmlns:a16="http://schemas.microsoft.com/office/drawing/2014/main" id="{D00329E9-36A4-4FA9-9FBD-412BCEF20954}"/>
-              </a:ext>
-            </a:extLst>
-          </p:cNvPr>
-          <p:cNvSpPr>
-            <a:spLocks noGrp="1"/>
-          </p:cNvSpPr>
-          <p:nvPr>
-            <p:ph type="ftr" sz="quarter" idx="11"/>
-          </p:nvPr>
-        </p:nvSpPr>
-        <p:spPr>
-          <a:xfrm>
-            <a:off x="4038600" y="6356350"/>
-            <a:ext cx="4114800" cy="365125"/>
-          </a:xfrm>
-        </p:spPr>
-        <p:txBody>
-          <a:bodyPr anchor="ctr">
-            <a:normAutofit/>
-          </a:bodyPr>
-          <a:lstStyle/>
-          <a:p>
-            <a:pPr>
-              <a:spcAft>
-                <a:spcPts val="600"/>
-              </a:spcAft>
-            </a:pPr>
-            <a:r>
-              <a:rPr lang="en-US"/>
-              <a:t>Presentation Title</a:t>
-            </a:r>
-          </a:p>
-        </p:txBody>
-      </p:sp>
-      <p:sp>
-        <p:nvSpPr>
-          <p:cNvPr id="7" name="Slide Number Placeholder 7">
-            <a:extLst>
-              <a:ext uri="{FF2B5EF4-FFF2-40B4-BE49-F238E27FC236}">
-                <a16:creationId xmlns:a16="http://schemas.microsoft.com/office/drawing/2014/main" id="{F13D5288-11C4-425C-8C20-5E8A7E726773}"/>
-              </a:ext>
-            </a:extLst>
-          </p:cNvPr>
-          <p:cNvSpPr>
-            <a:spLocks noGrp="1"/>
-          </p:cNvSpPr>
-          <p:nvPr>
-            <p:ph type="sldNum" sz="quarter" idx="12"/>
-          </p:nvPr>
-        </p:nvSpPr>
-        <p:spPr>
-          <a:xfrm>
-            <a:off x="8610600" y="6356350"/>
-            <a:ext cx="2743200" cy="365125"/>
-          </a:xfrm>
-        </p:spPr>
-        <p:txBody>
-          <a:bodyPr anchor="ctr">
-            <a:normAutofit/>
-          </a:bodyPr>
-          <a:lstStyle/>
-          <a:p>
-            <a:pPr>
-              <a:spcAft>
-                <a:spcPts val="600"/>
-              </a:spcAft>
-            </a:pPr>
-            <a:fld id="{590024A9-0184-448B-881E-CC722A916CB1}" type="slidenum">
-              <a:rPr lang="en-US" smtClean="0"/>
-              <a:pPr>
-                <a:spcAft>
-                  <a:spcPts val="600"/>
-                </a:spcAft>
-              </a:pPr>
-              <a:t>9</a:t>
-            </a:fld>
-            <a:endParaRPr lang="en-US"/>
-          </a:p>
-        </p:txBody>
-      </p:sp>
-    </p:spTree>
-    <p:extLst>
-      <p:ext uri="{BB962C8B-B14F-4D97-AF65-F5344CB8AC3E}">
-        <p14:creationId xmlns:p14="http://schemas.microsoft.com/office/powerpoint/2010/main" val="4093317005"/>
       </p:ext>
     </p:extLst>
   </p:cSld>

</xml_diff>

<commit_message>
More updates/edits to powerpoint
</commit_message>
<xml_diff>
--- a/Project_1.pptx
+++ b/Project_1.pptx
@@ -5,7 +5,7 @@
     <p:sldMasterId id="2147483733" r:id="rId4"/>
   </p:sldMasterIdLst>
   <p:notesMasterIdLst>
-    <p:notesMasterId r:id="rId27"/>
+    <p:notesMasterId r:id="rId25"/>
   </p:notesMasterIdLst>
   <p:sldIdLst>
     <p:sldId id="401" r:id="rId5"/>
@@ -25,11 +25,9 @@
     <p:sldId id="425" r:id="rId19"/>
     <p:sldId id="420" r:id="rId20"/>
     <p:sldId id="422" r:id="rId21"/>
-    <p:sldId id="405" r:id="rId22"/>
+    <p:sldId id="408" r:id="rId22"/>
     <p:sldId id="427" r:id="rId23"/>
-    <p:sldId id="408" r:id="rId24"/>
-    <p:sldId id="428" r:id="rId25"/>
-    <p:sldId id="409" r:id="rId26"/>
+    <p:sldId id="409" r:id="rId24"/>
   </p:sldIdLst>
   <p:sldSz cx="12192000" cy="6858000"/>
   <p:notesSz cx="6858000" cy="9144000"/>
@@ -154,10 +152,8 @@
             <p14:sldId id="425"/>
             <p14:sldId id="420"/>
             <p14:sldId id="422"/>
-            <p14:sldId id="405"/>
+            <p14:sldId id="408"/>
             <p14:sldId id="427"/>
-            <p14:sldId id="408"/>
-            <p14:sldId id="428"/>
             <p14:sldId id="409"/>
           </p14:sldIdLst>
         </p14:section>
@@ -200,7 +196,7 @@
 <file path=ppt/revisionInfo.xml><?xml version="1.0" encoding="utf-8"?>
 <p1510:revInfo xmlns:a="http://schemas.openxmlformats.org/drawingml/2006/main" xmlns:r="http://schemas.openxmlformats.org/officeDocument/2006/relationships" xmlns:p1510="http://schemas.microsoft.com/office/powerpoint/2015/10/main">
   <p1510:revLst>
-    <p1510:client id="{F777C335-4339-49C5-8275-414B08422B2B}" v="12" dt="2022-04-29T15:00:13.767"/>
+    <p1510:client id="{F777C335-4339-49C5-8275-414B08422B2B}" v="13" dt="2022-04-29T16:28:49.380"/>
   </p1510:revLst>
 </p1510:revInfo>
 </file>
@@ -210,12 +206,12 @@
   <pc:docChgLst>
     <pc:chgData name="Stefanie Gagnon" userId="f874ef52da13a6b2" providerId="LiveId" clId="{F777C335-4339-49C5-8275-414B08422B2B}"/>
     <pc:docChg chg="undo custSel addSld delSld modSld sldOrd modSection">
-      <pc:chgData name="Stefanie Gagnon" userId="f874ef52da13a6b2" providerId="LiveId" clId="{F777C335-4339-49C5-8275-414B08422B2B}" dt="2022-04-29T15:17:01.031" v="1598" actId="33524"/>
+      <pc:chgData name="Stefanie Gagnon" userId="f874ef52da13a6b2" providerId="LiveId" clId="{F777C335-4339-49C5-8275-414B08422B2B}" dt="2022-04-29T16:48:52.330" v="2292" actId="20577"/>
       <pc:docMkLst>
         <pc:docMk/>
       </pc:docMkLst>
-      <pc:sldChg chg="modSp mod">
-        <pc:chgData name="Stefanie Gagnon" userId="f874ef52da13a6b2" providerId="LiveId" clId="{F777C335-4339-49C5-8275-414B08422B2B}" dt="2022-04-29T14:28:05.234" v="1125" actId="20577"/>
+      <pc:sldChg chg="modSp mod modNotesTx">
+        <pc:chgData name="Stefanie Gagnon" userId="f874ef52da13a6b2" providerId="LiveId" clId="{F777C335-4339-49C5-8275-414B08422B2B}" dt="2022-04-29T16:19:58.111" v="1739" actId="20577"/>
         <pc:sldMkLst>
           <pc:docMk/>
           <pc:sldMk cId="4093317005" sldId="396"/>
@@ -236,6 +232,13 @@
             <ac:spMk id="5" creationId="{D00329E9-36A4-4FA9-9FBD-412BCEF20954}"/>
           </ac:spMkLst>
         </pc:spChg>
+      </pc:sldChg>
+      <pc:sldChg chg="modNotesTx">
+        <pc:chgData name="Stefanie Gagnon" userId="f874ef52da13a6b2" providerId="LiveId" clId="{F777C335-4339-49C5-8275-414B08422B2B}" dt="2022-04-29T16:22:49.069" v="1930" actId="20577"/>
+        <pc:sldMkLst>
+          <pc:docMk/>
+          <pc:sldMk cId="1497105360" sldId="397"/>
+        </pc:sldMkLst>
       </pc:sldChg>
       <pc:sldChg chg="modSp mod">
         <pc:chgData name="Stefanie Gagnon" userId="f874ef52da13a6b2" providerId="LiveId" clId="{F777C335-4339-49C5-8275-414B08422B2B}" dt="2022-04-29T15:17:01.031" v="1598" actId="33524"/>
@@ -304,6 +307,13 @@
         <pc:sldMkLst>
           <pc:docMk/>
           <pc:sldMk cId="1633727740" sldId="404"/>
+        </pc:sldMkLst>
+      </pc:sldChg>
+      <pc:sldChg chg="del">
+        <pc:chgData name="Stefanie Gagnon" userId="f874ef52da13a6b2" providerId="LiveId" clId="{F777C335-4339-49C5-8275-414B08422B2B}" dt="2022-04-29T16:24:18.864" v="1998" actId="47"/>
+        <pc:sldMkLst>
+          <pc:docMk/>
+          <pc:sldMk cId="3079534048" sldId="405"/>
         </pc:sldMkLst>
       </pc:sldChg>
       <pc:sldChg chg="addSp delSp modSp mod">
@@ -448,6 +458,44 @@
             <ac:picMk id="25" creationId="{08A04BB6-2617-4F5F-9059-FD458259864C}"/>
           </ac:picMkLst>
         </pc:picChg>
+      </pc:sldChg>
+      <pc:sldChg chg="modSp mod">
+        <pc:chgData name="Stefanie Gagnon" userId="f874ef52da13a6b2" providerId="LiveId" clId="{F777C335-4339-49C5-8275-414B08422B2B}" dt="2022-04-29T16:48:52.330" v="2292" actId="20577"/>
+        <pc:sldMkLst>
+          <pc:docMk/>
+          <pc:sldMk cId="3958427157" sldId="408"/>
+        </pc:sldMkLst>
+        <pc:spChg chg="mod">
+          <ac:chgData name="Stefanie Gagnon" userId="f874ef52da13a6b2" providerId="LiveId" clId="{F777C335-4339-49C5-8275-414B08422B2B}" dt="2022-04-29T16:48:52.330" v="2292" actId="20577"/>
+          <ac:spMkLst>
+            <pc:docMk/>
+            <pc:sldMk cId="3958427157" sldId="408"/>
+            <ac:spMk id="10" creationId="{8751E420-B483-4040-8E33-A32E82D74E33}"/>
+          </ac:spMkLst>
+        </pc:spChg>
+      </pc:sldChg>
+      <pc:sldChg chg="modSp mod">
+        <pc:chgData name="Stefanie Gagnon" userId="f874ef52da13a6b2" providerId="LiveId" clId="{F777C335-4339-49C5-8275-414B08422B2B}" dt="2022-04-29T16:48:11.540" v="2258" actId="20577"/>
+        <pc:sldMkLst>
+          <pc:docMk/>
+          <pc:sldMk cId="2420767862" sldId="409"/>
+        </pc:sldMkLst>
+        <pc:spChg chg="mod">
+          <ac:chgData name="Stefanie Gagnon" userId="f874ef52da13a6b2" providerId="LiveId" clId="{F777C335-4339-49C5-8275-414B08422B2B}" dt="2022-04-29T16:47:46.342" v="2249" actId="1076"/>
+          <ac:spMkLst>
+            <pc:docMk/>
+            <pc:sldMk cId="2420767862" sldId="409"/>
+            <ac:spMk id="4" creationId="{8CA6E381-7CDD-4999-B9C7-CD31E749FD95}"/>
+          </ac:spMkLst>
+        </pc:spChg>
+        <pc:spChg chg="mod">
+          <ac:chgData name="Stefanie Gagnon" userId="f874ef52da13a6b2" providerId="LiveId" clId="{F777C335-4339-49C5-8275-414B08422B2B}" dt="2022-04-29T16:48:11.540" v="2258" actId="20577"/>
+          <ac:spMkLst>
+            <pc:docMk/>
+            <pc:sldMk cId="2420767862" sldId="409"/>
+            <ac:spMk id="26" creationId="{EADA098B-F015-5FF4-2A19-2D32BD753ECC}"/>
+          </ac:spMkLst>
+        </pc:spChg>
       </pc:sldChg>
       <pc:sldChg chg="del">
         <pc:chgData name="Stefanie Gagnon" userId="f874ef52da13a6b2" providerId="LiveId" clId="{F777C335-4339-49C5-8275-414B08422B2B}" dt="2022-04-28T23:15:22.179" v="68" actId="47"/>
@@ -618,12 +666,36 @@
           <pc:sldMk cId="3425695329" sldId="421"/>
         </pc:sldMkLst>
       </pc:sldChg>
-      <pc:sldChg chg="modNotesTx">
-        <pc:chgData name="Stefanie Gagnon" userId="f874ef52da13a6b2" providerId="LiveId" clId="{F777C335-4339-49C5-8275-414B08422B2B}" dt="2022-04-29T02:09:52.087" v="549" actId="20577"/>
+      <pc:sldChg chg="addSp modSp mod modNotesTx">
+        <pc:chgData name="Stefanie Gagnon" userId="f874ef52da13a6b2" providerId="LiveId" clId="{F777C335-4339-49C5-8275-414B08422B2B}" dt="2022-04-29T16:30:36.852" v="2248" actId="20577"/>
         <pc:sldMkLst>
           <pc:docMk/>
           <pc:sldMk cId="236167648" sldId="422"/>
         </pc:sldMkLst>
+        <pc:spChg chg="add mod">
+          <ac:chgData name="Stefanie Gagnon" userId="f874ef52da13a6b2" providerId="LiveId" clId="{F777C335-4339-49C5-8275-414B08422B2B}" dt="2022-04-29T16:29:49.227" v="2219" actId="255"/>
+          <ac:spMkLst>
+            <pc:docMk/>
+            <pc:sldMk cId="236167648" sldId="422"/>
+            <ac:spMk id="3" creationId="{3A174422-E1A6-41C2-9ECF-72D890863E1D}"/>
+          </ac:spMkLst>
+        </pc:spChg>
+        <pc:spChg chg="mod">
+          <ac:chgData name="Stefanie Gagnon" userId="f874ef52da13a6b2" providerId="LiveId" clId="{F777C335-4339-49C5-8275-414B08422B2B}" dt="2022-04-29T16:30:22.487" v="2228" actId="20577"/>
+          <ac:spMkLst>
+            <pc:docMk/>
+            <pc:sldMk cId="236167648" sldId="422"/>
+            <ac:spMk id="4" creationId="{F4E12042-95BD-43FA-AC29-449B3AEDB4E3}"/>
+          </ac:spMkLst>
+        </pc:spChg>
+        <pc:spChg chg="mod">
+          <ac:chgData name="Stefanie Gagnon" userId="f874ef52da13a6b2" providerId="LiveId" clId="{F777C335-4339-49C5-8275-414B08422B2B}" dt="2022-04-29T16:30:36.852" v="2248" actId="20577"/>
+          <ac:spMkLst>
+            <pc:docMk/>
+            <pc:sldMk cId="236167648" sldId="422"/>
+            <ac:spMk id="5" creationId="{E45EACE6-95E1-43CA-BF8E-3C66DA81B333}"/>
+          </ac:spMkLst>
+        </pc:spChg>
       </pc:sldChg>
       <pc:sldChg chg="modSp mod modNotesTx">
         <pc:chgData name="Stefanie Gagnon" userId="f874ef52da13a6b2" providerId="LiveId" clId="{F777C335-4339-49C5-8275-414B08422B2B}" dt="2022-04-29T02:09:07.028" v="409" actId="20577"/>
@@ -641,7 +713,7 @@
         </pc:picChg>
       </pc:sldChg>
       <pc:sldChg chg="modSp mod">
-        <pc:chgData name="Stefanie Gagnon" userId="f874ef52da13a6b2" providerId="LiveId" clId="{F777C335-4339-49C5-8275-414B08422B2B}" dt="2022-04-28T23:12:36.256" v="63" actId="20577"/>
+        <pc:chgData name="Stefanie Gagnon" userId="f874ef52da13a6b2" providerId="LiveId" clId="{F777C335-4339-49C5-8275-414B08422B2B}" dt="2022-04-29T16:21:28.011" v="1756" actId="20577"/>
         <pc:sldMkLst>
           <pc:docMk/>
           <pc:sldMk cId="898263839" sldId="424"/>
@@ -652,6 +724,22 @@
             <pc:docMk/>
             <pc:sldMk cId="898263839" sldId="424"/>
             <ac:spMk id="2" creationId="{6D602820-7F02-4F5F-8933-C0B61CFA2E08}"/>
+          </ac:spMkLst>
+        </pc:spChg>
+        <pc:spChg chg="mod">
+          <ac:chgData name="Stefanie Gagnon" userId="f874ef52da13a6b2" providerId="LiveId" clId="{F777C335-4339-49C5-8275-414B08422B2B}" dt="2022-04-29T16:21:28.011" v="1756" actId="20577"/>
+          <ac:spMkLst>
+            <pc:docMk/>
+            <pc:sldMk cId="898263839" sldId="424"/>
+            <ac:spMk id="4" creationId="{523A727A-BD22-42EE-9500-BBEF455DA5DE}"/>
+          </ac:spMkLst>
+        </pc:spChg>
+        <pc:spChg chg="mod">
+          <ac:chgData name="Stefanie Gagnon" userId="f874ef52da13a6b2" providerId="LiveId" clId="{F777C335-4339-49C5-8275-414B08422B2B}" dt="2022-04-29T16:21:09.973" v="1746" actId="20577"/>
+          <ac:spMkLst>
+            <pc:docMk/>
+            <pc:sldMk cId="898263839" sldId="424"/>
+            <ac:spMk id="5" creationId="{D00329E9-36A4-4FA9-9FBD-412BCEF20954}"/>
           </ac:spMkLst>
         </pc:spChg>
       </pc:sldChg>
@@ -788,6 +876,52 @@
             <ac:picMk id="7" creationId="{0F7AD724-8038-4CBF-9B55-8B9500562E90}"/>
           </ac:picMkLst>
         </pc:picChg>
+      </pc:sldChg>
+      <pc:sldChg chg="modSp mod ord modNotesTx">
+        <pc:chgData name="Stefanie Gagnon" userId="f874ef52da13a6b2" providerId="LiveId" clId="{F777C335-4339-49C5-8275-414B08422B2B}" dt="2022-04-29T16:48:33.825" v="2275" actId="20577"/>
+        <pc:sldMkLst>
+          <pc:docMk/>
+          <pc:sldMk cId="2284775098" sldId="427"/>
+        </pc:sldMkLst>
+        <pc:spChg chg="mod">
+          <ac:chgData name="Stefanie Gagnon" userId="f874ef52da13a6b2" providerId="LiveId" clId="{F777C335-4339-49C5-8275-414B08422B2B}" dt="2022-04-29T16:11:16.043" v="1606" actId="20577"/>
+          <ac:spMkLst>
+            <pc:docMk/>
+            <pc:sldMk cId="2284775098" sldId="427"/>
+            <ac:spMk id="2" creationId="{6CFECE77-7A17-4D27-8F36-82EC388F8C9D}"/>
+          </ac:spMkLst>
+        </pc:spChg>
+        <pc:spChg chg="mod">
+          <ac:chgData name="Stefanie Gagnon" userId="f874ef52da13a6b2" providerId="LiveId" clId="{F777C335-4339-49C5-8275-414B08422B2B}" dt="2022-04-29T16:48:33.825" v="2275" actId="20577"/>
+          <ac:spMkLst>
+            <pc:docMk/>
+            <pc:sldMk cId="2284775098" sldId="427"/>
+            <ac:spMk id="4" creationId="{F4E12042-95BD-43FA-AC29-449B3AEDB4E3}"/>
+          </ac:spMkLst>
+        </pc:spChg>
+        <pc:spChg chg="mod">
+          <ac:chgData name="Stefanie Gagnon" userId="f874ef52da13a6b2" providerId="LiveId" clId="{F777C335-4339-49C5-8275-414B08422B2B}" dt="2022-04-29T16:48:25.007" v="2266" actId="20577"/>
+          <ac:spMkLst>
+            <pc:docMk/>
+            <pc:sldMk cId="2284775098" sldId="427"/>
+            <ac:spMk id="5" creationId="{E45EACE6-95E1-43CA-BF8E-3C66DA81B333}"/>
+          </ac:spMkLst>
+        </pc:spChg>
+        <pc:spChg chg="mod">
+          <ac:chgData name="Stefanie Gagnon" userId="f874ef52da13a6b2" providerId="LiveId" clId="{F777C335-4339-49C5-8275-414B08422B2B}" dt="2022-04-29T16:13:56.501" v="1620" actId="20577"/>
+          <ac:spMkLst>
+            <pc:docMk/>
+            <pc:sldMk cId="2284775098" sldId="427"/>
+            <ac:spMk id="7" creationId="{57A8AF85-E3DB-4752-9A82-60FA201BA9C5}"/>
+          </ac:spMkLst>
+        </pc:spChg>
+      </pc:sldChg>
+      <pc:sldChg chg="del">
+        <pc:chgData name="Stefanie Gagnon" userId="f874ef52da13a6b2" providerId="LiveId" clId="{F777C335-4339-49C5-8275-414B08422B2B}" dt="2022-04-29T16:25:54.495" v="2002" actId="47"/>
+        <pc:sldMkLst>
+          <pc:docMk/>
+          <pc:sldMk cId="311096978" sldId="428"/>
+        </pc:sldMkLst>
       </pc:sldChg>
     </pc:docChg>
   </pc:docChgLst>
@@ -5981,6 +6115,180 @@
           <a:p>
             <a:r>
               <a:rPr lang="en-US" dirty="0"/>
+              <a:t>We may want to take out TV ratings, anything in the Rating types pie chart with TV in front of the rating</a:t>
+            </a:r>
+          </a:p>
+        </p:txBody>
+      </p:sp>
+      <p:sp>
+        <p:nvSpPr>
+          <p:cNvPr id="4" name="Slide Number Placeholder 3"/>
+          <p:cNvSpPr>
+            <a:spLocks noGrp="1"/>
+          </p:cNvSpPr>
+          <p:nvPr>
+            <p:ph type="sldNum" sz="quarter" idx="5"/>
+          </p:nvPr>
+        </p:nvSpPr>
+        <p:spPr/>
+        <p:txBody>
+          <a:bodyPr/>
+          <a:lstStyle/>
+          <a:p>
+            <a:fld id="{0D0EDF81-139F-488C-872B-4720FBA6BF98}" type="slidenum">
+              <a:rPr lang="en-US" smtClean="0"/>
+              <a:t>10</a:t>
+            </a:fld>
+            <a:endParaRPr lang="en-US" dirty="0"/>
+          </a:p>
+        </p:txBody>
+      </p:sp>
+    </p:spTree>
+    <p:extLst>
+      <p:ext uri="{BB962C8B-B14F-4D97-AF65-F5344CB8AC3E}">
+        <p14:creationId xmlns:p14="http://schemas.microsoft.com/office/powerpoint/2010/main" val="3245832074"/>
+      </p:ext>
+    </p:extLst>
+  </p:cSld>
+  <p:clrMapOvr>
+    <a:masterClrMapping/>
+  </p:clrMapOvr>
+</p:notes>
+</file>
+
+<file path=ppt/notesSlides/notesSlide4.xml><?xml version="1.0" encoding="utf-8"?>
+<p:notes xmlns:a="http://schemas.openxmlformats.org/drawingml/2006/main" xmlns:r="http://schemas.openxmlformats.org/officeDocument/2006/relationships" xmlns:p="http://schemas.openxmlformats.org/presentationml/2006/main">
+  <p:cSld>
+    <p:spTree>
+      <p:nvGrpSpPr>
+        <p:cNvPr id="1" name=""/>
+        <p:cNvGrpSpPr/>
+        <p:nvPr/>
+      </p:nvGrpSpPr>
+      <p:grpSpPr>
+        <a:xfrm>
+          <a:off x="0" y="0"/>
+          <a:ext cx="0" cy="0"/>
+          <a:chOff x="0" y="0"/>
+          <a:chExt cx="0" cy="0"/>
+        </a:xfrm>
+      </p:grpSpPr>
+      <p:sp>
+        <p:nvSpPr>
+          <p:cNvPr id="2" name="Slide Image Placeholder 1"/>
+          <p:cNvSpPr>
+            <a:spLocks noGrp="1" noRot="1" noChangeAspect="1"/>
+          </p:cNvSpPr>
+          <p:nvPr>
+            <p:ph type="sldImg"/>
+          </p:nvPr>
+        </p:nvSpPr>
+        <p:spPr/>
+      </p:sp>
+      <p:sp>
+        <p:nvSpPr>
+          <p:cNvPr id="3" name="Notes Placeholder 2"/>
+          <p:cNvSpPr>
+            <a:spLocks noGrp="1"/>
+          </p:cNvSpPr>
+          <p:nvPr>
+            <p:ph type="body" idx="1"/>
+          </p:nvPr>
+        </p:nvSpPr>
+        <p:spPr/>
+        <p:txBody>
+          <a:bodyPr/>
+          <a:lstStyle/>
+          <a:p>
+            <a:r>
+              <a:rPr lang="en-US" dirty="0"/>
+              <a:t>Include one with only movie ratings (since we are focusing more on movie data in our cleaned data)</a:t>
+            </a:r>
+          </a:p>
+        </p:txBody>
+      </p:sp>
+      <p:sp>
+        <p:nvSpPr>
+          <p:cNvPr id="4" name="Slide Number Placeholder 3"/>
+          <p:cNvSpPr>
+            <a:spLocks noGrp="1"/>
+          </p:cNvSpPr>
+          <p:nvPr>
+            <p:ph type="sldNum" sz="quarter" idx="5"/>
+          </p:nvPr>
+        </p:nvSpPr>
+        <p:spPr/>
+        <p:txBody>
+          <a:bodyPr/>
+          <a:lstStyle/>
+          <a:p>
+            <a:fld id="{0D0EDF81-139F-488C-872B-4720FBA6BF98}" type="slidenum">
+              <a:rPr lang="en-US" smtClean="0"/>
+              <a:t>12</a:t>
+            </a:fld>
+            <a:endParaRPr lang="en-US" dirty="0"/>
+          </a:p>
+        </p:txBody>
+      </p:sp>
+    </p:spTree>
+    <p:extLst>
+      <p:ext uri="{BB962C8B-B14F-4D97-AF65-F5344CB8AC3E}">
+        <p14:creationId xmlns:p14="http://schemas.microsoft.com/office/powerpoint/2010/main" val="548434253"/>
+      </p:ext>
+    </p:extLst>
+  </p:cSld>
+  <p:clrMapOvr>
+    <a:masterClrMapping/>
+  </p:clrMapOvr>
+</p:notes>
+</file>
+
+<file path=ppt/notesSlides/notesSlide5.xml><?xml version="1.0" encoding="utf-8"?>
+<p:notes xmlns:a="http://schemas.openxmlformats.org/drawingml/2006/main" xmlns:r="http://schemas.openxmlformats.org/officeDocument/2006/relationships" xmlns:p="http://schemas.openxmlformats.org/presentationml/2006/main">
+  <p:cSld>
+    <p:spTree>
+      <p:nvGrpSpPr>
+        <p:cNvPr id="1" name=""/>
+        <p:cNvGrpSpPr/>
+        <p:nvPr/>
+      </p:nvGrpSpPr>
+      <p:grpSpPr>
+        <a:xfrm>
+          <a:off x="0" y="0"/>
+          <a:ext cx="0" cy="0"/>
+          <a:chOff x="0" y="0"/>
+          <a:chExt cx="0" cy="0"/>
+        </a:xfrm>
+      </p:grpSpPr>
+      <p:sp>
+        <p:nvSpPr>
+          <p:cNvPr id="2" name="Slide Image Placeholder 1"/>
+          <p:cNvSpPr>
+            <a:spLocks noGrp="1" noRot="1" noChangeAspect="1"/>
+          </p:cNvSpPr>
+          <p:nvPr>
+            <p:ph type="sldImg"/>
+          </p:nvPr>
+        </p:nvSpPr>
+        <p:spPr/>
+      </p:sp>
+      <p:sp>
+        <p:nvSpPr>
+          <p:cNvPr id="3" name="Notes Placeholder 2"/>
+          <p:cNvSpPr>
+            <a:spLocks noGrp="1"/>
+          </p:cNvSpPr>
+          <p:nvPr>
+            <p:ph type="body" idx="1"/>
+          </p:nvPr>
+        </p:nvSpPr>
+        <p:spPr/>
+        <p:txBody>
+          <a:bodyPr/>
+          <a:lstStyle/>
+          <a:p>
+            <a:r>
+              <a:rPr lang="en-US" dirty="0"/>
               <a:t>**change out the graph (screen shot of new one)</a:t>
             </a:r>
           </a:p>
@@ -6028,7 +6336,7 @@
 </p:notes>
 </file>
 
-<file path=ppt/notesSlides/notesSlide4.xml><?xml version="1.0" encoding="utf-8"?>
+<file path=ppt/notesSlides/notesSlide6.xml><?xml version="1.0" encoding="utf-8"?>
 <p:notes xmlns:a="http://schemas.openxmlformats.org/drawingml/2006/main" xmlns:r="http://schemas.openxmlformats.org/officeDocument/2006/relationships" xmlns:p="http://schemas.openxmlformats.org/presentationml/2006/main">
   <p:cSld>
     <p:spTree>
@@ -6127,192 +6435,6 @@
 </p:notes>
 </file>
 
-<file path=ppt/notesSlides/notesSlide5.xml><?xml version="1.0" encoding="utf-8"?>
-<p:notes xmlns:a="http://schemas.openxmlformats.org/drawingml/2006/main" xmlns:r="http://schemas.openxmlformats.org/officeDocument/2006/relationships" xmlns:p="http://schemas.openxmlformats.org/presentationml/2006/main">
-  <p:cSld>
-    <p:spTree>
-      <p:nvGrpSpPr>
-        <p:cNvPr id="1" name=""/>
-        <p:cNvGrpSpPr/>
-        <p:nvPr/>
-      </p:nvGrpSpPr>
-      <p:grpSpPr>
-        <a:xfrm>
-          <a:off x="0" y="0"/>
-          <a:ext cx="0" cy="0"/>
-          <a:chOff x="0" y="0"/>
-          <a:chExt cx="0" cy="0"/>
-        </a:xfrm>
-      </p:grpSpPr>
-      <p:sp>
-        <p:nvSpPr>
-          <p:cNvPr id="2" name="Slide Image Placeholder 1"/>
-          <p:cNvSpPr>
-            <a:spLocks noGrp="1" noRot="1" noChangeAspect="1"/>
-          </p:cNvSpPr>
-          <p:nvPr>
-            <p:ph type="sldImg"/>
-          </p:nvPr>
-        </p:nvSpPr>
-        <p:spPr/>
-      </p:sp>
-      <p:sp>
-        <p:nvSpPr>
-          <p:cNvPr id="3" name="Notes Placeholder 2"/>
-          <p:cNvSpPr>
-            <a:spLocks noGrp="1"/>
-          </p:cNvSpPr>
-          <p:nvPr>
-            <p:ph type="body" idx="1"/>
-          </p:nvPr>
-        </p:nvSpPr>
-        <p:spPr/>
-        <p:txBody>
-          <a:bodyPr/>
-          <a:lstStyle/>
-          <a:p>
-            <a:r>
-              <a:rPr lang="en-US" dirty="0"/>
-              <a:t>As runtime nears 100 mins, avg is about 100 mins, there are more datapoints</a:t>
-            </a:r>
-          </a:p>
-          <a:p>
-            <a:r>
-              <a:rPr lang="en-US" dirty="0"/>
-              <a:t>We can see that with the cluster of data in the center</a:t>
-            </a:r>
-          </a:p>
-        </p:txBody>
-      </p:sp>
-      <p:sp>
-        <p:nvSpPr>
-          <p:cNvPr id="4" name="Slide Number Placeholder 3"/>
-          <p:cNvSpPr>
-            <a:spLocks noGrp="1"/>
-          </p:cNvSpPr>
-          <p:nvPr>
-            <p:ph type="sldNum" sz="quarter" idx="5"/>
-          </p:nvPr>
-        </p:nvSpPr>
-        <p:spPr/>
-        <p:txBody>
-          <a:bodyPr/>
-          <a:lstStyle/>
-          <a:p>
-            <a:fld id="{0D0EDF81-139F-488C-872B-4720FBA6BF98}" type="slidenum">
-              <a:rPr lang="en-US" smtClean="0"/>
-              <a:t>17</a:t>
-            </a:fld>
-            <a:endParaRPr lang="en-US" dirty="0"/>
-          </a:p>
-        </p:txBody>
-      </p:sp>
-    </p:spTree>
-    <p:extLst>
-      <p:ext uri="{BB962C8B-B14F-4D97-AF65-F5344CB8AC3E}">
-        <p14:creationId xmlns:p14="http://schemas.microsoft.com/office/powerpoint/2010/main" val="907653004"/>
-      </p:ext>
-    </p:extLst>
-  </p:cSld>
-  <p:clrMapOvr>
-    <a:masterClrMapping/>
-  </p:clrMapOvr>
-</p:notes>
-</file>
-
-<file path=ppt/notesSlides/notesSlide6.xml><?xml version="1.0" encoding="utf-8"?>
-<p:notes xmlns:a="http://schemas.openxmlformats.org/drawingml/2006/main" xmlns:r="http://schemas.openxmlformats.org/officeDocument/2006/relationships" xmlns:p="http://schemas.openxmlformats.org/presentationml/2006/main">
-  <p:cSld>
-    <p:spTree>
-      <p:nvGrpSpPr>
-        <p:cNvPr id="1" name=""/>
-        <p:cNvGrpSpPr/>
-        <p:nvPr/>
-      </p:nvGrpSpPr>
-      <p:grpSpPr>
-        <a:xfrm>
-          <a:off x="0" y="0"/>
-          <a:ext cx="0" cy="0"/>
-          <a:chOff x="0" y="0"/>
-          <a:chExt cx="0" cy="0"/>
-        </a:xfrm>
-      </p:grpSpPr>
-      <p:sp>
-        <p:nvSpPr>
-          <p:cNvPr id="2" name="Slide Image Placeholder 1"/>
-          <p:cNvSpPr>
-            <a:spLocks noGrp="1" noRot="1" noChangeAspect="1"/>
-          </p:cNvSpPr>
-          <p:nvPr>
-            <p:ph type="sldImg"/>
-          </p:nvPr>
-        </p:nvSpPr>
-        <p:spPr/>
-      </p:sp>
-      <p:sp>
-        <p:nvSpPr>
-          <p:cNvPr id="3" name="Notes Placeholder 2"/>
-          <p:cNvSpPr>
-            <a:spLocks noGrp="1"/>
-          </p:cNvSpPr>
-          <p:nvPr>
-            <p:ph type="body" idx="1"/>
-          </p:nvPr>
-        </p:nvSpPr>
-        <p:spPr/>
-        <p:txBody>
-          <a:bodyPr/>
-          <a:lstStyle/>
-          <a:p>
-            <a:r>
-              <a:rPr lang="en-US" dirty="0"/>
-              <a:t>As runtime nears 100 mins, avg is about 100 mins, there are more datapoints</a:t>
-            </a:r>
-          </a:p>
-          <a:p>
-            <a:r>
-              <a:rPr lang="en-US" dirty="0"/>
-              <a:t>We can see that with the cluster of data in the center</a:t>
-            </a:r>
-          </a:p>
-        </p:txBody>
-      </p:sp>
-      <p:sp>
-        <p:nvSpPr>
-          <p:cNvPr id="4" name="Slide Number Placeholder 3"/>
-          <p:cNvSpPr>
-            <a:spLocks noGrp="1"/>
-          </p:cNvSpPr>
-          <p:nvPr>
-            <p:ph type="sldNum" sz="quarter" idx="5"/>
-          </p:nvPr>
-        </p:nvSpPr>
-        <p:spPr/>
-        <p:txBody>
-          <a:bodyPr/>
-          <a:lstStyle/>
-          <a:p>
-            <a:fld id="{0D0EDF81-139F-488C-872B-4720FBA6BF98}" type="slidenum">
-              <a:rPr lang="en-US" smtClean="0"/>
-              <a:t>19</a:t>
-            </a:fld>
-            <a:endParaRPr lang="en-US" dirty="0"/>
-          </a:p>
-        </p:txBody>
-      </p:sp>
-    </p:spTree>
-    <p:extLst>
-      <p:ext uri="{BB962C8B-B14F-4D97-AF65-F5344CB8AC3E}">
-        <p14:creationId xmlns:p14="http://schemas.microsoft.com/office/powerpoint/2010/main" val="612770922"/>
-      </p:ext>
-    </p:extLst>
-  </p:cSld>
-  <p:clrMapOvr>
-    <a:masterClrMapping/>
-  </p:clrMapOvr>
-</p:notes>
-</file>
-
 <file path=ppt/notesSlides/notesSlide7.xml><?xml version="1.0" encoding="utf-8"?>
 <p:notes xmlns:a="http://schemas.openxmlformats.org/drawingml/2006/main" xmlns:r="http://schemas.openxmlformats.org/officeDocument/2006/relationships" xmlns:p="http://schemas.openxmlformats.org/presentationml/2006/main">
   <p:cSld>
@@ -6368,6 +6490,12 @@
               <a:t>We can see that with the cluster of data in the center</a:t>
             </a:r>
           </a:p>
+          <a:p>
+            <a:r>
+              <a:rPr lang="en-US" dirty="0"/>
+              <a:t>Look into finding the average (mean) runtime and also the mode</a:t>
+            </a:r>
+          </a:p>
         </p:txBody>
       </p:sp>
       <p:sp>
@@ -6387,7 +6515,7 @@
           <a:p>
             <a:fld id="{0D0EDF81-139F-488C-872B-4720FBA6BF98}" type="slidenum">
               <a:rPr lang="en-US" smtClean="0"/>
-              <a:t>21</a:t>
+              <a:t>17</a:t>
             </a:fld>
             <a:endParaRPr lang="en-US" dirty="0"/>
           </a:p>
@@ -6396,7 +6524,100 @@
     </p:spTree>
     <p:extLst>
       <p:ext uri="{BB962C8B-B14F-4D97-AF65-F5344CB8AC3E}">
-        <p14:creationId xmlns:p14="http://schemas.microsoft.com/office/powerpoint/2010/main" val="1438571247"/>
+        <p14:creationId xmlns:p14="http://schemas.microsoft.com/office/powerpoint/2010/main" val="907653004"/>
+      </p:ext>
+    </p:extLst>
+  </p:cSld>
+  <p:clrMapOvr>
+    <a:masterClrMapping/>
+  </p:clrMapOvr>
+</p:notes>
+</file>
+
+<file path=ppt/notesSlides/notesSlide8.xml><?xml version="1.0" encoding="utf-8"?>
+<p:notes xmlns:a="http://schemas.openxmlformats.org/drawingml/2006/main" xmlns:r="http://schemas.openxmlformats.org/officeDocument/2006/relationships" xmlns:p="http://schemas.openxmlformats.org/presentationml/2006/main">
+  <p:cSld>
+    <p:spTree>
+      <p:nvGrpSpPr>
+        <p:cNvPr id="1" name=""/>
+        <p:cNvGrpSpPr/>
+        <p:nvPr/>
+      </p:nvGrpSpPr>
+      <p:grpSpPr>
+        <a:xfrm>
+          <a:off x="0" y="0"/>
+          <a:ext cx="0" cy="0"/>
+          <a:chOff x="0" y="0"/>
+          <a:chExt cx="0" cy="0"/>
+        </a:xfrm>
+      </p:grpSpPr>
+      <p:sp>
+        <p:nvSpPr>
+          <p:cNvPr id="2" name="Slide Image Placeholder 1"/>
+          <p:cNvSpPr>
+            <a:spLocks noGrp="1" noRot="1" noChangeAspect="1"/>
+          </p:cNvSpPr>
+          <p:nvPr>
+            <p:ph type="sldImg"/>
+          </p:nvPr>
+        </p:nvSpPr>
+        <p:spPr/>
+      </p:sp>
+      <p:sp>
+        <p:nvSpPr>
+          <p:cNvPr id="3" name="Notes Placeholder 2"/>
+          <p:cNvSpPr>
+            <a:spLocks noGrp="1"/>
+          </p:cNvSpPr>
+          <p:nvPr>
+            <p:ph type="body" idx="1"/>
+          </p:nvPr>
+        </p:nvSpPr>
+        <p:spPr/>
+        <p:txBody>
+          <a:bodyPr/>
+          <a:lstStyle/>
+          <a:p>
+            <a:r>
+              <a:rPr lang="en-US" dirty="0"/>
+              <a:t>Mode for movie ratings (Most frequently occurring movie rating, mode)</a:t>
+            </a:r>
+          </a:p>
+          <a:p>
+            <a:r>
+              <a:rPr lang="en-US" dirty="0"/>
+              <a:t>Average (mean) runtime for movie</a:t>
+            </a:r>
+          </a:p>
+        </p:txBody>
+      </p:sp>
+      <p:sp>
+        <p:nvSpPr>
+          <p:cNvPr id="4" name="Slide Number Placeholder 3"/>
+          <p:cNvSpPr>
+            <a:spLocks noGrp="1"/>
+          </p:cNvSpPr>
+          <p:nvPr>
+            <p:ph type="sldNum" sz="quarter" idx="5"/>
+          </p:nvPr>
+        </p:nvSpPr>
+        <p:spPr/>
+        <p:txBody>
+          <a:bodyPr/>
+          <a:lstStyle/>
+          <a:p>
+            <a:fld id="{0D0EDF81-139F-488C-872B-4720FBA6BF98}" type="slidenum">
+              <a:rPr lang="en-US" smtClean="0"/>
+              <a:t>19</a:t>
+            </a:fld>
+            <a:endParaRPr lang="en-US" dirty="0"/>
+          </a:p>
+        </p:txBody>
+      </p:sp>
+    </p:spTree>
+    <p:extLst>
+      <p:ext uri="{BB962C8B-B14F-4D97-AF65-F5344CB8AC3E}">
+        <p14:creationId xmlns:p14="http://schemas.microsoft.com/office/powerpoint/2010/main" val="612770922"/>
       </p:ext>
     </p:extLst>
   </p:cSld>
@@ -39052,7 +39273,7 @@
           </p:nvPr>
         </p:nvPicPr>
         <p:blipFill>
-          <a:blip r:embed="rId2"/>
+          <a:blip r:embed="rId3"/>
           <a:stretch>
             <a:fillRect/>
           </a:stretch>
@@ -39115,7 +39336,7 @@
           </p:nvPr>
         </p:nvPicPr>
         <p:blipFill>
-          <a:blip r:embed="rId3"/>
+          <a:blip r:embed="rId4"/>
           <a:stretch>
             <a:fillRect/>
           </a:stretch>
@@ -39383,8 +39604,8 @@
               </a:spcAft>
             </a:pPr>
             <a:r>
-              <a:rPr lang="en-US"/>
-              <a:t>9/3/20XX</a:t>
+              <a:rPr lang="en-US" dirty="0"/>
+              <a:t>4/29/2022</a:t>
             </a:r>
           </a:p>
         </p:txBody>
@@ -39423,8 +39644,8 @@
               </a:spcAft>
             </a:pPr>
             <a:r>
-              <a:rPr lang="en-US"/>
-              <a:t>Presentation Title</a:t>
+              <a:rPr lang="en-US" dirty="0"/>
+              <a:t>Netflix</a:t>
             </a:r>
           </a:p>
         </p:txBody>
@@ -39635,7 +39856,7 @@
           </p:nvPr>
         </p:nvPicPr>
         <p:blipFill>
-          <a:blip r:embed="rId2"/>
+          <a:blip r:embed="rId3"/>
           <a:stretch>
             <a:fillRect/>
           </a:stretch>
@@ -40488,10 +40709,9 @@
           <a:lstStyle/>
           <a:p>
             <a:r>
-              <a:rPr lang="en-US"/>
-              <a:t>9/3/20XX</a:t>
+              <a:rPr lang="en-US" dirty="0"/>
+              <a:t>4/29/2022</a:t>
             </a:r>
-            <a:endParaRPr lang="en-US" dirty="0"/>
           </a:p>
         </p:txBody>
       </p:sp>
@@ -40517,10 +40737,9 @@
           <a:lstStyle/>
           <a:p>
             <a:r>
-              <a:rPr lang="en-US"/>
-              <a:t>Presentation Title</a:t>
+              <a:rPr lang="en-US" dirty="0"/>
+              <a:t>Netflix</a:t>
             </a:r>
-            <a:endParaRPr lang="en-US" dirty="0"/>
           </a:p>
         </p:txBody>
       </p:sp>
@@ -40550,6 +40769,41 @@
               <a:t>17</a:t>
             </a:fld>
             <a:endParaRPr lang="en-US" dirty="0"/>
+          </a:p>
+        </p:txBody>
+      </p:sp>
+      <p:sp>
+        <p:nvSpPr>
+          <p:cNvPr id="3" name="TextBox 2">
+            <a:extLst>
+              <a:ext uri="{FF2B5EF4-FFF2-40B4-BE49-F238E27FC236}">
+                <a16:creationId xmlns:a16="http://schemas.microsoft.com/office/drawing/2014/main" id="{3A174422-E1A6-41C2-9ECF-72D890863E1D}"/>
+              </a:ext>
+            </a:extLst>
+          </p:cNvPr>
+          <p:cNvSpPr txBox="1"/>
+          <p:nvPr/>
+        </p:nvSpPr>
+        <p:spPr>
+          <a:xfrm>
+            <a:off x="1469571" y="2024743"/>
+            <a:ext cx="6683829" cy="400110"/>
+          </a:xfrm>
+          <a:prstGeom prst="rect">
+            <a:avLst/>
+          </a:prstGeom>
+          <a:noFill/>
+        </p:spPr>
+        <p:txBody>
+          <a:bodyPr wrap="square" rtlCol="0">
+            <a:spAutoFit/>
+          </a:bodyPr>
+          <a:lstStyle/>
+          <a:p>
+            <a:r>
+              <a:rPr lang="en-US" sz="2000" dirty="0"/>
+              <a:t>Average runtime for a movie is 101 mins</a:t>
+            </a:r>
           </a:p>
         </p:txBody>
       </p:sp>
@@ -40585,10 +40839,10 @@
       </p:grpSpPr>
       <p:sp>
         <p:nvSpPr>
-          <p:cNvPr id="2" name="Title 1">
+          <p:cNvPr id="4" name="Title 3">
             <a:extLst>
               <a:ext uri="{FF2B5EF4-FFF2-40B4-BE49-F238E27FC236}">
-                <a16:creationId xmlns:a16="http://schemas.microsoft.com/office/drawing/2014/main" id="{3E0E08A1-FEAA-4F21-96E4-5A57CFAABBE2}"/>
+                <a16:creationId xmlns:a16="http://schemas.microsoft.com/office/drawing/2014/main" id="{80D2FA59-42D1-4596-BADF-65EE2EECB2F4}"/>
               </a:ext>
             </a:extLst>
           </p:cNvPr>
@@ -40606,17 +40860,17 @@
           <a:p>
             <a:r>
               <a:rPr lang="en-US" dirty="0"/>
-              <a:t>Findings</a:t>
+              <a:t>Conclusions</a:t>
             </a:r>
           </a:p>
         </p:txBody>
       </p:sp>
       <p:sp>
         <p:nvSpPr>
-          <p:cNvPr id="4" name="Date Placeholder 3">
+          <p:cNvPr id="5" name="Content Placeholder 4">
             <a:extLst>
               <a:ext uri="{FF2B5EF4-FFF2-40B4-BE49-F238E27FC236}">
-                <a16:creationId xmlns:a16="http://schemas.microsoft.com/office/drawing/2014/main" id="{43E96533-0ABC-43CF-A178-990FE4A0AE10}"/>
+                <a16:creationId xmlns:a16="http://schemas.microsoft.com/office/drawing/2014/main" id="{708C1B7C-03BA-4C6C-B759-6DAB6A63B451}"/>
               </a:ext>
             </a:extLst>
           </p:cNvPr>
@@ -40624,7 +40878,7 @@
             <a:spLocks noGrp="1"/>
           </p:cNvSpPr>
           <p:nvPr>
-            <p:ph type="dt" sz="half" idx="10"/>
+            <p:ph idx="1"/>
           </p:nvPr>
         </p:nvSpPr>
         <p:spPr/>
@@ -40632,19 +40886,19 @@
           <a:bodyPr/>
           <a:lstStyle/>
           <a:p>
-            <a:r>
-              <a:rPr lang="en-US" dirty="0"/>
-              <a:t>9/3/20XX</a:t>
-            </a:r>
+            <a:pPr marL="0" indent="0">
+              <a:buNone/>
+            </a:pPr>
+            <a:endParaRPr lang="en-US" sz="1800" dirty="0"/>
           </a:p>
         </p:txBody>
       </p:sp>
       <p:sp>
         <p:nvSpPr>
-          <p:cNvPr id="5" name="Footer Placeholder 4">
+          <p:cNvPr id="10" name="Footer Placeholder 9">
             <a:extLst>
               <a:ext uri="{FF2B5EF4-FFF2-40B4-BE49-F238E27FC236}">
-                <a16:creationId xmlns:a16="http://schemas.microsoft.com/office/drawing/2014/main" id="{5D109D7B-C32A-4E78-8DDF-03685549555D}"/>
+                <a16:creationId xmlns:a16="http://schemas.microsoft.com/office/drawing/2014/main" id="{8751E420-B483-4040-8E33-A32E82D74E33}"/>
               </a:ext>
             </a:extLst>
           </p:cNvPr>
@@ -40660,19 +40914,20 @@
           <a:bodyPr/>
           <a:lstStyle/>
           <a:p>
+            <a:pPr algn="l"/>
             <a:r>
               <a:rPr lang="en-US" dirty="0"/>
-              <a:t>Presentation Title</a:t>
+              <a:t>Netflix</a:t>
             </a:r>
           </a:p>
         </p:txBody>
       </p:sp>
       <p:sp>
         <p:nvSpPr>
-          <p:cNvPr id="6" name="Slide Number Placeholder 5">
+          <p:cNvPr id="11" name="Slide Number Placeholder 10">
             <a:extLst>
               <a:ext uri="{FF2B5EF4-FFF2-40B4-BE49-F238E27FC236}">
-                <a16:creationId xmlns:a16="http://schemas.microsoft.com/office/drawing/2014/main" id="{ABC57B06-3F43-4092-8AB5-0AC06017930A}"/>
+                <a16:creationId xmlns:a16="http://schemas.microsoft.com/office/drawing/2014/main" id="{A720F25F-904B-4AA2-9CB6-69411308A123}"/>
               </a:ext>
             </a:extLst>
           </p:cNvPr>
@@ -40696,10 +40951,35 @@
           </a:p>
         </p:txBody>
       </p:sp>
+      <p:pic>
+        <p:nvPicPr>
+          <p:cNvPr id="13" name="Picture Placeholder 12" descr="A group of people posing for the camera&#10;&#10;Description automatically generated">
+            <a:extLst>
+              <a:ext uri="{FF2B5EF4-FFF2-40B4-BE49-F238E27FC236}">
+                <a16:creationId xmlns:a16="http://schemas.microsoft.com/office/drawing/2014/main" id="{5190BCFA-DE4D-48DF-B99F-EC52D6F9C8FB}"/>
+              </a:ext>
+            </a:extLst>
+          </p:cNvPr>
+          <p:cNvPicPr>
+            <a:picLocks noGrp="1" noChangeAspect="1"/>
+          </p:cNvPicPr>
+          <p:nvPr>
+            <p:ph type="pic" sz="quarter" idx="13"/>
+          </p:nvPr>
+        </p:nvPicPr>
+        <p:blipFill>
+          <a:blip r:embed="rId2"/>
+          <a:srcRect l="13580" r="13580"/>
+          <a:stretch>
+            <a:fillRect/>
+          </a:stretch>
+        </p:blipFill>
+        <p:spPr/>
+      </p:pic>
     </p:spTree>
     <p:extLst>
       <p:ext uri="{BB962C8B-B14F-4D97-AF65-F5344CB8AC3E}">
-        <p14:creationId xmlns:p14="http://schemas.microsoft.com/office/powerpoint/2010/main" val="3079534048"/>
+        <p14:creationId xmlns:p14="http://schemas.microsoft.com/office/powerpoint/2010/main" val="3958427157"/>
       </p:ext>
     </p:extLst>
   </p:cSld>
@@ -40749,7 +41029,7 @@
           <a:p>
             <a:r>
               <a:rPr lang="en-US" dirty="0"/>
-              <a:t>Ratings vs Run time</a:t>
+              <a:t>Findings</a:t>
             </a:r>
           </a:p>
         </p:txBody>
@@ -40776,10 +41056,9 @@
           <a:lstStyle/>
           <a:p>
             <a:r>
-              <a:rPr lang="en-US"/>
-              <a:t>9/3/20XX</a:t>
+              <a:rPr lang="en-US" dirty="0"/>
+              <a:t>4/29/2022</a:t>
             </a:r>
-            <a:endParaRPr lang="en-US" dirty="0"/>
           </a:p>
         </p:txBody>
       </p:sp>
@@ -40805,10 +41084,9 @@
           <a:lstStyle/>
           <a:p>
             <a:r>
-              <a:rPr lang="en-US"/>
-              <a:t>Presentation Title</a:t>
+              <a:rPr lang="en-US" dirty="0"/>
+              <a:t>Netflix</a:t>
             </a:r>
-            <a:endParaRPr lang="en-US" dirty="0"/>
           </a:p>
         </p:txBody>
       </p:sp>
@@ -40860,19 +41138,19 @@
         <p:spPr/>
         <p:txBody>
           <a:bodyPr>
-            <a:normAutofit fontScale="92500" lnSpcReduction="10000"/>
+            <a:normAutofit/>
           </a:bodyPr>
           <a:lstStyle/>
           <a:p>
             <a:r>
               <a:rPr lang="en-US" dirty="0"/>
-              <a:t>Top 5 countries which produce the largest numbers of titles on Netflix: United States, India, United Kingdom, Spain &amp; Japan</a:t>
+              <a:t>Top 5 countries which produce the largest number of titles on Netflix: United States, India, United Kingdom, Spain &amp; Japan</a:t>
             </a:r>
           </a:p>
           <a:p>
             <a:r>
               <a:rPr lang="en-US" dirty="0"/>
-              <a:t>Top 5 type of Genres with the largest of titles: Standup comedy, Documentaries, Drama, Action &amp; Adventure, Comedies, Family &amp; Children Movies.</a:t>
+              <a:t>Top 5 Genres with the largest titles: Standup comedy, Documentaries, Drama, Action &amp; Adventure, Comedies, Family &amp; Children Movies.</a:t>
             </a:r>
           </a:p>
           <a:p>
@@ -40885,12 +41163,6 @@
             <a:r>
               <a:rPr lang="en-US" dirty="0"/>
               <a:t>Most of runtimes are from 50 -150mins  </a:t>
-            </a:r>
-          </a:p>
-          <a:p>
-            <a:r>
-              <a:rPr lang="en-US" dirty="0"/>
-              <a:t>Percentage of Movies and TV shows are 98.8% &amp; 1.2% (??) respectively</a:t>
             </a:r>
           </a:p>
           <a:p>
@@ -41169,380 +41441,6 @@
           <a:chExt cx="0" cy="0"/>
         </a:xfrm>
       </p:grpSpPr>
-      <p:sp>
-        <p:nvSpPr>
-          <p:cNvPr id="4" name="Title 3">
-            <a:extLst>
-              <a:ext uri="{FF2B5EF4-FFF2-40B4-BE49-F238E27FC236}">
-                <a16:creationId xmlns:a16="http://schemas.microsoft.com/office/drawing/2014/main" id="{80D2FA59-42D1-4596-BADF-65EE2EECB2F4}"/>
-              </a:ext>
-            </a:extLst>
-          </p:cNvPr>
-          <p:cNvSpPr>
-            <a:spLocks noGrp="1"/>
-          </p:cNvSpPr>
-          <p:nvPr>
-            <p:ph type="title"/>
-          </p:nvPr>
-        </p:nvSpPr>
-        <p:spPr/>
-        <p:txBody>
-          <a:bodyPr/>
-          <a:lstStyle/>
-          <a:p>
-            <a:r>
-              <a:rPr lang="en-US" dirty="0"/>
-              <a:t>Conclusions</a:t>
-            </a:r>
-          </a:p>
-        </p:txBody>
-      </p:sp>
-      <p:sp>
-        <p:nvSpPr>
-          <p:cNvPr id="5" name="Content Placeholder 4">
-            <a:extLst>
-              <a:ext uri="{FF2B5EF4-FFF2-40B4-BE49-F238E27FC236}">
-                <a16:creationId xmlns:a16="http://schemas.microsoft.com/office/drawing/2014/main" id="{708C1B7C-03BA-4C6C-B759-6DAB6A63B451}"/>
-              </a:ext>
-            </a:extLst>
-          </p:cNvPr>
-          <p:cNvSpPr>
-            <a:spLocks noGrp="1"/>
-          </p:cNvSpPr>
-          <p:nvPr>
-            <p:ph idx="1"/>
-          </p:nvPr>
-        </p:nvSpPr>
-        <p:spPr/>
-        <p:txBody>
-          <a:bodyPr/>
-          <a:lstStyle/>
-          <a:p>
-            <a:pPr marL="0" indent="0">
-              <a:buNone/>
-            </a:pPr>
-            <a:endParaRPr lang="en-US" sz="1800" dirty="0"/>
-          </a:p>
-        </p:txBody>
-      </p:sp>
-      <p:sp>
-        <p:nvSpPr>
-          <p:cNvPr id="10" name="Footer Placeholder 9">
-            <a:extLst>
-              <a:ext uri="{FF2B5EF4-FFF2-40B4-BE49-F238E27FC236}">
-                <a16:creationId xmlns:a16="http://schemas.microsoft.com/office/drawing/2014/main" id="{8751E420-B483-4040-8E33-A32E82D74E33}"/>
-              </a:ext>
-            </a:extLst>
-          </p:cNvPr>
-          <p:cNvSpPr>
-            <a:spLocks noGrp="1"/>
-          </p:cNvSpPr>
-          <p:nvPr>
-            <p:ph type="ftr" sz="quarter" idx="11"/>
-          </p:nvPr>
-        </p:nvSpPr>
-        <p:spPr/>
-        <p:txBody>
-          <a:bodyPr/>
-          <a:lstStyle/>
-          <a:p>
-            <a:pPr algn="l"/>
-            <a:r>
-              <a:rPr lang="en-US" dirty="0"/>
-              <a:t>Presentation Title</a:t>
-            </a:r>
-          </a:p>
-        </p:txBody>
-      </p:sp>
-      <p:sp>
-        <p:nvSpPr>
-          <p:cNvPr id="11" name="Slide Number Placeholder 10">
-            <a:extLst>
-              <a:ext uri="{FF2B5EF4-FFF2-40B4-BE49-F238E27FC236}">
-                <a16:creationId xmlns:a16="http://schemas.microsoft.com/office/drawing/2014/main" id="{A720F25F-904B-4AA2-9CB6-69411308A123}"/>
-              </a:ext>
-            </a:extLst>
-          </p:cNvPr>
-          <p:cNvSpPr>
-            <a:spLocks noGrp="1"/>
-          </p:cNvSpPr>
-          <p:nvPr>
-            <p:ph type="sldNum" sz="quarter" idx="12"/>
-          </p:nvPr>
-        </p:nvSpPr>
-        <p:spPr/>
-        <p:txBody>
-          <a:bodyPr/>
-          <a:lstStyle/>
-          <a:p>
-            <a:fld id="{B9713C8C-8E70-45D5-AE59-23E60168254E}" type="slidenum">
-              <a:rPr lang="en-US" smtClean="0"/>
-              <a:t>20</a:t>
-            </a:fld>
-            <a:endParaRPr lang="en-US" dirty="0"/>
-          </a:p>
-        </p:txBody>
-      </p:sp>
-      <p:pic>
-        <p:nvPicPr>
-          <p:cNvPr id="13" name="Picture Placeholder 12" descr="A group of people posing for the camera&#10;&#10;Description automatically generated">
-            <a:extLst>
-              <a:ext uri="{FF2B5EF4-FFF2-40B4-BE49-F238E27FC236}">
-                <a16:creationId xmlns:a16="http://schemas.microsoft.com/office/drawing/2014/main" id="{5190BCFA-DE4D-48DF-B99F-EC52D6F9C8FB}"/>
-              </a:ext>
-            </a:extLst>
-          </p:cNvPr>
-          <p:cNvPicPr>
-            <a:picLocks noGrp="1" noChangeAspect="1"/>
-          </p:cNvPicPr>
-          <p:nvPr>
-            <p:ph type="pic" sz="quarter" idx="13"/>
-          </p:nvPr>
-        </p:nvPicPr>
-        <p:blipFill>
-          <a:blip r:embed="rId2"/>
-          <a:srcRect l="13580" r="13580"/>
-          <a:stretch>
-            <a:fillRect/>
-          </a:stretch>
-        </p:blipFill>
-        <p:spPr/>
-      </p:pic>
-    </p:spTree>
-    <p:extLst>
-      <p:ext uri="{BB962C8B-B14F-4D97-AF65-F5344CB8AC3E}">
-        <p14:creationId xmlns:p14="http://schemas.microsoft.com/office/powerpoint/2010/main" val="3958427157"/>
-      </p:ext>
-    </p:extLst>
-  </p:cSld>
-  <p:clrMapOvr>
-    <a:masterClrMapping/>
-  </p:clrMapOvr>
-</p:sld>
-</file>
-
-<file path=ppt/slides/slide21.xml><?xml version="1.0" encoding="utf-8"?>
-<p:sld xmlns:a="http://schemas.openxmlformats.org/drawingml/2006/main" xmlns:r="http://schemas.openxmlformats.org/officeDocument/2006/relationships" xmlns:p="http://schemas.openxmlformats.org/presentationml/2006/main">
-  <p:cSld>
-    <p:spTree>
-      <p:nvGrpSpPr>
-        <p:cNvPr id="1" name=""/>
-        <p:cNvGrpSpPr/>
-        <p:nvPr/>
-      </p:nvGrpSpPr>
-      <p:grpSpPr>
-        <a:xfrm>
-          <a:off x="0" y="0"/>
-          <a:ext cx="0" cy="0"/>
-          <a:chOff x="0" y="0"/>
-          <a:chExt cx="0" cy="0"/>
-        </a:xfrm>
-      </p:grpSpPr>
-      <p:sp>
-        <p:nvSpPr>
-          <p:cNvPr id="2" name="Title 1">
-            <a:extLst>
-              <a:ext uri="{FF2B5EF4-FFF2-40B4-BE49-F238E27FC236}">
-                <a16:creationId xmlns:a16="http://schemas.microsoft.com/office/drawing/2014/main" id="{6CFECE77-7A17-4D27-8F36-82EC388F8C9D}"/>
-              </a:ext>
-            </a:extLst>
-          </p:cNvPr>
-          <p:cNvSpPr>
-            <a:spLocks noGrp="1"/>
-          </p:cNvSpPr>
-          <p:nvPr>
-            <p:ph type="title"/>
-          </p:nvPr>
-        </p:nvSpPr>
-        <p:spPr/>
-        <p:txBody>
-          <a:bodyPr/>
-          <a:lstStyle/>
-          <a:p>
-            <a:r>
-              <a:rPr lang="en-US" dirty="0"/>
-              <a:t>Conclusions:</a:t>
-            </a:r>
-          </a:p>
-        </p:txBody>
-      </p:sp>
-      <p:sp>
-        <p:nvSpPr>
-          <p:cNvPr id="4" name="Date Placeholder 3">
-            <a:extLst>
-              <a:ext uri="{FF2B5EF4-FFF2-40B4-BE49-F238E27FC236}">
-                <a16:creationId xmlns:a16="http://schemas.microsoft.com/office/drawing/2014/main" id="{F4E12042-95BD-43FA-AC29-449B3AEDB4E3}"/>
-              </a:ext>
-            </a:extLst>
-          </p:cNvPr>
-          <p:cNvSpPr>
-            <a:spLocks noGrp="1"/>
-          </p:cNvSpPr>
-          <p:nvPr>
-            <p:ph type="dt" sz="half" idx="10"/>
-          </p:nvPr>
-        </p:nvSpPr>
-        <p:spPr/>
-        <p:txBody>
-          <a:bodyPr/>
-          <a:lstStyle/>
-          <a:p>
-            <a:r>
-              <a:rPr lang="en-US"/>
-              <a:t>9/3/20XX</a:t>
-            </a:r>
-            <a:endParaRPr lang="en-US" dirty="0"/>
-          </a:p>
-        </p:txBody>
-      </p:sp>
-      <p:sp>
-        <p:nvSpPr>
-          <p:cNvPr id="5" name="Footer Placeholder 4">
-            <a:extLst>
-              <a:ext uri="{FF2B5EF4-FFF2-40B4-BE49-F238E27FC236}">
-                <a16:creationId xmlns:a16="http://schemas.microsoft.com/office/drawing/2014/main" id="{E45EACE6-95E1-43CA-BF8E-3C66DA81B333}"/>
-              </a:ext>
-            </a:extLst>
-          </p:cNvPr>
-          <p:cNvSpPr>
-            <a:spLocks noGrp="1"/>
-          </p:cNvSpPr>
-          <p:nvPr>
-            <p:ph type="ftr" sz="quarter" idx="11"/>
-          </p:nvPr>
-        </p:nvSpPr>
-        <p:spPr/>
-        <p:txBody>
-          <a:bodyPr/>
-          <a:lstStyle/>
-          <a:p>
-            <a:r>
-              <a:rPr lang="en-US"/>
-              <a:t>Presentation Title</a:t>
-            </a:r>
-            <a:endParaRPr lang="en-US" dirty="0"/>
-          </a:p>
-        </p:txBody>
-      </p:sp>
-      <p:sp>
-        <p:nvSpPr>
-          <p:cNvPr id="6" name="Slide Number Placeholder 5">
-            <a:extLst>
-              <a:ext uri="{FF2B5EF4-FFF2-40B4-BE49-F238E27FC236}">
-                <a16:creationId xmlns:a16="http://schemas.microsoft.com/office/drawing/2014/main" id="{0C090CC8-026A-4E46-8BE1-1BA528E7A477}"/>
-              </a:ext>
-            </a:extLst>
-          </p:cNvPr>
-          <p:cNvSpPr>
-            <a:spLocks noGrp="1"/>
-          </p:cNvSpPr>
-          <p:nvPr>
-            <p:ph type="sldNum" sz="quarter" idx="12"/>
-          </p:nvPr>
-        </p:nvSpPr>
-        <p:spPr/>
-        <p:txBody>
-          <a:bodyPr/>
-          <a:lstStyle/>
-          <a:p>
-            <a:fld id="{B9713C8C-8E70-45D5-AE59-23E60168254E}" type="slidenum">
-              <a:rPr lang="en-US" smtClean="0"/>
-              <a:t>21</a:t>
-            </a:fld>
-            <a:endParaRPr lang="en-US" dirty="0"/>
-          </a:p>
-        </p:txBody>
-      </p:sp>
-      <p:sp>
-        <p:nvSpPr>
-          <p:cNvPr id="7" name="Content Placeholder 6">
-            <a:extLst>
-              <a:ext uri="{FF2B5EF4-FFF2-40B4-BE49-F238E27FC236}">
-                <a16:creationId xmlns:a16="http://schemas.microsoft.com/office/drawing/2014/main" id="{57A8AF85-E3DB-4752-9A82-60FA201BA9C5}"/>
-              </a:ext>
-            </a:extLst>
-          </p:cNvPr>
-          <p:cNvSpPr>
-            <a:spLocks noGrp="1"/>
-          </p:cNvSpPr>
-          <p:nvPr>
-            <p:ph idx="1"/>
-          </p:nvPr>
-        </p:nvSpPr>
-        <p:spPr/>
-        <p:txBody>
-          <a:bodyPr>
-            <a:normAutofit/>
-          </a:bodyPr>
-          <a:lstStyle/>
-          <a:p>
-            <a:r>
-              <a:rPr lang="en-US" dirty="0"/>
-              <a:t>United States is the country that produces the largest numbers of titles on Netflix.</a:t>
-            </a:r>
-          </a:p>
-          <a:p>
-            <a:r>
-              <a:rPr lang="en-US" dirty="0"/>
-              <a:t>Genre with the largest of titles: Standup comedy.</a:t>
-            </a:r>
-          </a:p>
-          <a:p>
-            <a:r>
-              <a:rPr lang="en-US" dirty="0"/>
-              <a:t>Rating with the largest of titles is TV_MA.</a:t>
-            </a:r>
-          </a:p>
-          <a:p>
-            <a:r>
-              <a:rPr lang="en-US" dirty="0"/>
-              <a:t>Quantity of content tiles increase rapidly from 2015 to 2019.</a:t>
-            </a:r>
-          </a:p>
-          <a:p>
-            <a:pPr marL="0" indent="0">
-              <a:buNone/>
-            </a:pPr>
-            <a:endParaRPr lang="en-US" dirty="0"/>
-          </a:p>
-          <a:p>
-            <a:endParaRPr lang="en-US" dirty="0"/>
-          </a:p>
-          <a:p>
-            <a:endParaRPr lang="en-US" dirty="0"/>
-          </a:p>
-        </p:txBody>
-      </p:sp>
-    </p:spTree>
-    <p:extLst>
-      <p:ext uri="{BB962C8B-B14F-4D97-AF65-F5344CB8AC3E}">
-        <p14:creationId xmlns:p14="http://schemas.microsoft.com/office/powerpoint/2010/main" val="311096978"/>
-      </p:ext>
-    </p:extLst>
-  </p:cSld>
-  <p:clrMapOvr>
-    <a:masterClrMapping/>
-  </p:clrMapOvr>
-</p:sld>
-</file>
-
-<file path=ppt/slides/slide22.xml><?xml version="1.0" encoding="utf-8"?>
-<p:sld xmlns:a="http://schemas.openxmlformats.org/drawingml/2006/main" xmlns:r="http://schemas.openxmlformats.org/officeDocument/2006/relationships" xmlns:p="http://schemas.openxmlformats.org/presentationml/2006/main">
-  <p:cSld>
-    <p:spTree>
-      <p:nvGrpSpPr>
-        <p:cNvPr id="1" name=""/>
-        <p:cNvGrpSpPr/>
-        <p:nvPr/>
-      </p:nvGrpSpPr>
-      <p:grpSpPr>
-        <a:xfrm>
-          <a:off x="0" y="0"/>
-          <a:ext cx="0" cy="0"/>
-          <a:chOff x="0" y="0"/>
-          <a:chExt cx="0" cy="0"/>
-        </a:xfrm>
-      </p:grpSpPr>
       <p:pic>
         <p:nvPicPr>
           <p:cNvPr id="17" name="Picture Placeholder 16" descr="A group of people posing for the camera&#10;&#10;Description automatically generated">
@@ -41590,7 +41488,7 @@
         </p:nvSpPr>
         <p:spPr>
           <a:xfrm>
-            <a:off x="6739128" y="365760"/>
+            <a:off x="6739128" y="1280160"/>
             <a:ext cx="4617720" cy="2578608"/>
           </a:xfrm>
         </p:spPr>
@@ -41639,8 +41537,8 @@
               </a:spcAft>
             </a:pPr>
             <a:r>
-              <a:rPr lang="en-US"/>
-              <a:t>Presentation Title</a:t>
+              <a:rPr lang="en-US" dirty="0"/>
+              <a:t>Netflix</a:t>
             </a:r>
           </a:p>
         </p:txBody>
@@ -41683,7 +41581,7 @@
                   <a:spcPts val="600"/>
                 </a:spcAft>
               </a:pPr>
-              <a:t>22</a:t>
+              <a:t>20</a:t>
             </a:fld>
             <a:endParaRPr lang="en-US"/>
           </a:p>
@@ -43284,21 +43182,21 @@
 </file>
 
 <file path=customXml/item1.xml><?xml version="1.0" encoding="utf-8"?>
+<p:properties xmlns:p="http://schemas.microsoft.com/office/2006/metadata/properties" xmlns:xsi="http://www.w3.org/2001/XMLSchema-instance" xmlns:pc="http://schemas.microsoft.com/office/infopath/2007/PartnerControls">
+  <documentManagement>
+    <Status xmlns="71af3243-3dd4-4a8d-8c0d-dd76da1f02a5">Not started</Status>
+    <MediaServiceKeyPoints xmlns="71af3243-3dd4-4a8d-8c0d-dd76da1f02a5" xsi:nil="true"/>
+  </documentManagement>
+</p:properties>
+</file>
+
+<file path=customXml/item2.xml><?xml version="1.0" encoding="utf-8"?>
 <?mso-contentType ?>
 <FormTemplates xmlns="http://schemas.microsoft.com/sharepoint/v3/contenttype/forms">
   <Display>DocumentLibraryForm</Display>
   <Edit>DocumentLibraryForm</Edit>
   <New>DocumentLibraryForm</New>
 </FormTemplates>
-</file>
-
-<file path=customXml/item2.xml><?xml version="1.0" encoding="utf-8"?>
-<p:properties xmlns:p="http://schemas.microsoft.com/office/2006/metadata/properties" xmlns:xsi="http://www.w3.org/2001/XMLSchema-instance" xmlns:pc="http://schemas.microsoft.com/office/infopath/2007/PartnerControls">
-  <documentManagement>
-    <Status xmlns="71af3243-3dd4-4a8d-8c0d-dd76da1f02a5">Not started</Status>
-    <MediaServiceKeyPoints xmlns="71af3243-3dd4-4a8d-8c0d-dd76da1f02a5" xsi:nil="true"/>
-  </documentManagement>
-</p:properties>
 </file>
 
 <file path=customXml/item3.xml><?xml version="1.0" encoding="utf-8"?>
@@ -43523,19 +43421,19 @@
 </file>
 
 <file path=customXml/itemProps1.xml><?xml version="1.0" encoding="utf-8"?>
-<ds:datastoreItem xmlns:ds="http://schemas.openxmlformats.org/officeDocument/2006/customXml" ds:itemID="{C0DCE9DA-F7FD-45FA-83B7-D9813A44258A}">
+<ds:datastoreItem xmlns:ds="http://schemas.openxmlformats.org/officeDocument/2006/customXml" ds:itemID="{9DFCC198-DBFA-46B2-A241-8E3888E63670}">
   <ds:schemaRefs>
-    <ds:schemaRef ds:uri="http://schemas.microsoft.com/sharepoint/v3/contenttype/forms"/>
+    <ds:schemaRef ds:uri="http://schemas.microsoft.com/office/2006/metadata/properties"/>
+    <ds:schemaRef ds:uri="http://schemas.microsoft.com/office/infopath/2007/PartnerControls"/>
+    <ds:schemaRef ds:uri="71af3243-3dd4-4a8d-8c0d-dd76da1f02a5"/>
   </ds:schemaRefs>
 </ds:datastoreItem>
 </file>
 
 <file path=customXml/itemProps2.xml><?xml version="1.0" encoding="utf-8"?>
-<ds:datastoreItem xmlns:ds="http://schemas.openxmlformats.org/officeDocument/2006/customXml" ds:itemID="{9DFCC198-DBFA-46B2-A241-8E3888E63670}">
+<ds:datastoreItem xmlns:ds="http://schemas.openxmlformats.org/officeDocument/2006/customXml" ds:itemID="{C0DCE9DA-F7FD-45FA-83B7-D9813A44258A}">
   <ds:schemaRefs>
-    <ds:schemaRef ds:uri="http://schemas.microsoft.com/office/2006/metadata/properties"/>
-    <ds:schemaRef ds:uri="http://schemas.microsoft.com/office/infopath/2007/PartnerControls"/>
-    <ds:schemaRef ds:uri="71af3243-3dd4-4a8d-8c0d-dd76da1f02a5"/>
+    <ds:schemaRef ds:uri="http://schemas.microsoft.com/sharepoint/v3/contenttype/forms"/>
   </ds:schemaRefs>
 </ds:datastoreItem>
 </file>

</xml_diff>

<commit_message>
edits to presentation and nf data3
</commit_message>
<xml_diff>
--- a/Project_1.pptx
+++ b/Project_1.pptx
@@ -5,7 +5,7 @@
     <p:sldMasterId id="2147483733" r:id="rId4"/>
   </p:sldMasterIdLst>
   <p:notesMasterIdLst>
-    <p:notesMasterId r:id="rId25"/>
+    <p:notesMasterId r:id="rId26"/>
   </p:notesMasterIdLst>
   <p:sldIdLst>
     <p:sldId id="401" r:id="rId5"/>
@@ -18,16 +18,17 @@
     <p:sldId id="426" r:id="rId12"/>
     <p:sldId id="418" r:id="rId13"/>
     <p:sldId id="396" r:id="rId14"/>
-    <p:sldId id="424" r:id="rId15"/>
-    <p:sldId id="397" r:id="rId16"/>
-    <p:sldId id="419" r:id="rId17"/>
-    <p:sldId id="423" r:id="rId18"/>
-    <p:sldId id="425" r:id="rId19"/>
-    <p:sldId id="420" r:id="rId20"/>
-    <p:sldId id="422" r:id="rId21"/>
-    <p:sldId id="408" r:id="rId22"/>
-    <p:sldId id="427" r:id="rId23"/>
-    <p:sldId id="409" r:id="rId24"/>
+    <p:sldId id="428" r:id="rId15"/>
+    <p:sldId id="424" r:id="rId16"/>
+    <p:sldId id="397" r:id="rId17"/>
+    <p:sldId id="419" r:id="rId18"/>
+    <p:sldId id="423" r:id="rId19"/>
+    <p:sldId id="425" r:id="rId20"/>
+    <p:sldId id="420" r:id="rId21"/>
+    <p:sldId id="422" r:id="rId22"/>
+    <p:sldId id="408" r:id="rId23"/>
+    <p:sldId id="427" r:id="rId24"/>
+    <p:sldId id="409" r:id="rId25"/>
   </p:sldIdLst>
   <p:sldSz cx="12192000" cy="6858000"/>
   <p:notesSz cx="6858000" cy="9144000"/>
@@ -145,6 +146,7 @@
             <p14:sldId id="426"/>
             <p14:sldId id="418"/>
             <p14:sldId id="396"/>
+            <p14:sldId id="428"/>
             <p14:sldId id="424"/>
             <p14:sldId id="397"/>
             <p14:sldId id="419"/>
@@ -196,7 +198,7 @@
 <file path=ppt/revisionInfo.xml><?xml version="1.0" encoding="utf-8"?>
 <p1510:revInfo xmlns:a="http://schemas.openxmlformats.org/drawingml/2006/main" xmlns:r="http://schemas.openxmlformats.org/officeDocument/2006/relationships" xmlns:p1510="http://schemas.microsoft.com/office/powerpoint/2015/10/main">
   <p1510:revLst>
-    <p1510:client id="{F777C335-4339-49C5-8275-414B08422B2B}" v="13" dt="2022-04-29T16:28:49.380"/>
+    <p1510:client id="{F777C335-4339-49C5-8275-414B08422B2B}" v="18" dt="2022-04-29T19:36:35.508"/>
   </p1510:revLst>
 </p1510:revInfo>
 </file>
@@ -206,16 +208,24 @@
   <pc:docChgLst>
     <pc:chgData name="Stefanie Gagnon" userId="f874ef52da13a6b2" providerId="LiveId" clId="{F777C335-4339-49C5-8275-414B08422B2B}"/>
     <pc:docChg chg="undo custSel addSld delSld modSld sldOrd modSection">
-      <pc:chgData name="Stefanie Gagnon" userId="f874ef52da13a6b2" providerId="LiveId" clId="{F777C335-4339-49C5-8275-414B08422B2B}" dt="2022-04-29T16:48:52.330" v="2292" actId="20577"/>
+      <pc:chgData name="Stefanie Gagnon" userId="f874ef52da13a6b2" providerId="LiveId" clId="{F777C335-4339-49C5-8275-414B08422B2B}" dt="2022-04-29T19:38:10.542" v="2375" actId="1076"/>
       <pc:docMkLst>
         <pc:docMk/>
       </pc:docMkLst>
-      <pc:sldChg chg="modSp mod modNotesTx">
-        <pc:chgData name="Stefanie Gagnon" userId="f874ef52da13a6b2" providerId="LiveId" clId="{F777C335-4339-49C5-8275-414B08422B2B}" dt="2022-04-29T16:19:58.111" v="1739" actId="20577"/>
+      <pc:sldChg chg="addSp delSp modSp mod modNotesTx">
+        <pc:chgData name="Stefanie Gagnon" userId="f874ef52da13a6b2" providerId="LiveId" clId="{F777C335-4339-49C5-8275-414B08422B2B}" dt="2022-04-29T19:35:53.304" v="2325" actId="1076"/>
         <pc:sldMkLst>
           <pc:docMk/>
           <pc:sldMk cId="4093317005" sldId="396"/>
         </pc:sldMkLst>
+        <pc:spChg chg="mod">
+          <ac:chgData name="Stefanie Gagnon" userId="f874ef52da13a6b2" providerId="LiveId" clId="{F777C335-4339-49C5-8275-414B08422B2B}" dt="2022-04-29T19:35:53.304" v="2325" actId="1076"/>
+          <ac:spMkLst>
+            <pc:docMk/>
+            <pc:sldMk cId="4093317005" sldId="396"/>
+            <ac:spMk id="2" creationId="{6D602820-7F02-4F5F-8933-C0B61CFA2E08}"/>
+          </ac:spMkLst>
+        </pc:spChg>
         <pc:spChg chg="mod">
           <ac:chgData name="Stefanie Gagnon" userId="f874ef52da13a6b2" providerId="LiveId" clId="{F777C335-4339-49C5-8275-414B08422B2B}" dt="2022-04-29T14:28:05.234" v="1125" actId="20577"/>
           <ac:spMkLst>
@@ -232,6 +242,30 @@
             <ac:spMk id="5" creationId="{D00329E9-36A4-4FA9-9FBD-412BCEF20954}"/>
           </ac:spMkLst>
         </pc:spChg>
+        <pc:spChg chg="add mod">
+          <ac:chgData name="Stefanie Gagnon" userId="f874ef52da13a6b2" providerId="LiveId" clId="{F777C335-4339-49C5-8275-414B08422B2B}" dt="2022-04-29T18:26:18.503" v="2317" actId="478"/>
+          <ac:spMkLst>
+            <pc:docMk/>
+            <pc:sldMk cId="4093317005" sldId="396"/>
+            <ac:spMk id="6" creationId="{4A40EFB5-4CC7-40AB-A124-4A85A2850200}"/>
+          </ac:spMkLst>
+        </pc:spChg>
+        <pc:picChg chg="add mod">
+          <ac:chgData name="Stefanie Gagnon" userId="f874ef52da13a6b2" providerId="LiveId" clId="{F777C335-4339-49C5-8275-414B08422B2B}" dt="2022-04-29T18:27:04.614" v="2324" actId="1076"/>
+          <ac:picMkLst>
+            <pc:docMk/>
+            <pc:sldMk cId="4093317005" sldId="396"/>
+            <ac:picMk id="12" creationId="{DC0EF69A-C604-445E-9E7C-CA47FF16BC75}"/>
+          </ac:picMkLst>
+        </pc:picChg>
+        <pc:picChg chg="del">
+          <ac:chgData name="Stefanie Gagnon" userId="f874ef52da13a6b2" providerId="LiveId" clId="{F777C335-4339-49C5-8275-414B08422B2B}" dt="2022-04-29T18:26:18.503" v="2317" actId="478"/>
+          <ac:picMkLst>
+            <pc:docMk/>
+            <pc:sldMk cId="4093317005" sldId="396"/>
+            <ac:picMk id="37" creationId="{4A9C06AE-8973-40F1-B860-BAEFCC9CDC4E}"/>
+          </ac:picMkLst>
+        </pc:picChg>
       </pc:sldChg>
       <pc:sldChg chg="modNotesTx">
         <pc:chgData name="Stefanie Gagnon" userId="f874ef52da13a6b2" providerId="LiveId" clId="{F777C335-4339-49C5-8275-414B08422B2B}" dt="2022-04-29T16:22:49.069" v="1930" actId="20577"/>
@@ -767,7 +801,7 @@
         </pc:spChg>
       </pc:sldChg>
       <pc:sldChg chg="addSp delSp modSp new mod modClrScheme chgLayout">
-        <pc:chgData name="Stefanie Gagnon" userId="f874ef52da13a6b2" providerId="LiveId" clId="{F777C335-4339-49C5-8275-414B08422B2B}" dt="2022-04-29T15:13:56.813" v="1350" actId="1076"/>
+        <pc:chgData name="Stefanie Gagnon" userId="f874ef52da13a6b2" providerId="LiveId" clId="{F777C335-4339-49C5-8275-414B08422B2B}" dt="2022-04-29T18:26:28.569" v="2319" actId="1076"/>
         <pc:sldMkLst>
           <pc:docMk/>
           <pc:sldMk cId="1571354348" sldId="426"/>
@@ -829,7 +863,7 @@
           </ac:spMkLst>
         </pc:spChg>
         <pc:spChg chg="add mod">
-          <ac:chgData name="Stefanie Gagnon" userId="f874ef52da13a6b2" providerId="LiveId" clId="{F777C335-4339-49C5-8275-414B08422B2B}" dt="2022-04-29T15:11:16.954" v="1283" actId="20577"/>
+          <ac:chgData name="Stefanie Gagnon" userId="f874ef52da13a6b2" providerId="LiveId" clId="{F777C335-4339-49C5-8275-414B08422B2B}" dt="2022-04-29T18:25:49.996" v="2316" actId="1076"/>
           <ac:spMkLst>
             <pc:docMk/>
             <pc:sldMk cId="1571354348" sldId="426"/>
@@ -844,8 +878,8 @@
             <ac:spMk id="17" creationId="{5B56281B-EC47-3351-3BF6-1528E2DB5DE0}"/>
           </ac:spMkLst>
         </pc:spChg>
-        <pc:spChg chg="add mod">
-          <ac:chgData name="Stefanie Gagnon" userId="f874ef52da13a6b2" providerId="LiveId" clId="{F777C335-4339-49C5-8275-414B08422B2B}" dt="2022-04-29T15:13:21.876" v="1349" actId="20577"/>
+        <pc:spChg chg="add del mod">
+          <ac:chgData name="Stefanie Gagnon" userId="f874ef52da13a6b2" providerId="LiveId" clId="{F777C335-4339-49C5-8275-414B08422B2B}" dt="2022-04-29T18:25:39.360" v="2314" actId="478"/>
           <ac:spMkLst>
             <pc:docMk/>
             <pc:sldMk cId="1571354348" sldId="426"/>
@@ -861,15 +895,31 @@
           </ac:spMkLst>
         </pc:spChg>
         <pc:picChg chg="add mod">
-          <ac:chgData name="Stefanie Gagnon" userId="f874ef52da13a6b2" providerId="LiveId" clId="{F777C335-4339-49C5-8275-414B08422B2B}" dt="2022-04-29T15:12:20.417" v="1310" actId="1076"/>
+          <ac:chgData name="Stefanie Gagnon" userId="f874ef52da13a6b2" providerId="LiveId" clId="{F777C335-4339-49C5-8275-414B08422B2B}" dt="2022-04-29T18:26:22.351" v="2318" actId="1076"/>
+          <ac:picMkLst>
+            <pc:docMk/>
+            <pc:sldMk cId="1571354348" sldId="426"/>
+            <ac:picMk id="3" creationId="{9F745537-E55D-4819-AF96-FF4CCADB8203}"/>
+          </ac:picMkLst>
+        </pc:picChg>
+        <pc:picChg chg="add mod">
+          <ac:chgData name="Stefanie Gagnon" userId="f874ef52da13a6b2" providerId="LiveId" clId="{F777C335-4339-49C5-8275-414B08422B2B}" dt="2022-04-29T18:26:28.569" v="2319" actId="1076"/>
+          <ac:picMkLst>
+            <pc:docMk/>
+            <pc:sldMk cId="1571354348" sldId="426"/>
+            <ac:picMk id="5" creationId="{0782A463-3984-4364-AA1B-1E7191386C2D}"/>
+          </ac:picMkLst>
+        </pc:picChg>
+        <pc:picChg chg="add del mod">
+          <ac:chgData name="Stefanie Gagnon" userId="f874ef52da13a6b2" providerId="LiveId" clId="{F777C335-4339-49C5-8275-414B08422B2B}" dt="2022-04-29T18:23:08.922" v="2294" actId="478"/>
           <ac:picMkLst>
             <pc:docMk/>
             <pc:sldMk cId="1571354348" sldId="426"/>
             <ac:picMk id="6" creationId="{A9E9B182-3741-43BB-A142-74EE2FF97891}"/>
           </ac:picMkLst>
         </pc:picChg>
-        <pc:picChg chg="add mod">
-          <ac:chgData name="Stefanie Gagnon" userId="f874ef52da13a6b2" providerId="LiveId" clId="{F777C335-4339-49C5-8275-414B08422B2B}" dt="2022-04-29T15:13:56.813" v="1350" actId="1076"/>
+        <pc:picChg chg="add del mod">
+          <ac:chgData name="Stefanie Gagnon" userId="f874ef52da13a6b2" providerId="LiveId" clId="{F777C335-4339-49C5-8275-414B08422B2B}" dt="2022-04-29T18:23:07.091" v="2293" actId="478"/>
           <ac:picMkLst>
             <pc:docMk/>
             <pc:sldMk cId="1571354348" sldId="426"/>
@@ -922,6 +972,77 @@
           <pc:docMk/>
           <pc:sldMk cId="311096978" sldId="428"/>
         </pc:sldMkLst>
+      </pc:sldChg>
+      <pc:sldChg chg="addSp delSp modSp add mod">
+        <pc:chgData name="Stefanie Gagnon" userId="f874ef52da13a6b2" providerId="LiveId" clId="{F777C335-4339-49C5-8275-414B08422B2B}" dt="2022-04-29T19:38:10.542" v="2375" actId="1076"/>
+        <pc:sldMkLst>
+          <pc:docMk/>
+          <pc:sldMk cId="3004099782" sldId="428"/>
+        </pc:sldMkLst>
+        <pc:spChg chg="mod">
+          <ac:chgData name="Stefanie Gagnon" userId="f874ef52da13a6b2" providerId="LiveId" clId="{F777C335-4339-49C5-8275-414B08422B2B}" dt="2022-04-29T19:37:22.669" v="2368" actId="20577"/>
+          <ac:spMkLst>
+            <pc:docMk/>
+            <pc:sldMk cId="3004099782" sldId="428"/>
+            <ac:spMk id="2" creationId="{6D602820-7F02-4F5F-8933-C0B61CFA2E08}"/>
+          </ac:spMkLst>
+        </pc:spChg>
+        <pc:spChg chg="del">
+          <ac:chgData name="Stefanie Gagnon" userId="f874ef52da13a6b2" providerId="LiveId" clId="{F777C335-4339-49C5-8275-414B08422B2B}" dt="2022-04-29T19:36:35.508" v="2331" actId="931"/>
+          <ac:spMkLst>
+            <pc:docMk/>
+            <pc:sldMk cId="3004099782" sldId="428"/>
+            <ac:spMk id="6" creationId="{4A40EFB5-4CC7-40AB-A124-4A85A2850200}"/>
+          </ac:spMkLst>
+        </pc:spChg>
+        <pc:spChg chg="add del mod">
+          <ac:chgData name="Stefanie Gagnon" userId="f874ef52da13a6b2" providerId="LiveId" clId="{F777C335-4339-49C5-8275-414B08422B2B}" dt="2022-04-29T19:37:29.879" v="2370" actId="478"/>
+          <ac:spMkLst>
+            <pc:docMk/>
+            <pc:sldMk cId="3004099782" sldId="428"/>
+            <ac:spMk id="10" creationId="{D38B60DE-531B-4F31-B62B-F1863DB04662}"/>
+          </ac:spMkLst>
+        </pc:spChg>
+        <pc:spChg chg="del mod">
+          <ac:chgData name="Stefanie Gagnon" userId="f874ef52da13a6b2" providerId="LiveId" clId="{F777C335-4339-49C5-8275-414B08422B2B}" dt="2022-04-29T19:36:52.820" v="2337" actId="478"/>
+          <ac:spMkLst>
+            <pc:docMk/>
+            <pc:sldMk cId="3004099782" sldId="428"/>
+            <ac:spMk id="46" creationId="{E35F34B1-55CF-2AA3-8AC6-949E3396103C}"/>
+          </ac:spMkLst>
+        </pc:spChg>
+        <pc:spChg chg="mod">
+          <ac:chgData name="Stefanie Gagnon" userId="f874ef52da13a6b2" providerId="LiveId" clId="{F777C335-4339-49C5-8275-414B08422B2B}" dt="2022-04-29T19:37:49.086" v="2372" actId="1076"/>
+          <ac:spMkLst>
+            <pc:docMk/>
+            <pc:sldMk cId="3004099782" sldId="428"/>
+            <ac:spMk id="48" creationId="{5776AB68-59B6-875F-6C60-0C2D9EB6B761}"/>
+          </ac:spMkLst>
+        </pc:spChg>
+        <pc:picChg chg="add mod">
+          <ac:chgData name="Stefanie Gagnon" userId="f874ef52da13a6b2" providerId="LiveId" clId="{F777C335-4339-49C5-8275-414B08422B2B}" dt="2022-04-29T19:38:01.833" v="2374" actId="1076"/>
+          <ac:picMkLst>
+            <pc:docMk/>
+            <pc:sldMk cId="3004099782" sldId="428"/>
+            <ac:picMk id="8" creationId="{F5CAD9D7-2AF4-4896-8734-D5931071F72C}"/>
+          </ac:picMkLst>
+        </pc:picChg>
+        <pc:picChg chg="del mod">
+          <ac:chgData name="Stefanie Gagnon" userId="f874ef52da13a6b2" providerId="LiveId" clId="{F777C335-4339-49C5-8275-414B08422B2B}" dt="2022-04-29T19:36:06.732" v="2330" actId="478"/>
+          <ac:picMkLst>
+            <pc:docMk/>
+            <pc:sldMk cId="3004099782" sldId="428"/>
+            <ac:picMk id="12" creationId="{DC0EF69A-C604-445E-9E7C-CA47FF16BC75}"/>
+          </ac:picMkLst>
+        </pc:picChg>
+        <pc:picChg chg="mod">
+          <ac:chgData name="Stefanie Gagnon" userId="f874ef52da13a6b2" providerId="LiveId" clId="{F777C335-4339-49C5-8275-414B08422B2B}" dt="2022-04-29T19:38:10.542" v="2375" actId="1076"/>
+          <ac:picMkLst>
+            <pc:docMk/>
+            <pc:sldMk cId="3004099782" sldId="428"/>
+            <ac:picMk id="41" creationId="{D67CA551-B856-4FBC-9D20-BD732A0DDDE5}"/>
+          </ac:picMkLst>
+        </pc:picChg>
       </pc:sldChg>
     </pc:docChg>
   </pc:docChgLst>
@@ -6202,6 +6323,93 @@
           <a:p>
             <a:r>
               <a:rPr lang="en-US" dirty="0"/>
+              <a:t>We may want to take out TV ratings, anything in the Rating types pie chart with TV in front of the rating</a:t>
+            </a:r>
+          </a:p>
+        </p:txBody>
+      </p:sp>
+      <p:sp>
+        <p:nvSpPr>
+          <p:cNvPr id="4" name="Slide Number Placeholder 3"/>
+          <p:cNvSpPr>
+            <a:spLocks noGrp="1"/>
+          </p:cNvSpPr>
+          <p:nvPr>
+            <p:ph type="sldNum" sz="quarter" idx="5"/>
+          </p:nvPr>
+        </p:nvSpPr>
+        <p:spPr/>
+        <p:txBody>
+          <a:bodyPr/>
+          <a:lstStyle/>
+          <a:p>
+            <a:fld id="{0D0EDF81-139F-488C-872B-4720FBA6BF98}" type="slidenum">
+              <a:rPr lang="en-US" smtClean="0"/>
+              <a:t>11</a:t>
+            </a:fld>
+            <a:endParaRPr lang="en-US" dirty="0"/>
+          </a:p>
+        </p:txBody>
+      </p:sp>
+    </p:spTree>
+    <p:extLst>
+      <p:ext uri="{BB962C8B-B14F-4D97-AF65-F5344CB8AC3E}">
+        <p14:creationId xmlns:p14="http://schemas.microsoft.com/office/powerpoint/2010/main" val="689395944"/>
+      </p:ext>
+    </p:extLst>
+  </p:cSld>
+  <p:clrMapOvr>
+    <a:masterClrMapping/>
+  </p:clrMapOvr>
+</p:notes>
+</file>
+
+<file path=ppt/notesSlides/notesSlide5.xml><?xml version="1.0" encoding="utf-8"?>
+<p:notes xmlns:a="http://schemas.openxmlformats.org/drawingml/2006/main" xmlns:r="http://schemas.openxmlformats.org/officeDocument/2006/relationships" xmlns:p="http://schemas.openxmlformats.org/presentationml/2006/main">
+  <p:cSld>
+    <p:spTree>
+      <p:nvGrpSpPr>
+        <p:cNvPr id="1" name=""/>
+        <p:cNvGrpSpPr/>
+        <p:nvPr/>
+      </p:nvGrpSpPr>
+      <p:grpSpPr>
+        <a:xfrm>
+          <a:off x="0" y="0"/>
+          <a:ext cx="0" cy="0"/>
+          <a:chOff x="0" y="0"/>
+          <a:chExt cx="0" cy="0"/>
+        </a:xfrm>
+      </p:grpSpPr>
+      <p:sp>
+        <p:nvSpPr>
+          <p:cNvPr id="2" name="Slide Image Placeholder 1"/>
+          <p:cNvSpPr>
+            <a:spLocks noGrp="1" noRot="1" noChangeAspect="1"/>
+          </p:cNvSpPr>
+          <p:nvPr>
+            <p:ph type="sldImg"/>
+          </p:nvPr>
+        </p:nvSpPr>
+        <p:spPr/>
+      </p:sp>
+      <p:sp>
+        <p:nvSpPr>
+          <p:cNvPr id="3" name="Notes Placeholder 2"/>
+          <p:cNvSpPr>
+            <a:spLocks noGrp="1"/>
+          </p:cNvSpPr>
+          <p:nvPr>
+            <p:ph type="body" idx="1"/>
+          </p:nvPr>
+        </p:nvSpPr>
+        <p:spPr/>
+        <p:txBody>
+          <a:bodyPr/>
+          <a:lstStyle/>
+          <a:p>
+            <a:r>
+              <a:rPr lang="en-US" dirty="0"/>
               <a:t>Include one with only movie ratings (since we are focusing more on movie data in our cleaned data)</a:t>
             </a:r>
           </a:p>
@@ -6224,7 +6432,7 @@
           <a:p>
             <a:fld id="{0D0EDF81-139F-488C-872B-4720FBA6BF98}" type="slidenum">
               <a:rPr lang="en-US" smtClean="0"/>
-              <a:t>12</a:t>
+              <a:t>13</a:t>
             </a:fld>
             <a:endParaRPr lang="en-US" dirty="0"/>
           </a:p>
@@ -6243,7 +6451,7 @@
 </p:notes>
 </file>
 
-<file path=ppt/notesSlides/notesSlide5.xml><?xml version="1.0" encoding="utf-8"?>
+<file path=ppt/notesSlides/notesSlide6.xml><?xml version="1.0" encoding="utf-8"?>
 <p:notes xmlns:a="http://schemas.openxmlformats.org/drawingml/2006/main" xmlns:r="http://schemas.openxmlformats.org/officeDocument/2006/relationships" xmlns:p="http://schemas.openxmlformats.org/presentationml/2006/main">
   <p:cSld>
     <p:spTree>
@@ -6317,7 +6525,7 @@
           <a:p>
             <a:fld id="{0D0EDF81-139F-488C-872B-4720FBA6BF98}" type="slidenum">
               <a:rPr lang="en-US" smtClean="0"/>
-              <a:t>14</a:t>
+              <a:t>15</a:t>
             </a:fld>
             <a:endParaRPr lang="en-US" dirty="0"/>
           </a:p>
@@ -6336,7 +6544,7 @@
 </p:notes>
 </file>
 
-<file path=ppt/notesSlides/notesSlide6.xml><?xml version="1.0" encoding="utf-8"?>
+<file path=ppt/notesSlides/notesSlide7.xml><?xml version="1.0" encoding="utf-8"?>
 <p:notes xmlns:a="http://schemas.openxmlformats.org/drawingml/2006/main" xmlns:r="http://schemas.openxmlformats.org/officeDocument/2006/relationships" xmlns:p="http://schemas.openxmlformats.org/presentationml/2006/main">
   <p:cSld>
     <p:spTree>
@@ -6416,7 +6624,7 @@
           <a:p>
             <a:fld id="{0D0EDF81-139F-488C-872B-4720FBA6BF98}" type="slidenum">
               <a:rPr lang="en-US" smtClean="0"/>
-              <a:t>16</a:t>
+              <a:t>17</a:t>
             </a:fld>
             <a:endParaRPr lang="en-US" dirty="0"/>
           </a:p>
@@ -6435,7 +6643,7 @@
 </p:notes>
 </file>
 
-<file path=ppt/notesSlides/notesSlide7.xml><?xml version="1.0" encoding="utf-8"?>
+<file path=ppt/notesSlides/notesSlide8.xml><?xml version="1.0" encoding="utf-8"?>
 <p:notes xmlns:a="http://schemas.openxmlformats.org/drawingml/2006/main" xmlns:r="http://schemas.openxmlformats.org/officeDocument/2006/relationships" xmlns:p="http://schemas.openxmlformats.org/presentationml/2006/main">
   <p:cSld>
     <p:spTree>
@@ -6515,7 +6723,7 @@
           <a:p>
             <a:fld id="{0D0EDF81-139F-488C-872B-4720FBA6BF98}" type="slidenum">
               <a:rPr lang="en-US" smtClean="0"/>
-              <a:t>17</a:t>
+              <a:t>18</a:t>
             </a:fld>
             <a:endParaRPr lang="en-US" dirty="0"/>
           </a:p>
@@ -6534,7 +6742,7 @@
 </p:notes>
 </file>
 
-<file path=ppt/notesSlides/notesSlide8.xml><?xml version="1.0" encoding="utf-8"?>
+<file path=ppt/notesSlides/notesSlide9.xml><?xml version="1.0" encoding="utf-8"?>
 <p:notes xmlns:a="http://schemas.openxmlformats.org/drawingml/2006/main" xmlns:r="http://schemas.openxmlformats.org/officeDocument/2006/relationships" xmlns:p="http://schemas.openxmlformats.org/presentationml/2006/main">
   <p:cSld>
     <p:spTree>
@@ -6608,7 +6816,7 @@
           <a:p>
             <a:fld id="{0D0EDF81-139F-488C-872B-4720FBA6BF98}" type="slidenum">
               <a:rPr lang="en-US" smtClean="0"/>
-              <a:t>19</a:t>
+              <a:t>20</a:t>
             </a:fld>
             <a:endParaRPr lang="en-US" dirty="0"/>
           </a:p>
@@ -39206,7 +39414,7 @@
         </p:nvSpPr>
         <p:spPr>
           <a:xfrm>
-            <a:off x="838200" y="365125"/>
+            <a:off x="838200" y="299811"/>
             <a:ext cx="10515600" cy="1325563"/>
           </a:xfrm>
         </p:spPr>
@@ -39256,36 +39464,6 @@
           </a:p>
         </p:txBody>
       </p:sp>
-      <p:pic>
-        <p:nvPicPr>
-          <p:cNvPr id="37" name="Content Placeholder 36" descr="A picture containing pie chart&#10;&#10;Description automatically generated">
-            <a:extLst>
-              <a:ext uri="{FF2B5EF4-FFF2-40B4-BE49-F238E27FC236}">
-                <a16:creationId xmlns:a16="http://schemas.microsoft.com/office/drawing/2014/main" id="{4A9C06AE-8973-40F1-B860-BAEFCC9CDC4E}"/>
-              </a:ext>
-            </a:extLst>
-          </p:cNvPr>
-          <p:cNvPicPr>
-            <a:picLocks noGrp="1" noChangeAspect="1"/>
-          </p:cNvPicPr>
-          <p:nvPr>
-            <p:ph sz="half" idx="2"/>
-          </p:nvPr>
-        </p:nvPicPr>
-        <p:blipFill>
-          <a:blip r:embed="rId3"/>
-          <a:stretch>
-            <a:fillRect/>
-          </a:stretch>
-        </p:blipFill>
-        <p:spPr>
-          <a:xfrm>
-            <a:off x="1777048" y="2194624"/>
-            <a:ext cx="3995864" cy="3995864"/>
-          </a:xfrm>
-          <a:noFill/>
-        </p:spPr>
-      </p:pic>
       <p:sp>
         <p:nvSpPr>
           <p:cNvPr id="48" name="Text Placeholder 4">
@@ -39336,7 +39514,7 @@
           </p:nvPr>
         </p:nvPicPr>
         <p:blipFill>
-          <a:blip r:embed="rId4"/>
+          <a:blip r:embed="rId3"/>
           <a:stretch>
             <a:fillRect/>
           </a:stretch>
@@ -39475,6 +39653,61 @@
           </a:p>
         </p:txBody>
       </p:sp>
+      <p:sp>
+        <p:nvSpPr>
+          <p:cNvPr id="6" name="Content Placeholder 5">
+            <a:extLst>
+              <a:ext uri="{FF2B5EF4-FFF2-40B4-BE49-F238E27FC236}">
+                <a16:creationId xmlns:a16="http://schemas.microsoft.com/office/drawing/2014/main" id="{4A40EFB5-4CC7-40AB-A124-4A85A2850200}"/>
+              </a:ext>
+            </a:extLst>
+          </p:cNvPr>
+          <p:cNvSpPr>
+            <a:spLocks noGrp="1"/>
+          </p:cNvSpPr>
+          <p:nvPr>
+            <p:ph sz="half" idx="2"/>
+          </p:nvPr>
+        </p:nvSpPr>
+        <p:spPr/>
+        <p:txBody>
+          <a:bodyPr/>
+          <a:lstStyle/>
+          <a:p>
+            <a:endParaRPr lang="en-US"/>
+          </a:p>
+        </p:txBody>
+      </p:sp>
+      <p:pic>
+        <p:nvPicPr>
+          <p:cNvPr id="12" name="Picture 11" descr="Chart, pie chart&#10;&#10;Description automatically generated">
+            <a:extLst>
+              <a:ext uri="{FF2B5EF4-FFF2-40B4-BE49-F238E27FC236}">
+                <a16:creationId xmlns:a16="http://schemas.microsoft.com/office/drawing/2014/main" id="{DC0EF69A-C604-445E-9E7C-CA47FF16BC75}"/>
+              </a:ext>
+            </a:extLst>
+          </p:cNvPr>
+          <p:cNvPicPr>
+            <a:picLocks noChangeAspect="1"/>
+          </p:cNvPicPr>
+          <p:nvPr/>
+        </p:nvPicPr>
+        <p:blipFill>
+          <a:blip r:embed="rId4"/>
+          <a:stretch>
+            <a:fillRect/>
+          </a:stretch>
+        </p:blipFill>
+        <p:spPr>
+          <a:xfrm>
+            <a:off x="2078696" y="2619105"/>
+            <a:ext cx="3919807" cy="3919807"/>
+          </a:xfrm>
+          <a:prstGeom prst="rect">
+            <a:avLst/>
+          </a:prstGeom>
+        </p:spPr>
+      </p:pic>
     </p:spTree>
     <p:extLst>
       <p:ext uri="{BB962C8B-B14F-4D97-AF65-F5344CB8AC3E}">
@@ -39489,6 +39722,289 @@
 </file>
 
 <file path=ppt/slides/slide11.xml><?xml version="1.0" encoding="utf-8"?>
+<p:sld xmlns:a="http://schemas.openxmlformats.org/drawingml/2006/main" xmlns:r="http://schemas.openxmlformats.org/officeDocument/2006/relationships" xmlns:p="http://schemas.openxmlformats.org/presentationml/2006/main">
+  <p:cSld>
+    <p:spTree>
+      <p:nvGrpSpPr>
+        <p:cNvPr id="1" name=""/>
+        <p:cNvGrpSpPr/>
+        <p:nvPr/>
+      </p:nvGrpSpPr>
+      <p:grpSpPr>
+        <a:xfrm>
+          <a:off x="0" y="0"/>
+          <a:ext cx="0" cy="0"/>
+          <a:chOff x="0" y="0"/>
+          <a:chExt cx="0" cy="0"/>
+        </a:xfrm>
+      </p:grpSpPr>
+      <p:sp>
+        <p:nvSpPr>
+          <p:cNvPr id="2" name="Title 1">
+            <a:extLst>
+              <a:ext uri="{FF2B5EF4-FFF2-40B4-BE49-F238E27FC236}">
+                <a16:creationId xmlns:a16="http://schemas.microsoft.com/office/drawing/2014/main" id="{6D602820-7F02-4F5F-8933-C0B61CFA2E08}"/>
+              </a:ext>
+            </a:extLst>
+          </p:cNvPr>
+          <p:cNvSpPr>
+            <a:spLocks noGrp="1"/>
+          </p:cNvSpPr>
+          <p:nvPr>
+            <p:ph type="title"/>
+          </p:nvPr>
+        </p:nvSpPr>
+        <p:spPr>
+          <a:xfrm>
+            <a:off x="838200" y="365125"/>
+            <a:ext cx="10515600" cy="1325563"/>
+          </a:xfrm>
+        </p:spPr>
+        <p:txBody>
+          <a:bodyPr anchor="ctr">
+            <a:normAutofit/>
+          </a:bodyPr>
+          <a:lstStyle/>
+          <a:p>
+            <a:r>
+              <a:rPr lang="en-US" dirty="0"/>
+              <a:t>Content by rating</a:t>
+            </a:r>
+          </a:p>
+        </p:txBody>
+      </p:sp>
+      <p:sp>
+        <p:nvSpPr>
+          <p:cNvPr id="48" name="Text Placeholder 4">
+            <a:extLst>
+              <a:ext uri="{FF2B5EF4-FFF2-40B4-BE49-F238E27FC236}">
+                <a16:creationId xmlns:a16="http://schemas.microsoft.com/office/drawing/2014/main" id="{5776AB68-59B6-875F-6C60-0C2D9EB6B761}"/>
+              </a:ext>
+            </a:extLst>
+          </p:cNvPr>
+          <p:cNvSpPr>
+            <a:spLocks noGrp="1"/>
+          </p:cNvSpPr>
+          <p:nvPr>
+            <p:ph type="body" sz="quarter" idx="3"/>
+          </p:nvPr>
+        </p:nvSpPr>
+        <p:spPr>
+          <a:xfrm>
+            <a:off x="4143974" y="1550099"/>
+            <a:ext cx="4937760" cy="950976"/>
+          </a:xfrm>
+        </p:spPr>
+        <p:txBody>
+          <a:bodyPr/>
+          <a:lstStyle/>
+          <a:p>
+            <a:r>
+              <a:rPr lang="en-US" dirty="0"/>
+              <a:t>Rating types</a:t>
+            </a:r>
+          </a:p>
+        </p:txBody>
+      </p:sp>
+      <p:pic>
+        <p:nvPicPr>
+          <p:cNvPr id="41" name="Content Placeholder 40" descr="Chart, pie chart&#10;&#10;Description automatically generated">
+            <a:extLst>
+              <a:ext uri="{FF2B5EF4-FFF2-40B4-BE49-F238E27FC236}">
+                <a16:creationId xmlns:a16="http://schemas.microsoft.com/office/drawing/2014/main" id="{D67CA551-B856-4FBC-9D20-BD732A0DDDE5}"/>
+              </a:ext>
+            </a:extLst>
+          </p:cNvPr>
+          <p:cNvPicPr>
+            <a:picLocks noGrp="1" noChangeAspect="1"/>
+          </p:cNvPicPr>
+          <p:nvPr>
+            <p:ph sz="quarter" idx="4"/>
+          </p:nvPr>
+        </p:nvPicPr>
+        <p:blipFill>
+          <a:blip r:embed="rId3"/>
+          <a:stretch>
+            <a:fillRect/>
+          </a:stretch>
+        </p:blipFill>
+        <p:spPr>
+          <a:xfrm>
+            <a:off x="8391644" y="1690688"/>
+            <a:ext cx="3995864" cy="3995864"/>
+          </a:xfrm>
+          <a:noFill/>
+        </p:spPr>
+      </p:pic>
+      <p:sp>
+        <p:nvSpPr>
+          <p:cNvPr id="4" name="Date Placeholder 5">
+            <a:extLst>
+              <a:ext uri="{FF2B5EF4-FFF2-40B4-BE49-F238E27FC236}">
+                <a16:creationId xmlns:a16="http://schemas.microsoft.com/office/drawing/2014/main" id="{523A727A-BD22-42EE-9500-BBEF455DA5DE}"/>
+              </a:ext>
+            </a:extLst>
+          </p:cNvPr>
+          <p:cNvSpPr>
+            <a:spLocks noGrp="1"/>
+          </p:cNvSpPr>
+          <p:nvPr>
+            <p:ph type="dt" sz="half" idx="10"/>
+          </p:nvPr>
+        </p:nvSpPr>
+        <p:spPr>
+          <a:xfrm>
+            <a:off x="838200" y="6356350"/>
+            <a:ext cx="2743200" cy="365125"/>
+          </a:xfrm>
+        </p:spPr>
+        <p:txBody>
+          <a:bodyPr anchor="ctr">
+            <a:normAutofit/>
+          </a:bodyPr>
+          <a:lstStyle/>
+          <a:p>
+            <a:pPr>
+              <a:spcAft>
+                <a:spcPts val="600"/>
+              </a:spcAft>
+            </a:pPr>
+            <a:r>
+              <a:rPr lang="en-US" dirty="0"/>
+              <a:t>4/29/2022</a:t>
+            </a:r>
+          </a:p>
+        </p:txBody>
+      </p:sp>
+      <p:sp>
+        <p:nvSpPr>
+          <p:cNvPr id="5" name="Footer Placeholder 6">
+            <a:extLst>
+              <a:ext uri="{FF2B5EF4-FFF2-40B4-BE49-F238E27FC236}">
+                <a16:creationId xmlns:a16="http://schemas.microsoft.com/office/drawing/2014/main" id="{D00329E9-36A4-4FA9-9FBD-412BCEF20954}"/>
+              </a:ext>
+            </a:extLst>
+          </p:cNvPr>
+          <p:cNvSpPr>
+            <a:spLocks noGrp="1"/>
+          </p:cNvSpPr>
+          <p:nvPr>
+            <p:ph type="ftr" sz="quarter" idx="11"/>
+          </p:nvPr>
+        </p:nvSpPr>
+        <p:spPr>
+          <a:xfrm>
+            <a:off x="4038600" y="6356350"/>
+            <a:ext cx="4114800" cy="365125"/>
+          </a:xfrm>
+        </p:spPr>
+        <p:txBody>
+          <a:bodyPr anchor="ctr">
+            <a:normAutofit/>
+          </a:bodyPr>
+          <a:lstStyle/>
+          <a:p>
+            <a:pPr>
+              <a:spcAft>
+                <a:spcPts val="600"/>
+              </a:spcAft>
+            </a:pPr>
+            <a:r>
+              <a:rPr lang="en-US" dirty="0"/>
+              <a:t>Netflix</a:t>
+            </a:r>
+          </a:p>
+        </p:txBody>
+      </p:sp>
+      <p:sp>
+        <p:nvSpPr>
+          <p:cNvPr id="7" name="Slide Number Placeholder 7">
+            <a:extLst>
+              <a:ext uri="{FF2B5EF4-FFF2-40B4-BE49-F238E27FC236}">
+                <a16:creationId xmlns:a16="http://schemas.microsoft.com/office/drawing/2014/main" id="{F13D5288-11C4-425C-8C20-5E8A7E726773}"/>
+              </a:ext>
+            </a:extLst>
+          </p:cNvPr>
+          <p:cNvSpPr>
+            <a:spLocks noGrp="1"/>
+          </p:cNvSpPr>
+          <p:nvPr>
+            <p:ph type="sldNum" sz="quarter" idx="12"/>
+          </p:nvPr>
+        </p:nvSpPr>
+        <p:spPr>
+          <a:xfrm>
+            <a:off x="8610600" y="6356350"/>
+            <a:ext cx="2743200" cy="365125"/>
+          </a:xfrm>
+        </p:spPr>
+        <p:txBody>
+          <a:bodyPr anchor="ctr">
+            <a:normAutofit/>
+          </a:bodyPr>
+          <a:lstStyle/>
+          <a:p>
+            <a:pPr>
+              <a:spcAft>
+                <a:spcPts val="600"/>
+              </a:spcAft>
+            </a:pPr>
+            <a:fld id="{590024A9-0184-448B-881E-CC722A916CB1}" type="slidenum">
+              <a:rPr lang="en-US" smtClean="0"/>
+              <a:pPr>
+                <a:spcAft>
+                  <a:spcPts val="600"/>
+                </a:spcAft>
+              </a:pPr>
+              <a:t>11</a:t>
+            </a:fld>
+            <a:endParaRPr lang="en-US"/>
+          </a:p>
+        </p:txBody>
+      </p:sp>
+      <p:pic>
+        <p:nvPicPr>
+          <p:cNvPr id="8" name="Content Placeholder 7" descr="Chart&#10;&#10;Description automatically generated with medium confidence">
+            <a:extLst>
+              <a:ext uri="{FF2B5EF4-FFF2-40B4-BE49-F238E27FC236}">
+                <a16:creationId xmlns:a16="http://schemas.microsoft.com/office/drawing/2014/main" id="{F5CAD9D7-2AF4-4896-8734-D5931071F72C}"/>
+              </a:ext>
+            </a:extLst>
+          </p:cNvPr>
+          <p:cNvPicPr>
+            <a:picLocks noGrp="1" noChangeAspect="1"/>
+          </p:cNvPicPr>
+          <p:nvPr>
+            <p:ph sz="half" idx="2"/>
+          </p:nvPr>
+        </p:nvPicPr>
+        <p:blipFill>
+          <a:blip r:embed="rId4"/>
+          <a:stretch>
+            <a:fillRect/>
+          </a:stretch>
+        </p:blipFill>
+        <p:spPr>
+          <a:xfrm>
+            <a:off x="0" y="2777692"/>
+            <a:ext cx="8788321" cy="2197080"/>
+          </a:xfrm>
+        </p:spPr>
+      </p:pic>
+    </p:spTree>
+    <p:extLst>
+      <p:ext uri="{BB962C8B-B14F-4D97-AF65-F5344CB8AC3E}">
+        <p14:creationId xmlns:p14="http://schemas.microsoft.com/office/powerpoint/2010/main" val="3004099782"/>
+      </p:ext>
+    </p:extLst>
+  </p:cSld>
+  <p:clrMapOvr>
+    <a:masterClrMapping/>
+  </p:clrMapOvr>
+</p:sld>
+</file>
+
+<file path=ppt/slides/slide12.xml><?xml version="1.0" encoding="utf-8"?>
 <p:sld xmlns:a="http://schemas.openxmlformats.org/drawingml/2006/main" xmlns:r="http://schemas.openxmlformats.org/officeDocument/2006/relationships" xmlns:p="http://schemas.openxmlformats.org/presentationml/2006/main">
   <p:cSld>
     <p:spTree>
@@ -39690,7 +40206,7 @@
                   <a:spcPts val="600"/>
                 </a:spcAft>
               </a:pPr>
-              <a:t>11</a:t>
+              <a:t>12</a:t>
             </a:fld>
             <a:endParaRPr lang="en-US"/>
           </a:p>
@@ -39709,7 +40225,7 @@
 </p:sld>
 </file>
 
-<file path=ppt/slides/slide12.xml><?xml version="1.0" encoding="utf-8"?>
+<file path=ppt/slides/slide13.xml><?xml version="1.0" encoding="utf-8"?>
 <p:sld xmlns:a="http://schemas.openxmlformats.org/drawingml/2006/main" xmlns:r="http://schemas.openxmlformats.org/officeDocument/2006/relationships" xmlns:p="http://schemas.openxmlformats.org/presentationml/2006/main">
   <p:cSld>
     <p:spTree>
@@ -39833,7 +40349,7 @@
           <a:p>
             <a:fld id="{B9713C8C-8E70-45D5-AE59-23E60168254E}" type="slidenum">
               <a:rPr lang="en-US" smtClean="0"/>
-              <a:t>12</a:t>
+              <a:t>13</a:t>
             </a:fld>
             <a:endParaRPr lang="en-US" dirty="0"/>
           </a:p>
@@ -39881,7 +40397,7 @@
 </p:sld>
 </file>
 
-<file path=ppt/slides/slide13.xml><?xml version="1.0" encoding="utf-8"?>
+<file path=ppt/slides/slide14.xml><?xml version="1.0" encoding="utf-8"?>
 <p:sld xmlns:a="http://schemas.openxmlformats.org/drawingml/2006/main" xmlns:r="http://schemas.openxmlformats.org/officeDocument/2006/relationships" xmlns:p="http://schemas.openxmlformats.org/presentationml/2006/main">
   <p:cSld>
     <p:spTree>
@@ -40005,7 +40521,7 @@
           <a:p>
             <a:fld id="{B9713C8C-8E70-45D5-AE59-23E60168254E}" type="slidenum">
               <a:rPr lang="en-US" smtClean="0"/>
-              <a:t>13</a:t>
+              <a:t>14</a:t>
             </a:fld>
             <a:endParaRPr lang="en-US" dirty="0"/>
           </a:p>
@@ -40053,7 +40569,7 @@
 </p:sld>
 </file>
 
-<file path=ppt/slides/slide14.xml><?xml version="1.0" encoding="utf-8"?>
+<file path=ppt/slides/slide15.xml><?xml version="1.0" encoding="utf-8"?>
 <p:sld xmlns:a="http://schemas.openxmlformats.org/drawingml/2006/main" xmlns:r="http://schemas.openxmlformats.org/officeDocument/2006/relationships" xmlns:p="http://schemas.openxmlformats.org/presentationml/2006/main">
   <p:cSld>
     <p:spTree>
@@ -40208,7 +40724,7 @@
           <a:p>
             <a:fld id="{B9713C8C-8E70-45D5-AE59-23E60168254E}" type="slidenum">
               <a:rPr lang="en-US" smtClean="0"/>
-              <a:t>14</a:t>
+              <a:t>15</a:t>
             </a:fld>
             <a:endParaRPr lang="en-US" dirty="0"/>
           </a:p>
@@ -40227,7 +40743,7 @@
 </p:sld>
 </file>
 
-<file path=ppt/slides/slide15.xml><?xml version="1.0" encoding="utf-8"?>
+<file path=ppt/slides/slide16.xml><?xml version="1.0" encoding="utf-8"?>
 <p:sld xmlns:a="http://schemas.openxmlformats.org/drawingml/2006/main" xmlns:r="http://schemas.openxmlformats.org/officeDocument/2006/relationships" xmlns:p="http://schemas.openxmlformats.org/presentationml/2006/main">
   <p:cSld>
     <p:spTree>
@@ -40392,7 +40908,7 @@
           <a:p>
             <a:fld id="{B9713C8C-8E70-45D5-AE59-23E60168254E}" type="slidenum">
               <a:rPr lang="en-US" smtClean="0"/>
-              <a:t>15</a:t>
+              <a:t>16</a:t>
             </a:fld>
             <a:endParaRPr lang="en-US" dirty="0"/>
           </a:p>
@@ -40411,7 +40927,7 @@
 </p:sld>
 </file>
 
-<file path=ppt/slides/slide16.xml><?xml version="1.0" encoding="utf-8"?>
+<file path=ppt/slides/slide17.xml><?xml version="1.0" encoding="utf-8"?>
 <p:sld xmlns:a="http://schemas.openxmlformats.org/drawingml/2006/main" xmlns:r="http://schemas.openxmlformats.org/officeDocument/2006/relationships" xmlns:p="http://schemas.openxmlformats.org/presentationml/2006/main">
   <p:cSld>
     <p:spTree>
@@ -40535,7 +41051,7 @@
           <a:p>
             <a:fld id="{B9713C8C-8E70-45D5-AE59-23E60168254E}" type="slidenum">
               <a:rPr lang="en-US" smtClean="0"/>
-              <a:t>16</a:t>
+              <a:t>17</a:t>
             </a:fld>
             <a:endParaRPr lang="en-US" dirty="0"/>
           </a:p>
@@ -40613,7 +41129,7 @@
 </p:sld>
 </file>
 
-<file path=ppt/slides/slide17.xml><?xml version="1.0" encoding="utf-8"?>
+<file path=ppt/slides/slide18.xml><?xml version="1.0" encoding="utf-8"?>
 <p:sld xmlns:a="http://schemas.openxmlformats.org/drawingml/2006/main" xmlns:r="http://schemas.openxmlformats.org/officeDocument/2006/relationships" xmlns:p="http://schemas.openxmlformats.org/presentationml/2006/main">
   <p:cSld>
     <p:spTree>
@@ -40766,7 +41282,7 @@
           <a:p>
             <a:fld id="{B9713C8C-8E70-45D5-AE59-23E60168254E}" type="slidenum">
               <a:rPr lang="en-US" smtClean="0"/>
-              <a:t>17</a:t>
+              <a:t>18</a:t>
             </a:fld>
             <a:endParaRPr lang="en-US" dirty="0"/>
           </a:p>
@@ -40820,7 +41336,7 @@
 </p:sld>
 </file>
 
-<file path=ppt/slides/slide18.xml><?xml version="1.0" encoding="utf-8"?>
+<file path=ppt/slides/slide19.xml><?xml version="1.0" encoding="utf-8"?>
 <p:sld xmlns:a="http://schemas.openxmlformats.org/drawingml/2006/main" xmlns:r="http://schemas.openxmlformats.org/officeDocument/2006/relationships" xmlns:p="http://schemas.openxmlformats.org/presentationml/2006/main">
   <p:cSld>
     <p:spTree>
@@ -40945,7 +41461,7 @@
           <a:p>
             <a:fld id="{B9713C8C-8E70-45D5-AE59-23E60168254E}" type="slidenum">
               <a:rPr lang="en-US" smtClean="0"/>
-              <a:t>18</a:t>
+              <a:t>19</a:t>
             </a:fld>
             <a:endParaRPr lang="en-US" dirty="0"/>
           </a:p>
@@ -40980,200 +41496,6 @@
     <p:extLst>
       <p:ext uri="{BB962C8B-B14F-4D97-AF65-F5344CB8AC3E}">
         <p14:creationId xmlns:p14="http://schemas.microsoft.com/office/powerpoint/2010/main" val="3958427157"/>
-      </p:ext>
-    </p:extLst>
-  </p:cSld>
-  <p:clrMapOvr>
-    <a:masterClrMapping/>
-  </p:clrMapOvr>
-</p:sld>
-</file>
-
-<file path=ppt/slides/slide19.xml><?xml version="1.0" encoding="utf-8"?>
-<p:sld xmlns:a="http://schemas.openxmlformats.org/drawingml/2006/main" xmlns:r="http://schemas.openxmlformats.org/officeDocument/2006/relationships" xmlns:p="http://schemas.openxmlformats.org/presentationml/2006/main">
-  <p:cSld>
-    <p:spTree>
-      <p:nvGrpSpPr>
-        <p:cNvPr id="1" name=""/>
-        <p:cNvGrpSpPr/>
-        <p:nvPr/>
-      </p:nvGrpSpPr>
-      <p:grpSpPr>
-        <a:xfrm>
-          <a:off x="0" y="0"/>
-          <a:ext cx="0" cy="0"/>
-          <a:chOff x="0" y="0"/>
-          <a:chExt cx="0" cy="0"/>
-        </a:xfrm>
-      </p:grpSpPr>
-      <p:sp>
-        <p:nvSpPr>
-          <p:cNvPr id="2" name="Title 1">
-            <a:extLst>
-              <a:ext uri="{FF2B5EF4-FFF2-40B4-BE49-F238E27FC236}">
-                <a16:creationId xmlns:a16="http://schemas.microsoft.com/office/drawing/2014/main" id="{6CFECE77-7A17-4D27-8F36-82EC388F8C9D}"/>
-              </a:ext>
-            </a:extLst>
-          </p:cNvPr>
-          <p:cNvSpPr>
-            <a:spLocks noGrp="1"/>
-          </p:cNvSpPr>
-          <p:nvPr>
-            <p:ph type="title"/>
-          </p:nvPr>
-        </p:nvSpPr>
-        <p:spPr/>
-        <p:txBody>
-          <a:bodyPr/>
-          <a:lstStyle/>
-          <a:p>
-            <a:r>
-              <a:rPr lang="en-US" dirty="0"/>
-              <a:t>Findings</a:t>
-            </a:r>
-          </a:p>
-        </p:txBody>
-      </p:sp>
-      <p:sp>
-        <p:nvSpPr>
-          <p:cNvPr id="4" name="Date Placeholder 3">
-            <a:extLst>
-              <a:ext uri="{FF2B5EF4-FFF2-40B4-BE49-F238E27FC236}">
-                <a16:creationId xmlns:a16="http://schemas.microsoft.com/office/drawing/2014/main" id="{F4E12042-95BD-43FA-AC29-449B3AEDB4E3}"/>
-              </a:ext>
-            </a:extLst>
-          </p:cNvPr>
-          <p:cNvSpPr>
-            <a:spLocks noGrp="1"/>
-          </p:cNvSpPr>
-          <p:nvPr>
-            <p:ph type="dt" sz="half" idx="10"/>
-          </p:nvPr>
-        </p:nvSpPr>
-        <p:spPr/>
-        <p:txBody>
-          <a:bodyPr/>
-          <a:lstStyle/>
-          <a:p>
-            <a:r>
-              <a:rPr lang="en-US" dirty="0"/>
-              <a:t>4/29/2022</a:t>
-            </a:r>
-          </a:p>
-        </p:txBody>
-      </p:sp>
-      <p:sp>
-        <p:nvSpPr>
-          <p:cNvPr id="5" name="Footer Placeholder 4">
-            <a:extLst>
-              <a:ext uri="{FF2B5EF4-FFF2-40B4-BE49-F238E27FC236}">
-                <a16:creationId xmlns:a16="http://schemas.microsoft.com/office/drawing/2014/main" id="{E45EACE6-95E1-43CA-BF8E-3C66DA81B333}"/>
-              </a:ext>
-            </a:extLst>
-          </p:cNvPr>
-          <p:cNvSpPr>
-            <a:spLocks noGrp="1"/>
-          </p:cNvSpPr>
-          <p:nvPr>
-            <p:ph type="ftr" sz="quarter" idx="11"/>
-          </p:nvPr>
-        </p:nvSpPr>
-        <p:spPr/>
-        <p:txBody>
-          <a:bodyPr/>
-          <a:lstStyle/>
-          <a:p>
-            <a:r>
-              <a:rPr lang="en-US" dirty="0"/>
-              <a:t>Netflix</a:t>
-            </a:r>
-          </a:p>
-        </p:txBody>
-      </p:sp>
-      <p:sp>
-        <p:nvSpPr>
-          <p:cNvPr id="6" name="Slide Number Placeholder 5">
-            <a:extLst>
-              <a:ext uri="{FF2B5EF4-FFF2-40B4-BE49-F238E27FC236}">
-                <a16:creationId xmlns:a16="http://schemas.microsoft.com/office/drawing/2014/main" id="{0C090CC8-026A-4E46-8BE1-1BA528E7A477}"/>
-              </a:ext>
-            </a:extLst>
-          </p:cNvPr>
-          <p:cNvSpPr>
-            <a:spLocks noGrp="1"/>
-          </p:cNvSpPr>
-          <p:nvPr>
-            <p:ph type="sldNum" sz="quarter" idx="12"/>
-          </p:nvPr>
-        </p:nvSpPr>
-        <p:spPr/>
-        <p:txBody>
-          <a:bodyPr/>
-          <a:lstStyle/>
-          <a:p>
-            <a:fld id="{B9713C8C-8E70-45D5-AE59-23E60168254E}" type="slidenum">
-              <a:rPr lang="en-US" smtClean="0"/>
-              <a:t>19</a:t>
-            </a:fld>
-            <a:endParaRPr lang="en-US" dirty="0"/>
-          </a:p>
-        </p:txBody>
-      </p:sp>
-      <p:sp>
-        <p:nvSpPr>
-          <p:cNvPr id="7" name="Content Placeholder 6">
-            <a:extLst>
-              <a:ext uri="{FF2B5EF4-FFF2-40B4-BE49-F238E27FC236}">
-                <a16:creationId xmlns:a16="http://schemas.microsoft.com/office/drawing/2014/main" id="{57A8AF85-E3DB-4752-9A82-60FA201BA9C5}"/>
-              </a:ext>
-            </a:extLst>
-          </p:cNvPr>
-          <p:cNvSpPr>
-            <a:spLocks noGrp="1"/>
-          </p:cNvSpPr>
-          <p:nvPr>
-            <p:ph idx="1"/>
-          </p:nvPr>
-        </p:nvSpPr>
-        <p:spPr/>
-        <p:txBody>
-          <a:bodyPr>
-            <a:normAutofit/>
-          </a:bodyPr>
-          <a:lstStyle/>
-          <a:p>
-            <a:r>
-              <a:rPr lang="en-US" dirty="0"/>
-              <a:t>Top 5 countries which produce the largest number of titles on Netflix: United States, India, United Kingdom, Spain &amp; Japan</a:t>
-            </a:r>
-          </a:p>
-          <a:p>
-            <a:r>
-              <a:rPr lang="en-US" dirty="0"/>
-              <a:t>Top 5 Genres with the largest titles: Standup comedy, Documentaries, Drama, Action &amp; Adventure, Comedies, Family &amp; Children Movies.</a:t>
-            </a:r>
-          </a:p>
-          <a:p>
-            <a:r>
-              <a:rPr lang="en-US" dirty="0"/>
-              <a:t>Top 5 Rating types: TV_MA, TV-14, TV-PG, R, PG-13, TV-Y</a:t>
-            </a:r>
-          </a:p>
-          <a:p>
-            <a:r>
-              <a:rPr lang="en-US" dirty="0"/>
-              <a:t>Most of runtimes are from 50 -150mins  </a:t>
-            </a:r>
-          </a:p>
-          <a:p>
-            <a:endParaRPr lang="en-US" dirty="0"/>
-          </a:p>
-        </p:txBody>
-      </p:sp>
-    </p:spTree>
-    <p:extLst>
-      <p:ext uri="{BB962C8B-B14F-4D97-AF65-F5344CB8AC3E}">
-        <p14:creationId xmlns:p14="http://schemas.microsoft.com/office/powerpoint/2010/main" val="2284775098"/>
       </p:ext>
     </p:extLst>
   </p:cSld>
@@ -41441,6 +41763,200 @@
           <a:chExt cx="0" cy="0"/>
         </a:xfrm>
       </p:grpSpPr>
+      <p:sp>
+        <p:nvSpPr>
+          <p:cNvPr id="2" name="Title 1">
+            <a:extLst>
+              <a:ext uri="{FF2B5EF4-FFF2-40B4-BE49-F238E27FC236}">
+                <a16:creationId xmlns:a16="http://schemas.microsoft.com/office/drawing/2014/main" id="{6CFECE77-7A17-4D27-8F36-82EC388F8C9D}"/>
+              </a:ext>
+            </a:extLst>
+          </p:cNvPr>
+          <p:cNvSpPr>
+            <a:spLocks noGrp="1"/>
+          </p:cNvSpPr>
+          <p:nvPr>
+            <p:ph type="title"/>
+          </p:nvPr>
+        </p:nvSpPr>
+        <p:spPr/>
+        <p:txBody>
+          <a:bodyPr/>
+          <a:lstStyle/>
+          <a:p>
+            <a:r>
+              <a:rPr lang="en-US" dirty="0"/>
+              <a:t>Findings</a:t>
+            </a:r>
+          </a:p>
+        </p:txBody>
+      </p:sp>
+      <p:sp>
+        <p:nvSpPr>
+          <p:cNvPr id="4" name="Date Placeholder 3">
+            <a:extLst>
+              <a:ext uri="{FF2B5EF4-FFF2-40B4-BE49-F238E27FC236}">
+                <a16:creationId xmlns:a16="http://schemas.microsoft.com/office/drawing/2014/main" id="{F4E12042-95BD-43FA-AC29-449B3AEDB4E3}"/>
+              </a:ext>
+            </a:extLst>
+          </p:cNvPr>
+          <p:cNvSpPr>
+            <a:spLocks noGrp="1"/>
+          </p:cNvSpPr>
+          <p:nvPr>
+            <p:ph type="dt" sz="half" idx="10"/>
+          </p:nvPr>
+        </p:nvSpPr>
+        <p:spPr/>
+        <p:txBody>
+          <a:bodyPr/>
+          <a:lstStyle/>
+          <a:p>
+            <a:r>
+              <a:rPr lang="en-US" dirty="0"/>
+              <a:t>4/29/2022</a:t>
+            </a:r>
+          </a:p>
+        </p:txBody>
+      </p:sp>
+      <p:sp>
+        <p:nvSpPr>
+          <p:cNvPr id="5" name="Footer Placeholder 4">
+            <a:extLst>
+              <a:ext uri="{FF2B5EF4-FFF2-40B4-BE49-F238E27FC236}">
+                <a16:creationId xmlns:a16="http://schemas.microsoft.com/office/drawing/2014/main" id="{E45EACE6-95E1-43CA-BF8E-3C66DA81B333}"/>
+              </a:ext>
+            </a:extLst>
+          </p:cNvPr>
+          <p:cNvSpPr>
+            <a:spLocks noGrp="1"/>
+          </p:cNvSpPr>
+          <p:nvPr>
+            <p:ph type="ftr" sz="quarter" idx="11"/>
+          </p:nvPr>
+        </p:nvSpPr>
+        <p:spPr/>
+        <p:txBody>
+          <a:bodyPr/>
+          <a:lstStyle/>
+          <a:p>
+            <a:r>
+              <a:rPr lang="en-US" dirty="0"/>
+              <a:t>Netflix</a:t>
+            </a:r>
+          </a:p>
+        </p:txBody>
+      </p:sp>
+      <p:sp>
+        <p:nvSpPr>
+          <p:cNvPr id="6" name="Slide Number Placeholder 5">
+            <a:extLst>
+              <a:ext uri="{FF2B5EF4-FFF2-40B4-BE49-F238E27FC236}">
+                <a16:creationId xmlns:a16="http://schemas.microsoft.com/office/drawing/2014/main" id="{0C090CC8-026A-4E46-8BE1-1BA528E7A477}"/>
+              </a:ext>
+            </a:extLst>
+          </p:cNvPr>
+          <p:cNvSpPr>
+            <a:spLocks noGrp="1"/>
+          </p:cNvSpPr>
+          <p:nvPr>
+            <p:ph type="sldNum" sz="quarter" idx="12"/>
+          </p:nvPr>
+        </p:nvSpPr>
+        <p:spPr/>
+        <p:txBody>
+          <a:bodyPr/>
+          <a:lstStyle/>
+          <a:p>
+            <a:fld id="{B9713C8C-8E70-45D5-AE59-23E60168254E}" type="slidenum">
+              <a:rPr lang="en-US" smtClean="0"/>
+              <a:t>20</a:t>
+            </a:fld>
+            <a:endParaRPr lang="en-US" dirty="0"/>
+          </a:p>
+        </p:txBody>
+      </p:sp>
+      <p:sp>
+        <p:nvSpPr>
+          <p:cNvPr id="7" name="Content Placeholder 6">
+            <a:extLst>
+              <a:ext uri="{FF2B5EF4-FFF2-40B4-BE49-F238E27FC236}">
+                <a16:creationId xmlns:a16="http://schemas.microsoft.com/office/drawing/2014/main" id="{57A8AF85-E3DB-4752-9A82-60FA201BA9C5}"/>
+              </a:ext>
+            </a:extLst>
+          </p:cNvPr>
+          <p:cNvSpPr>
+            <a:spLocks noGrp="1"/>
+          </p:cNvSpPr>
+          <p:nvPr>
+            <p:ph idx="1"/>
+          </p:nvPr>
+        </p:nvSpPr>
+        <p:spPr/>
+        <p:txBody>
+          <a:bodyPr>
+            <a:normAutofit/>
+          </a:bodyPr>
+          <a:lstStyle/>
+          <a:p>
+            <a:r>
+              <a:rPr lang="en-US" dirty="0"/>
+              <a:t>Top 5 countries which produce the largest number of titles on Netflix: United States, India, United Kingdom, Spain &amp; Japan</a:t>
+            </a:r>
+          </a:p>
+          <a:p>
+            <a:r>
+              <a:rPr lang="en-US" dirty="0"/>
+              <a:t>Top 5 Genres with the largest titles: Standup comedy, Documentaries, Drama, Action &amp; Adventure, Comedies, Family &amp; Children Movies.</a:t>
+            </a:r>
+          </a:p>
+          <a:p>
+            <a:r>
+              <a:rPr lang="en-US" dirty="0"/>
+              <a:t>Top 5 Rating types: TV_MA, TV-14, TV-PG, R, PG-13, TV-Y</a:t>
+            </a:r>
+          </a:p>
+          <a:p>
+            <a:r>
+              <a:rPr lang="en-US" dirty="0"/>
+              <a:t>Most of runtimes are from 50 -150mins  </a:t>
+            </a:r>
+          </a:p>
+          <a:p>
+            <a:endParaRPr lang="en-US" dirty="0"/>
+          </a:p>
+        </p:txBody>
+      </p:sp>
+    </p:spTree>
+    <p:extLst>
+      <p:ext uri="{BB962C8B-B14F-4D97-AF65-F5344CB8AC3E}">
+        <p14:creationId xmlns:p14="http://schemas.microsoft.com/office/powerpoint/2010/main" val="2284775098"/>
+      </p:ext>
+    </p:extLst>
+  </p:cSld>
+  <p:clrMapOvr>
+    <a:masterClrMapping/>
+  </p:clrMapOvr>
+</p:sld>
+</file>
+
+<file path=ppt/slides/slide21.xml><?xml version="1.0" encoding="utf-8"?>
+<p:sld xmlns:a="http://schemas.openxmlformats.org/drawingml/2006/main" xmlns:r="http://schemas.openxmlformats.org/officeDocument/2006/relationships" xmlns:p="http://schemas.openxmlformats.org/presentationml/2006/main">
+  <p:cSld>
+    <p:spTree>
+      <p:nvGrpSpPr>
+        <p:cNvPr id="1" name=""/>
+        <p:cNvGrpSpPr/>
+        <p:nvPr/>
+      </p:nvGrpSpPr>
+      <p:grpSpPr>
+        <a:xfrm>
+          <a:off x="0" y="0"/>
+          <a:ext cx="0" cy="0"/>
+          <a:chOff x="0" y="0"/>
+          <a:chExt cx="0" cy="0"/>
+        </a:xfrm>
+      </p:grpSpPr>
       <p:pic>
         <p:nvPicPr>
           <p:cNvPr id="17" name="Picture Placeholder 16" descr="A group of people posing for the camera&#10;&#10;Description automatically generated">
@@ -41581,7 +42097,7 @@
                   <a:spcPts val="600"/>
                 </a:spcAft>
               </a:pPr>
-              <a:t>20</a:t>
+              <a:t>21</a:t>
             </a:fld>
             <a:endParaRPr lang="en-US"/>
           </a:p>
@@ -42392,7 +42908,7 @@
         </p:nvSpPr>
         <p:spPr>
           <a:xfrm>
-            <a:off x="838200" y="365125"/>
+            <a:off x="838200" y="256267"/>
             <a:ext cx="10515600" cy="1325563"/>
           </a:xfrm>
         </p:spPr>
@@ -42407,68 +42923,6 @@
           </a:p>
         </p:txBody>
       </p:sp>
-      <p:pic>
-        <p:nvPicPr>
-          <p:cNvPr id="6" name="Picture 5" descr="Chart, pie chart&#10;&#10;Description automatically generated">
-            <a:extLst>
-              <a:ext uri="{FF2B5EF4-FFF2-40B4-BE49-F238E27FC236}">
-                <a16:creationId xmlns:a16="http://schemas.microsoft.com/office/drawing/2014/main" id="{A9E9B182-3741-43BB-A142-74EE2FF97891}"/>
-              </a:ext>
-            </a:extLst>
-          </p:cNvPr>
-          <p:cNvPicPr>
-            <a:picLocks noChangeAspect="1"/>
-          </p:cNvPicPr>
-          <p:nvPr/>
-        </p:nvPicPr>
-        <p:blipFill>
-          <a:blip r:embed="rId3"/>
-          <a:stretch>
-            <a:fillRect/>
-          </a:stretch>
-        </p:blipFill>
-        <p:spPr>
-          <a:xfrm>
-            <a:off x="1228697" y="1690688"/>
-            <a:ext cx="5121807" cy="5121807"/>
-          </a:xfrm>
-          <a:prstGeom prst="rect">
-            <a:avLst/>
-          </a:prstGeom>
-          <a:noFill/>
-        </p:spPr>
-      </p:pic>
-      <p:pic>
-        <p:nvPicPr>
-          <p:cNvPr id="7" name="Picture 6" descr="Chart, pie chart&#10;&#10;Description automatically generated">
-            <a:extLst>
-              <a:ext uri="{FF2B5EF4-FFF2-40B4-BE49-F238E27FC236}">
-                <a16:creationId xmlns:a16="http://schemas.microsoft.com/office/drawing/2014/main" id="{0F7AD724-8038-4CBF-9B55-8B9500562E90}"/>
-              </a:ext>
-            </a:extLst>
-          </p:cNvPr>
-          <p:cNvPicPr>
-            <a:picLocks noChangeAspect="1"/>
-          </p:cNvPicPr>
-          <p:nvPr/>
-        </p:nvPicPr>
-        <p:blipFill>
-          <a:blip r:embed="rId4"/>
-          <a:stretch>
-            <a:fillRect/>
-          </a:stretch>
-        </p:blipFill>
-        <p:spPr>
-          <a:xfrm>
-            <a:off x="6807704" y="1462616"/>
-            <a:ext cx="5121807" cy="5121807"/>
-          </a:xfrm>
-          <a:prstGeom prst="rect">
-            <a:avLst/>
-          </a:prstGeom>
-          <a:noFill/>
-        </p:spPr>
-      </p:pic>
       <p:sp>
         <p:nvSpPr>
           <p:cNvPr id="17" name="Date Placeholder 4">
@@ -42503,44 +42957,6 @@
             <a:r>
               <a:rPr lang="en-US" dirty="0"/>
               <a:t>4/29/2022</a:t>
-            </a:r>
-          </a:p>
-        </p:txBody>
-      </p:sp>
-      <p:sp>
-        <p:nvSpPr>
-          <p:cNvPr id="19" name="Footer Placeholder 5">
-            <a:extLst>
-              <a:ext uri="{FF2B5EF4-FFF2-40B4-BE49-F238E27FC236}">
-                <a16:creationId xmlns:a16="http://schemas.microsoft.com/office/drawing/2014/main" id="{99E76F9A-64BA-0776-9E18-53A1C38E15D8}"/>
-              </a:ext>
-            </a:extLst>
-          </p:cNvPr>
-          <p:cNvSpPr>
-            <a:spLocks noGrp="1"/>
-          </p:cNvSpPr>
-          <p:nvPr>
-            <p:ph type="ftr" sz="quarter" idx="11"/>
-          </p:nvPr>
-        </p:nvSpPr>
-        <p:spPr>
-          <a:xfrm>
-            <a:off x="4038600" y="6356350"/>
-            <a:ext cx="4114800" cy="365125"/>
-          </a:xfrm>
-        </p:spPr>
-        <p:txBody>
-          <a:bodyPr/>
-          <a:lstStyle/>
-          <a:p>
-            <a:pPr>
-              <a:spcAft>
-                <a:spcPts val="600"/>
-              </a:spcAft>
-            </a:pPr>
-            <a:r>
-              <a:rPr lang="en-US" dirty="0"/>
-              <a:t>Netflix</a:t>
             </a:r>
           </a:p>
         </p:txBody>
@@ -42589,6 +43005,66 @@
           </a:p>
         </p:txBody>
       </p:sp>
+      <p:pic>
+        <p:nvPicPr>
+          <p:cNvPr id="3" name="Picture 2" descr="Chart, pie chart&#10;&#10;Description automatically generated">
+            <a:extLst>
+              <a:ext uri="{FF2B5EF4-FFF2-40B4-BE49-F238E27FC236}">
+                <a16:creationId xmlns:a16="http://schemas.microsoft.com/office/drawing/2014/main" id="{9F745537-E55D-4819-AF96-FF4CCADB8203}"/>
+              </a:ext>
+            </a:extLst>
+          </p:cNvPr>
+          <p:cNvPicPr>
+            <a:picLocks noChangeAspect="1"/>
+          </p:cNvPicPr>
+          <p:nvPr/>
+        </p:nvPicPr>
+        <p:blipFill>
+          <a:blip r:embed="rId3"/>
+          <a:stretch>
+            <a:fillRect/>
+          </a:stretch>
+        </p:blipFill>
+        <p:spPr>
+          <a:xfrm>
+            <a:off x="887251" y="1860118"/>
+            <a:ext cx="5041425" cy="5041425"/>
+          </a:xfrm>
+          <a:prstGeom prst="rect">
+            <a:avLst/>
+          </a:prstGeom>
+        </p:spPr>
+      </p:pic>
+      <p:pic>
+        <p:nvPicPr>
+          <p:cNvPr id="5" name="Picture 4" descr="Chart, pie chart&#10;&#10;Description automatically generated">
+            <a:extLst>
+              <a:ext uri="{FF2B5EF4-FFF2-40B4-BE49-F238E27FC236}">
+                <a16:creationId xmlns:a16="http://schemas.microsoft.com/office/drawing/2014/main" id="{0782A463-3984-4364-AA1B-1E7191386C2D}"/>
+              </a:ext>
+            </a:extLst>
+          </p:cNvPr>
+          <p:cNvPicPr>
+            <a:picLocks noChangeAspect="1"/>
+          </p:cNvPicPr>
+          <p:nvPr/>
+        </p:nvPicPr>
+        <p:blipFill>
+          <a:blip r:embed="rId4"/>
+          <a:stretch>
+            <a:fillRect/>
+          </a:stretch>
+        </p:blipFill>
+        <p:spPr>
+          <a:xfrm>
+            <a:off x="5732733" y="1794804"/>
+            <a:ext cx="5041425" cy="5041425"/>
+          </a:xfrm>
+          <a:prstGeom prst="rect">
+            <a:avLst/>
+          </a:prstGeom>
+        </p:spPr>
+      </p:pic>
     </p:spTree>
     <p:extLst>
       <p:ext uri="{BB962C8B-B14F-4D97-AF65-F5344CB8AC3E}">
@@ -43182,21 +43658,21 @@
 </file>
 
 <file path=customXml/item1.xml><?xml version="1.0" encoding="utf-8"?>
+<?mso-contentType ?>
+<FormTemplates xmlns="http://schemas.microsoft.com/sharepoint/v3/contenttype/forms">
+  <Display>DocumentLibraryForm</Display>
+  <Edit>DocumentLibraryForm</Edit>
+  <New>DocumentLibraryForm</New>
+</FormTemplates>
+</file>
+
+<file path=customXml/item2.xml><?xml version="1.0" encoding="utf-8"?>
 <p:properties xmlns:p="http://schemas.microsoft.com/office/2006/metadata/properties" xmlns:xsi="http://www.w3.org/2001/XMLSchema-instance" xmlns:pc="http://schemas.microsoft.com/office/infopath/2007/PartnerControls">
   <documentManagement>
     <Status xmlns="71af3243-3dd4-4a8d-8c0d-dd76da1f02a5">Not started</Status>
     <MediaServiceKeyPoints xmlns="71af3243-3dd4-4a8d-8c0d-dd76da1f02a5" xsi:nil="true"/>
   </documentManagement>
 </p:properties>
-</file>
-
-<file path=customXml/item2.xml><?xml version="1.0" encoding="utf-8"?>
-<?mso-contentType ?>
-<FormTemplates xmlns="http://schemas.microsoft.com/sharepoint/v3/contenttype/forms">
-  <Display>DocumentLibraryForm</Display>
-  <Edit>DocumentLibraryForm</Edit>
-  <New>DocumentLibraryForm</New>
-</FormTemplates>
 </file>
 
 <file path=customXml/item3.xml><?xml version="1.0" encoding="utf-8"?>
@@ -43421,19 +43897,19 @@
 </file>
 
 <file path=customXml/itemProps1.xml><?xml version="1.0" encoding="utf-8"?>
+<ds:datastoreItem xmlns:ds="http://schemas.openxmlformats.org/officeDocument/2006/customXml" ds:itemID="{C0DCE9DA-F7FD-45FA-83B7-D9813A44258A}">
+  <ds:schemaRefs>
+    <ds:schemaRef ds:uri="http://schemas.microsoft.com/sharepoint/v3/contenttype/forms"/>
+  </ds:schemaRefs>
+</ds:datastoreItem>
+</file>
+
+<file path=customXml/itemProps2.xml><?xml version="1.0" encoding="utf-8"?>
 <ds:datastoreItem xmlns:ds="http://schemas.openxmlformats.org/officeDocument/2006/customXml" ds:itemID="{9DFCC198-DBFA-46B2-A241-8E3888E63670}">
   <ds:schemaRefs>
     <ds:schemaRef ds:uri="http://schemas.microsoft.com/office/2006/metadata/properties"/>
     <ds:schemaRef ds:uri="http://schemas.microsoft.com/office/infopath/2007/PartnerControls"/>
     <ds:schemaRef ds:uri="71af3243-3dd4-4a8d-8c0d-dd76da1f02a5"/>
-  </ds:schemaRefs>
-</ds:datastoreItem>
-</file>
-
-<file path=customXml/itemProps2.xml><?xml version="1.0" encoding="utf-8"?>
-<ds:datastoreItem xmlns:ds="http://schemas.openxmlformats.org/officeDocument/2006/customXml" ds:itemID="{C0DCE9DA-F7FD-45FA-83B7-D9813A44258A}">
-  <ds:schemaRefs>
-    <ds:schemaRef ds:uri="http://schemas.microsoft.com/sharepoint/v3/contenttype/forms"/>
   </ds:schemaRefs>
 </ds:datastoreItem>
 </file>

</xml_diff>

<commit_message>
top 20 movie producing countries
</commit_message>
<xml_diff>
--- a/Project_1.pptx
+++ b/Project_1.pptx
@@ -5,7 +5,7 @@
     <p:sldMasterId id="2147483733" r:id="rId4"/>
   </p:sldMasterIdLst>
   <p:notesMasterIdLst>
-    <p:notesMasterId r:id="rId25"/>
+    <p:notesMasterId r:id="rId24"/>
   </p:notesMasterIdLst>
   <p:sldIdLst>
     <p:sldId id="401" r:id="rId5"/>
@@ -19,15 +19,14 @@
     <p:sldId id="418" r:id="rId13"/>
     <p:sldId id="428" r:id="rId14"/>
     <p:sldId id="424" r:id="rId15"/>
-    <p:sldId id="397" r:id="rId16"/>
-    <p:sldId id="419" r:id="rId17"/>
-    <p:sldId id="423" r:id="rId18"/>
-    <p:sldId id="425" r:id="rId19"/>
-    <p:sldId id="420" r:id="rId20"/>
-    <p:sldId id="422" r:id="rId21"/>
-    <p:sldId id="408" r:id="rId22"/>
-    <p:sldId id="427" r:id="rId23"/>
-    <p:sldId id="409" r:id="rId24"/>
+    <p:sldId id="419" r:id="rId16"/>
+    <p:sldId id="423" r:id="rId17"/>
+    <p:sldId id="425" r:id="rId18"/>
+    <p:sldId id="420" r:id="rId19"/>
+    <p:sldId id="422" r:id="rId20"/>
+    <p:sldId id="408" r:id="rId21"/>
+    <p:sldId id="427" r:id="rId22"/>
+    <p:sldId id="409" r:id="rId23"/>
   </p:sldIdLst>
   <p:sldSz cx="12192000" cy="6858000"/>
   <p:notesSz cx="6858000" cy="9144000"/>
@@ -146,7 +145,6 @@
             <p14:sldId id="418"/>
             <p14:sldId id="428"/>
             <p14:sldId id="424"/>
-            <p14:sldId id="397"/>
             <p14:sldId id="419"/>
             <p14:sldId id="423"/>
             <p14:sldId id="425"/>
@@ -196,7 +194,7 @@
 <file path=ppt/revisionInfo.xml><?xml version="1.0" encoding="utf-8"?>
 <p1510:revInfo xmlns:a="http://schemas.openxmlformats.org/drawingml/2006/main" xmlns:r="http://schemas.openxmlformats.org/officeDocument/2006/relationships" xmlns:p1510="http://schemas.microsoft.com/office/powerpoint/2015/10/main">
   <p1510:revLst>
-    <p1510:client id="{F777C335-4339-49C5-8275-414B08422B2B}" v="18" dt="2022-04-29T19:36:35.508"/>
+    <p1510:client id="{F777C335-4339-49C5-8275-414B08422B2B}" v="24" dt="2022-04-29T21:35:28.897"/>
   </p1510:revLst>
 </p1510:revInfo>
 </file>
@@ -206,7 +204,7 @@
   <pc:docChgLst>
     <pc:chgData name="Stefanie Gagnon" userId="f874ef52da13a6b2" providerId="LiveId" clId="{F777C335-4339-49C5-8275-414B08422B2B}"/>
     <pc:docChg chg="undo custSel addSld delSld modSld sldOrd modSection">
-      <pc:chgData name="Stefanie Gagnon" userId="f874ef52da13a6b2" providerId="LiveId" clId="{F777C335-4339-49C5-8275-414B08422B2B}" dt="2022-04-29T20:22:46.955" v="2384" actId="1076"/>
+      <pc:chgData name="Stefanie Gagnon" userId="f874ef52da13a6b2" providerId="LiveId" clId="{F777C335-4339-49C5-8275-414B08422B2B}" dt="2022-04-29T21:36:21.378" v="2472" actId="14100"/>
       <pc:docMkLst>
         <pc:docMk/>
       </pc:docMkLst>
@@ -265,8 +263,8 @@
           </ac:picMkLst>
         </pc:picChg>
       </pc:sldChg>
-      <pc:sldChg chg="modNotesTx">
-        <pc:chgData name="Stefanie Gagnon" userId="f874ef52da13a6b2" providerId="LiveId" clId="{F777C335-4339-49C5-8275-414B08422B2B}" dt="2022-04-29T16:22:49.069" v="1930" actId="20577"/>
+      <pc:sldChg chg="del modNotesTx">
+        <pc:chgData name="Stefanie Gagnon" userId="f874ef52da13a6b2" providerId="LiveId" clId="{F777C335-4339-49C5-8275-414B08422B2B}" dt="2022-04-29T20:53:17.671" v="2406" actId="47"/>
         <pc:sldMkLst>
           <pc:docMk/>
           <pc:sldMk cId="1497105360" sldId="397"/>
@@ -605,17 +603,41 @@
         </pc:sldMkLst>
       </pc:sldChg>
       <pc:sldChg chg="addSp delSp modSp mod modNotesTx">
-        <pc:chgData name="Stefanie Gagnon" userId="f874ef52da13a6b2" providerId="LiveId" clId="{F777C335-4339-49C5-8275-414B08422B2B}" dt="2022-04-29T02:40:29.069" v="1013" actId="1076"/>
+        <pc:chgData name="Stefanie Gagnon" userId="f874ef52da13a6b2" providerId="LiveId" clId="{F777C335-4339-49C5-8275-414B08422B2B}" dt="2022-04-29T21:10:45.068" v="2427" actId="14100"/>
         <pc:sldMkLst>
           <pc:docMk/>
           <pc:sldMk cId="2343488884" sldId="420"/>
         </pc:sldMkLst>
+        <pc:spChg chg="add del mod">
+          <ac:chgData name="Stefanie Gagnon" userId="f874ef52da13a6b2" providerId="LiveId" clId="{F777C335-4339-49C5-8275-414B08422B2B}" dt="2022-04-29T21:09:39.644" v="2409" actId="931"/>
+          <ac:spMkLst>
+            <pc:docMk/>
+            <pc:sldMk cId="2343488884" sldId="420"/>
+            <ac:spMk id="4" creationId="{1FD07C59-B86D-43E0-AD1E-9C921BA1797B}"/>
+          </ac:spMkLst>
+        </pc:spChg>
         <pc:spChg chg="add del mod">
           <ac:chgData name="Stefanie Gagnon" userId="f874ef52da13a6b2" providerId="LiveId" clId="{F777C335-4339-49C5-8275-414B08422B2B}" dt="2022-04-29T02:39:47.044" v="1002" actId="931"/>
           <ac:spMkLst>
             <pc:docMk/>
             <pc:sldMk cId="2343488884" sldId="420"/>
             <ac:spMk id="10" creationId="{B27C179A-7502-49FA-A14E-3E29344C9C3F}"/>
+          </ac:spMkLst>
+        </pc:spChg>
+        <pc:spChg chg="del">
+          <ac:chgData name="Stefanie Gagnon" userId="f874ef52da13a6b2" providerId="LiveId" clId="{F777C335-4339-49C5-8275-414B08422B2B}" dt="2022-04-29T21:10:06.237" v="2419" actId="478"/>
+          <ac:spMkLst>
+            <pc:docMk/>
+            <pc:sldMk cId="2343488884" sldId="420"/>
+            <ac:spMk id="12" creationId="{A341B71E-5290-4693-8035-44F1D53070AF}"/>
+          </ac:spMkLst>
+        </pc:spChg>
+        <pc:spChg chg="del">
+          <ac:chgData name="Stefanie Gagnon" userId="f874ef52da13a6b2" providerId="LiveId" clId="{F777C335-4339-49C5-8275-414B08422B2B}" dt="2022-04-29T21:10:03.412" v="2418" actId="478"/>
+          <ac:spMkLst>
+            <pc:docMk/>
+            <pc:sldMk cId="2343488884" sldId="420"/>
+            <ac:spMk id="13" creationId="{81FCE4EA-92D0-4D04-BA86-2FFFEC99A0AE}"/>
           </ac:spMkLst>
         </pc:spChg>
         <pc:picChg chg="add del mod">
@@ -642,6 +664,14 @@
             <ac:picMk id="6" creationId="{14BFC3A4-CCE5-4D41-84CF-BF9C9878791D}"/>
           </ac:picMkLst>
         </pc:picChg>
+        <pc:picChg chg="add mod">
+          <ac:chgData name="Stefanie Gagnon" userId="f874ef52da13a6b2" providerId="LiveId" clId="{F777C335-4339-49C5-8275-414B08422B2B}" dt="2022-04-29T21:10:28.769" v="2424" actId="1076"/>
+          <ac:picMkLst>
+            <pc:docMk/>
+            <pc:sldMk cId="2343488884" sldId="420"/>
+            <ac:picMk id="6" creationId="{98E4CC82-7614-4489-B49D-5362A38E5919}"/>
+          </ac:picMkLst>
+        </pc:picChg>
         <pc:picChg chg="add del mod">
           <ac:chgData name="Stefanie Gagnon" userId="f874ef52da13a6b2" providerId="LiveId" clId="{F777C335-4339-49C5-8275-414B08422B2B}" dt="2022-04-29T02:38:57.745" v="991" actId="478"/>
           <ac:picMkLst>
@@ -658,12 +688,20 @@
             <ac:picMk id="8" creationId="{444758B7-F282-4887-8FD5-B40706939F2D}"/>
           </ac:picMkLst>
         </pc:picChg>
-        <pc:picChg chg="add mod">
-          <ac:chgData name="Stefanie Gagnon" userId="f874ef52da13a6b2" providerId="LiveId" clId="{F777C335-4339-49C5-8275-414B08422B2B}" dt="2022-04-29T02:40:29.069" v="1013" actId="1076"/>
+        <pc:picChg chg="add del mod">
+          <ac:chgData name="Stefanie Gagnon" userId="f874ef52da13a6b2" providerId="LiveId" clId="{F777C335-4339-49C5-8275-414B08422B2B}" dt="2022-04-29T21:09:10.726" v="2407" actId="478"/>
           <ac:picMkLst>
             <pc:docMk/>
             <pc:sldMk cId="2343488884" sldId="420"/>
             <ac:picMk id="8" creationId="{A5F86858-BA19-476A-AEF4-F1E23D9FD315}"/>
+          </ac:picMkLst>
+        </pc:picChg>
+        <pc:picChg chg="add mod">
+          <ac:chgData name="Stefanie Gagnon" userId="f874ef52da13a6b2" providerId="LiveId" clId="{F777C335-4339-49C5-8275-414B08422B2B}" dt="2022-04-29T21:10:45.068" v="2427" actId="14100"/>
+          <ac:picMkLst>
+            <pc:docMk/>
+            <pc:sldMk cId="2343488884" sldId="420"/>
+            <ac:picMk id="9" creationId="{AC571B51-1E2E-45DC-88D8-60C4591B949E}"/>
           </ac:picMkLst>
         </pc:picChg>
         <pc:picChg chg="add del mod">
@@ -674,8 +712,8 @@
             <ac:picMk id="10" creationId="{C7E035D3-1125-4B89-8187-DCA9D16960EC}"/>
           </ac:picMkLst>
         </pc:picChg>
-        <pc:picChg chg="add mod">
-          <ac:chgData name="Stefanie Gagnon" userId="f874ef52da13a6b2" providerId="LiveId" clId="{F777C335-4339-49C5-8275-414B08422B2B}" dt="2022-04-29T02:40:16.131" v="1011" actId="1076"/>
+        <pc:picChg chg="add del mod">
+          <ac:chgData name="Stefanie Gagnon" userId="f874ef52da13a6b2" providerId="LiveId" clId="{F777C335-4339-49C5-8275-414B08422B2B}" dt="2022-04-29T21:09:13.682" v="2408" actId="478"/>
           <ac:picMkLst>
             <pc:docMk/>
             <pc:sldMk cId="2343488884" sldId="420"/>
@@ -729,18 +767,74 @@
           </ac:spMkLst>
         </pc:spChg>
       </pc:sldChg>
-      <pc:sldChg chg="modSp mod modNotesTx">
-        <pc:chgData name="Stefanie Gagnon" userId="f874ef52da13a6b2" providerId="LiveId" clId="{F777C335-4339-49C5-8275-414B08422B2B}" dt="2022-04-29T02:09:07.028" v="409" actId="20577"/>
+      <pc:sldChg chg="addSp delSp modSp mod modNotesTx">
+        <pc:chgData name="Stefanie Gagnon" userId="f874ef52da13a6b2" providerId="LiveId" clId="{F777C335-4339-49C5-8275-414B08422B2B}" dt="2022-04-29T21:36:21.378" v="2472" actId="14100"/>
         <pc:sldMkLst>
           <pc:docMk/>
           <pc:sldMk cId="3353992094" sldId="423"/>
         </pc:sldMkLst>
-        <pc:picChg chg="mod">
-          <ac:chgData name="Stefanie Gagnon" userId="f874ef52da13a6b2" providerId="LiveId" clId="{F777C335-4339-49C5-8275-414B08422B2B}" dt="2022-04-28T23:24:28.038" v="140" actId="1076"/>
+        <pc:spChg chg="mod">
+          <ac:chgData name="Stefanie Gagnon" userId="f874ef52da13a6b2" providerId="LiveId" clId="{F777C335-4339-49C5-8275-414B08422B2B}" dt="2022-04-29T21:33:16.525" v="2442" actId="20577"/>
+          <ac:spMkLst>
+            <pc:docMk/>
+            <pc:sldMk cId="3353992094" sldId="423"/>
+            <ac:spMk id="2" creationId="{D4B255F5-13B3-4A6C-8581-86C5D552B2FF}"/>
+          </ac:spMkLst>
+        </pc:spChg>
+        <pc:spChg chg="mod">
+          <ac:chgData name="Stefanie Gagnon" userId="f874ef52da13a6b2" providerId="LiveId" clId="{F777C335-4339-49C5-8275-414B08422B2B}" dt="2022-04-29T21:35:56.148" v="2467" actId="20577"/>
+          <ac:spMkLst>
+            <pc:docMk/>
+            <pc:sldMk cId="3353992094" sldId="423"/>
+            <ac:spMk id="4" creationId="{EE988254-A015-4C5E-8BE1-C9680C0A698E}"/>
+          </ac:spMkLst>
+        </pc:spChg>
+        <pc:spChg chg="mod">
+          <ac:chgData name="Stefanie Gagnon" userId="f874ef52da13a6b2" providerId="LiveId" clId="{F777C335-4339-49C5-8275-414B08422B2B}" dt="2022-04-29T21:35:47.755" v="2458" actId="20577"/>
+          <ac:spMkLst>
+            <pc:docMk/>
+            <pc:sldMk cId="3353992094" sldId="423"/>
+            <ac:spMk id="5" creationId="{866EA2EE-A18A-4723-9D58-BD8F79EC4E8E}"/>
+          </ac:spMkLst>
+        </pc:spChg>
+        <pc:spChg chg="add del mod">
+          <ac:chgData name="Stefanie Gagnon" userId="f874ef52da13a6b2" providerId="LiveId" clId="{F777C335-4339-49C5-8275-414B08422B2B}" dt="2022-04-29T21:34:39.193" v="2443" actId="931"/>
+          <ac:spMkLst>
+            <pc:docMk/>
+            <pc:sldMk cId="3353992094" sldId="423"/>
+            <ac:spMk id="7" creationId="{8CE30166-70D6-4623-AC23-702DB499C76B}"/>
+          </ac:spMkLst>
+        </pc:spChg>
+        <pc:spChg chg="add del mod">
+          <ac:chgData name="Stefanie Gagnon" userId="f874ef52da13a6b2" providerId="LiveId" clId="{F777C335-4339-49C5-8275-414B08422B2B}" dt="2022-04-29T21:35:28.897" v="2447" actId="931"/>
+          <ac:spMkLst>
+            <pc:docMk/>
+            <pc:sldMk cId="3353992094" sldId="423"/>
+            <ac:spMk id="12" creationId="{1502CD5F-2FC3-4EBB-88C3-CDB5CFA824E7}"/>
+          </ac:spMkLst>
+        </pc:spChg>
+        <pc:picChg chg="del mod">
+          <ac:chgData name="Stefanie Gagnon" userId="f874ef52da13a6b2" providerId="LiveId" clId="{F777C335-4339-49C5-8275-414B08422B2B}" dt="2022-04-29T21:33:11.831" v="2436" actId="478"/>
           <ac:picMkLst>
             <pc:docMk/>
             <pc:sldMk cId="3353992094" sldId="423"/>
             <ac:picMk id="8" creationId="{F4549F85-11D5-400F-97CD-EDDFFFFC21EA}"/>
+          </ac:picMkLst>
+        </pc:picChg>
+        <pc:picChg chg="add del mod">
+          <ac:chgData name="Stefanie Gagnon" userId="f874ef52da13a6b2" providerId="LiveId" clId="{F777C335-4339-49C5-8275-414B08422B2B}" dt="2022-04-29T21:34:43.553" v="2446" actId="478"/>
+          <ac:picMkLst>
+            <pc:docMk/>
+            <pc:sldMk cId="3353992094" sldId="423"/>
+            <ac:picMk id="10" creationId="{55B66246-B521-49C1-A4A3-F068AEE21E20}"/>
+          </ac:picMkLst>
+        </pc:picChg>
+        <pc:picChg chg="add mod">
+          <ac:chgData name="Stefanie Gagnon" userId="f874ef52da13a6b2" providerId="LiveId" clId="{F777C335-4339-49C5-8275-414B08422B2B}" dt="2022-04-29T21:36:21.378" v="2472" actId="14100"/>
+          <ac:picMkLst>
+            <pc:docMk/>
+            <pc:sldMk cId="3353992094" sldId="423"/>
+            <ac:picMk id="14" creationId="{8D0B37B9-6030-444E-94CF-6CD4907A8D10}"/>
           </ac:picMkLst>
         </pc:picChg>
       </pc:sldChg>
@@ -972,7 +1066,7 @@
         </pc:sldMkLst>
       </pc:sldChg>
       <pc:sldChg chg="addSp delSp modSp add mod">
-        <pc:chgData name="Stefanie Gagnon" userId="f874ef52da13a6b2" providerId="LiveId" clId="{F777C335-4339-49C5-8275-414B08422B2B}" dt="2022-04-29T20:22:46.955" v="2384" actId="1076"/>
+        <pc:chgData name="Stefanie Gagnon" userId="f874ef52da13a6b2" providerId="LiveId" clId="{F777C335-4339-49C5-8275-414B08422B2B}" dt="2022-04-29T21:20:59.675" v="2435" actId="20577"/>
         <pc:sldMkLst>
           <pc:docMk/>
           <pc:sldMk cId="3004099782" sldId="428"/>
@@ -994,11 +1088,27 @@
           </ac:spMkLst>
         </pc:spChg>
         <pc:spChg chg="add del mod">
+          <ac:chgData name="Stefanie Gagnon" userId="f874ef52da13a6b2" providerId="LiveId" clId="{F777C335-4339-49C5-8275-414B08422B2B}" dt="2022-04-29T20:49:05.670" v="2386" actId="931"/>
+          <ac:spMkLst>
+            <pc:docMk/>
+            <pc:sldMk cId="3004099782" sldId="428"/>
+            <ac:spMk id="6" creationId="{C012A26A-0146-4517-99B3-F4A73A74EA71}"/>
+          </ac:spMkLst>
+        </pc:spChg>
+        <pc:spChg chg="add del mod">
           <ac:chgData name="Stefanie Gagnon" userId="f874ef52da13a6b2" providerId="LiveId" clId="{F777C335-4339-49C5-8275-414B08422B2B}" dt="2022-04-29T19:37:29.879" v="2370" actId="478"/>
           <ac:spMkLst>
             <pc:docMk/>
             <pc:sldMk cId="3004099782" sldId="428"/>
             <ac:spMk id="10" creationId="{D38B60DE-531B-4F31-B62B-F1863DB04662}"/>
+          </ac:spMkLst>
+        </pc:spChg>
+        <pc:spChg chg="add del mod">
+          <ac:chgData name="Stefanie Gagnon" userId="f874ef52da13a6b2" providerId="LiveId" clId="{F777C335-4339-49C5-8275-414B08422B2B}" dt="2022-04-29T20:50:17.375" v="2395" actId="931"/>
+          <ac:spMkLst>
+            <pc:docMk/>
+            <pc:sldMk cId="3004099782" sldId="428"/>
+            <ac:spMk id="12" creationId="{8CF5E0A2-1C89-4769-B48B-6C04246861DF}"/>
           </ac:spMkLst>
         </pc:spChg>
         <pc:spChg chg="del mod">
@@ -1010,19 +1120,27 @@
           </ac:spMkLst>
         </pc:spChg>
         <pc:spChg chg="mod">
-          <ac:chgData name="Stefanie Gagnon" userId="f874ef52da13a6b2" providerId="LiveId" clId="{F777C335-4339-49C5-8275-414B08422B2B}" dt="2022-04-29T20:22:41.080" v="2383" actId="1076"/>
+          <ac:chgData name="Stefanie Gagnon" userId="f874ef52da13a6b2" providerId="LiveId" clId="{F777C335-4339-49C5-8275-414B08422B2B}" dt="2022-04-29T21:20:59.675" v="2435" actId="20577"/>
           <ac:spMkLst>
             <pc:docMk/>
             <pc:sldMk cId="3004099782" sldId="428"/>
             <ac:spMk id="48" creationId="{5776AB68-59B6-875F-6C60-0C2D9EB6B761}"/>
           </ac:spMkLst>
         </pc:spChg>
-        <pc:picChg chg="add mod">
-          <ac:chgData name="Stefanie Gagnon" userId="f874ef52da13a6b2" providerId="LiveId" clId="{F777C335-4339-49C5-8275-414B08422B2B}" dt="2022-04-29T20:22:27.361" v="2381" actId="1076"/>
+        <pc:picChg chg="add del mod">
+          <ac:chgData name="Stefanie Gagnon" userId="f874ef52da13a6b2" providerId="LiveId" clId="{F777C335-4339-49C5-8275-414B08422B2B}" dt="2022-04-29T20:50:06.592" v="2394" actId="478"/>
           <ac:picMkLst>
             <pc:docMk/>
             <pc:sldMk cId="3004099782" sldId="428"/>
             <ac:picMk id="8" creationId="{F5CAD9D7-2AF4-4896-8734-D5931071F72C}"/>
+          </ac:picMkLst>
+        </pc:picChg>
+        <pc:picChg chg="add mod">
+          <ac:chgData name="Stefanie Gagnon" userId="f874ef52da13a6b2" providerId="LiveId" clId="{F777C335-4339-49C5-8275-414B08422B2B}" dt="2022-04-29T20:51:18.593" v="2404" actId="1076"/>
+          <ac:picMkLst>
+            <pc:docMk/>
+            <pc:sldMk cId="3004099782" sldId="428"/>
+            <ac:picMk id="10" creationId="{21B9037F-D93C-4866-809C-5694B68BD091}"/>
           </ac:picMkLst>
         </pc:picChg>
         <pc:picChg chg="del mod">
@@ -1033,8 +1151,16 @@
             <ac:picMk id="12" creationId="{DC0EF69A-C604-445E-9E7C-CA47FF16BC75}"/>
           </ac:picMkLst>
         </pc:picChg>
-        <pc:picChg chg="mod">
-          <ac:chgData name="Stefanie Gagnon" userId="f874ef52da13a6b2" providerId="LiveId" clId="{F777C335-4339-49C5-8275-414B08422B2B}" dt="2022-04-29T20:22:46.955" v="2384" actId="1076"/>
+        <pc:picChg chg="add mod">
+          <ac:chgData name="Stefanie Gagnon" userId="f874ef52da13a6b2" providerId="LiveId" clId="{F777C335-4339-49C5-8275-414B08422B2B}" dt="2022-04-29T20:50:39.168" v="2401" actId="1076"/>
+          <ac:picMkLst>
+            <pc:docMk/>
+            <pc:sldMk cId="3004099782" sldId="428"/>
+            <ac:picMk id="14" creationId="{CB83D6F1-EB3D-4B1B-B675-C84B3882FC23}"/>
+          </ac:picMkLst>
+        </pc:picChg>
+        <pc:picChg chg="del mod">
+          <ac:chgData name="Stefanie Gagnon" userId="f874ef52da13a6b2" providerId="LiveId" clId="{F777C335-4339-49C5-8275-414B08422B2B}" dt="2022-04-29T20:48:51.653" v="2385" actId="478"/>
           <ac:picMkLst>
             <pc:docMk/>
             <pc:sldMk cId="3004099782" sldId="428"/>
@@ -6321,93 +6447,6 @@
           <a:p>
             <a:r>
               <a:rPr lang="en-US" dirty="0"/>
-              <a:t>Include one with only movie ratings (since we are focusing more on movie data in our cleaned data)</a:t>
-            </a:r>
-          </a:p>
-        </p:txBody>
-      </p:sp>
-      <p:sp>
-        <p:nvSpPr>
-          <p:cNvPr id="4" name="Slide Number Placeholder 3"/>
-          <p:cNvSpPr>
-            <a:spLocks noGrp="1"/>
-          </p:cNvSpPr>
-          <p:nvPr>
-            <p:ph type="sldNum" sz="quarter" idx="5"/>
-          </p:nvPr>
-        </p:nvSpPr>
-        <p:spPr/>
-        <p:txBody>
-          <a:bodyPr/>
-          <a:lstStyle/>
-          <a:p>
-            <a:fld id="{0D0EDF81-139F-488C-872B-4720FBA6BF98}" type="slidenum">
-              <a:rPr lang="en-US" smtClean="0"/>
-              <a:t>12</a:t>
-            </a:fld>
-            <a:endParaRPr lang="en-US" dirty="0"/>
-          </a:p>
-        </p:txBody>
-      </p:sp>
-    </p:spTree>
-    <p:extLst>
-      <p:ext uri="{BB962C8B-B14F-4D97-AF65-F5344CB8AC3E}">
-        <p14:creationId xmlns:p14="http://schemas.microsoft.com/office/powerpoint/2010/main" val="548434253"/>
-      </p:ext>
-    </p:extLst>
-  </p:cSld>
-  <p:clrMapOvr>
-    <a:masterClrMapping/>
-  </p:clrMapOvr>
-</p:notes>
-</file>
-
-<file path=ppt/notesSlides/notesSlide5.xml><?xml version="1.0" encoding="utf-8"?>
-<p:notes xmlns:a="http://schemas.openxmlformats.org/drawingml/2006/main" xmlns:r="http://schemas.openxmlformats.org/officeDocument/2006/relationships" xmlns:p="http://schemas.openxmlformats.org/presentationml/2006/main">
-  <p:cSld>
-    <p:spTree>
-      <p:nvGrpSpPr>
-        <p:cNvPr id="1" name=""/>
-        <p:cNvGrpSpPr/>
-        <p:nvPr/>
-      </p:nvGrpSpPr>
-      <p:grpSpPr>
-        <a:xfrm>
-          <a:off x="0" y="0"/>
-          <a:ext cx="0" cy="0"/>
-          <a:chOff x="0" y="0"/>
-          <a:chExt cx="0" cy="0"/>
-        </a:xfrm>
-      </p:grpSpPr>
-      <p:sp>
-        <p:nvSpPr>
-          <p:cNvPr id="2" name="Slide Image Placeholder 1"/>
-          <p:cNvSpPr>
-            <a:spLocks noGrp="1" noRot="1" noChangeAspect="1"/>
-          </p:cNvSpPr>
-          <p:nvPr>
-            <p:ph type="sldImg"/>
-          </p:nvPr>
-        </p:nvSpPr>
-        <p:spPr/>
-      </p:sp>
-      <p:sp>
-        <p:nvSpPr>
-          <p:cNvPr id="3" name="Notes Placeholder 2"/>
-          <p:cNvSpPr>
-            <a:spLocks noGrp="1"/>
-          </p:cNvSpPr>
-          <p:nvPr>
-            <p:ph type="body" idx="1"/>
-          </p:nvPr>
-        </p:nvSpPr>
-        <p:spPr/>
-        <p:txBody>
-          <a:bodyPr/>
-          <a:lstStyle/>
-          <a:p>
-            <a:r>
-              <a:rPr lang="en-US" dirty="0"/>
               <a:t>**change out the graph (screen shot of new one)</a:t>
             </a:r>
           </a:p>
@@ -6436,7 +6475,7 @@
           <a:p>
             <a:fld id="{0D0EDF81-139F-488C-872B-4720FBA6BF98}" type="slidenum">
               <a:rPr lang="en-US" smtClean="0"/>
-              <a:t>14</a:t>
+              <a:t>13</a:t>
             </a:fld>
             <a:endParaRPr lang="en-US" dirty="0"/>
           </a:p>
@@ -6455,7 +6494,7 @@
 </p:notes>
 </file>
 
-<file path=ppt/notesSlides/notesSlide6.xml><?xml version="1.0" encoding="utf-8"?>
+<file path=ppt/notesSlides/notesSlide5.xml><?xml version="1.0" encoding="utf-8"?>
 <p:notes xmlns:a="http://schemas.openxmlformats.org/drawingml/2006/main" xmlns:r="http://schemas.openxmlformats.org/officeDocument/2006/relationships" xmlns:p="http://schemas.openxmlformats.org/presentationml/2006/main">
   <p:cSld>
     <p:spTree>
@@ -6535,7 +6574,7 @@
           <a:p>
             <a:fld id="{0D0EDF81-139F-488C-872B-4720FBA6BF98}" type="slidenum">
               <a:rPr lang="en-US" smtClean="0"/>
-              <a:t>16</a:t>
+              <a:t>15</a:t>
             </a:fld>
             <a:endParaRPr lang="en-US" dirty="0"/>
           </a:p>
@@ -6554,7 +6593,7 @@
 </p:notes>
 </file>
 
-<file path=ppt/notesSlides/notesSlide7.xml><?xml version="1.0" encoding="utf-8"?>
+<file path=ppt/notesSlides/notesSlide6.xml><?xml version="1.0" encoding="utf-8"?>
 <p:notes xmlns:a="http://schemas.openxmlformats.org/drawingml/2006/main" xmlns:r="http://schemas.openxmlformats.org/officeDocument/2006/relationships" xmlns:p="http://schemas.openxmlformats.org/presentationml/2006/main">
   <p:cSld>
     <p:spTree>
@@ -6634,7 +6673,7 @@
           <a:p>
             <a:fld id="{0D0EDF81-139F-488C-872B-4720FBA6BF98}" type="slidenum">
               <a:rPr lang="en-US" smtClean="0"/>
-              <a:t>17</a:t>
+              <a:t>16</a:t>
             </a:fld>
             <a:endParaRPr lang="en-US" dirty="0"/>
           </a:p>
@@ -6653,7 +6692,7 @@
 </p:notes>
 </file>
 
-<file path=ppt/notesSlides/notesSlide8.xml><?xml version="1.0" encoding="utf-8"?>
+<file path=ppt/notesSlides/notesSlide7.xml><?xml version="1.0" encoding="utf-8"?>
 <p:notes xmlns:a="http://schemas.openxmlformats.org/drawingml/2006/main" xmlns:r="http://schemas.openxmlformats.org/officeDocument/2006/relationships" xmlns:p="http://schemas.openxmlformats.org/presentationml/2006/main">
   <p:cSld>
     <p:spTree>
@@ -6727,7 +6766,7 @@
           <a:p>
             <a:fld id="{0D0EDF81-139F-488C-872B-4720FBA6BF98}" type="slidenum">
               <a:rPr lang="en-US" smtClean="0"/>
-              <a:t>19</a:t>
+              <a:t>18</a:t>
             </a:fld>
             <a:endParaRPr lang="en-US" dirty="0"/>
           </a:p>
@@ -39360,7 +39399,7 @@
         </p:nvSpPr>
         <p:spPr>
           <a:xfrm>
-            <a:off x="2097460" y="2142254"/>
+            <a:off x="2859991" y="1901341"/>
             <a:ext cx="4937760" cy="950976"/>
           </a:xfrm>
         </p:spPr>
@@ -39370,41 +39409,11 @@
           <a:p>
             <a:r>
               <a:rPr lang="en-US" dirty="0"/>
-              <a:t>Rating types</a:t>
+              <a:t>Movie rating types</a:t>
             </a:r>
           </a:p>
         </p:txBody>
       </p:sp>
-      <p:pic>
-        <p:nvPicPr>
-          <p:cNvPr id="41" name="Content Placeholder 40" descr="Chart, pie chart&#10;&#10;Description automatically generated">
-            <a:extLst>
-              <a:ext uri="{FF2B5EF4-FFF2-40B4-BE49-F238E27FC236}">
-                <a16:creationId xmlns:a16="http://schemas.microsoft.com/office/drawing/2014/main" id="{D67CA551-B856-4FBC-9D20-BD732A0DDDE5}"/>
-              </a:ext>
-            </a:extLst>
-          </p:cNvPr>
-          <p:cNvPicPr>
-            <a:picLocks noGrp="1" noChangeAspect="1"/>
-          </p:cNvPicPr>
-          <p:nvPr>
-            <p:ph sz="quarter" idx="4"/>
-          </p:nvPr>
-        </p:nvPicPr>
-        <p:blipFill>
-          <a:blip r:embed="rId3"/>
-          <a:stretch>
-            <a:fillRect/>
-          </a:stretch>
-        </p:blipFill>
-        <p:spPr>
-          <a:xfrm>
-            <a:off x="5454178" y="-488796"/>
-            <a:ext cx="4832822" cy="4832822"/>
-          </a:xfrm>
-          <a:noFill/>
-        </p:spPr>
-      </p:pic>
       <p:sp>
         <p:nvSpPr>
           <p:cNvPr id="4" name="Date Placeholder 5">
@@ -39533,10 +39542,39 @@
       </p:sp>
       <p:pic>
         <p:nvPicPr>
-          <p:cNvPr id="8" name="Content Placeholder 7" descr="Chart&#10;&#10;Description automatically generated with medium confidence">
+          <p:cNvPr id="10" name="Content Placeholder 9" descr="Chart, pie chart&#10;&#10;Description automatically generated">
             <a:extLst>
               <a:ext uri="{FF2B5EF4-FFF2-40B4-BE49-F238E27FC236}">
-                <a16:creationId xmlns:a16="http://schemas.microsoft.com/office/drawing/2014/main" id="{F5CAD9D7-2AF4-4896-8734-D5931071F72C}"/>
+                <a16:creationId xmlns:a16="http://schemas.microsoft.com/office/drawing/2014/main" id="{21B9037F-D93C-4866-809C-5694B68BD091}"/>
+              </a:ext>
+            </a:extLst>
+          </p:cNvPr>
+          <p:cNvPicPr>
+            <a:picLocks noGrp="1" noChangeAspect="1"/>
+          </p:cNvPicPr>
+          <p:nvPr>
+            <p:ph sz="quarter" idx="4"/>
+          </p:nvPr>
+        </p:nvPicPr>
+        <p:blipFill>
+          <a:blip r:embed="rId3"/>
+          <a:stretch>
+            <a:fillRect/>
+          </a:stretch>
+        </p:blipFill>
+        <p:spPr>
+          <a:xfrm>
+            <a:off x="6416990" y="-81708"/>
+            <a:ext cx="4114800" cy="4114800"/>
+          </a:xfrm>
+        </p:spPr>
+      </p:pic>
+      <p:pic>
+        <p:nvPicPr>
+          <p:cNvPr id="14" name="Content Placeholder 13" descr="Chart, bar chart&#10;&#10;Description automatically generated with medium confidence">
+            <a:extLst>
+              <a:ext uri="{FF2B5EF4-FFF2-40B4-BE49-F238E27FC236}">
+                <a16:creationId xmlns:a16="http://schemas.microsoft.com/office/drawing/2014/main" id="{CB83D6F1-EB3D-4B1B-B675-C84B3882FC23}"/>
               </a:ext>
             </a:extLst>
           </p:cNvPr>
@@ -39555,8 +39593,8 @@
         </p:blipFill>
         <p:spPr>
           <a:xfrm>
-            <a:off x="182589" y="3764770"/>
-            <a:ext cx="11826821" cy="2956705"/>
+            <a:off x="-745876" y="3452756"/>
+            <a:ext cx="13074878" cy="3268719"/>
           </a:xfrm>
         </p:spPr>
       </p:pic>
@@ -39834,7 +39872,7 @@
           <a:p>
             <a:r>
               <a:rPr lang="en-US" dirty="0"/>
-              <a:t>Number of content by rating</a:t>
+              <a:t>Top Genres with the largest number of  titles</a:t>
             </a:r>
           </a:p>
         </p:txBody>
@@ -39926,178 +39964,6 @@
       </p:sp>
       <p:pic>
         <p:nvPicPr>
-          <p:cNvPr id="11" name="Content Placeholder 10" descr="A picture containing graphical user interface&#10;&#10;Description automatically generated">
-            <a:extLst>
-              <a:ext uri="{FF2B5EF4-FFF2-40B4-BE49-F238E27FC236}">
-                <a16:creationId xmlns:a16="http://schemas.microsoft.com/office/drawing/2014/main" id="{4441AE48-AD10-4841-9840-2DD54751AC20}"/>
-              </a:ext>
-            </a:extLst>
-          </p:cNvPr>
-          <p:cNvPicPr>
-            <a:picLocks noGrp="1" noChangeAspect="1"/>
-          </p:cNvPicPr>
-          <p:nvPr>
-            <p:ph idx="1"/>
-          </p:nvPr>
-        </p:nvPicPr>
-        <p:blipFill>
-          <a:blip r:embed="rId3"/>
-          <a:stretch>
-            <a:fillRect/>
-          </a:stretch>
-        </p:blipFill>
-        <p:spPr>
-          <a:xfrm>
-            <a:off x="838200" y="2777331"/>
-            <a:ext cx="10515600" cy="2628900"/>
-          </a:xfrm>
-        </p:spPr>
-      </p:pic>
-    </p:spTree>
-    <p:extLst>
-      <p:ext uri="{BB962C8B-B14F-4D97-AF65-F5344CB8AC3E}">
-        <p14:creationId xmlns:p14="http://schemas.microsoft.com/office/powerpoint/2010/main" val="1497105360"/>
-      </p:ext>
-    </p:extLst>
-  </p:cSld>
-  <p:clrMapOvr>
-    <a:masterClrMapping/>
-  </p:clrMapOvr>
-</p:sld>
-</file>
-
-<file path=ppt/slides/slide13.xml><?xml version="1.0" encoding="utf-8"?>
-<p:sld xmlns:a="http://schemas.openxmlformats.org/drawingml/2006/main" xmlns:r="http://schemas.openxmlformats.org/officeDocument/2006/relationships" xmlns:p="http://schemas.openxmlformats.org/presentationml/2006/main">
-  <p:cSld>
-    <p:spTree>
-      <p:nvGrpSpPr>
-        <p:cNvPr id="1" name=""/>
-        <p:cNvGrpSpPr/>
-        <p:nvPr/>
-      </p:nvGrpSpPr>
-      <p:grpSpPr>
-        <a:xfrm>
-          <a:off x="0" y="0"/>
-          <a:ext cx="0" cy="0"/>
-          <a:chOff x="0" y="0"/>
-          <a:chExt cx="0" cy="0"/>
-        </a:xfrm>
-      </p:grpSpPr>
-      <p:sp>
-        <p:nvSpPr>
-          <p:cNvPr id="2" name="Title 1">
-            <a:extLst>
-              <a:ext uri="{FF2B5EF4-FFF2-40B4-BE49-F238E27FC236}">
-                <a16:creationId xmlns:a16="http://schemas.microsoft.com/office/drawing/2014/main" id="{6D602820-7F02-4F5F-8933-C0B61CFA2E08}"/>
-              </a:ext>
-            </a:extLst>
-          </p:cNvPr>
-          <p:cNvSpPr>
-            <a:spLocks noGrp="1"/>
-          </p:cNvSpPr>
-          <p:nvPr>
-            <p:ph type="title"/>
-          </p:nvPr>
-        </p:nvSpPr>
-        <p:spPr/>
-        <p:txBody>
-          <a:bodyPr/>
-          <a:lstStyle/>
-          <a:p>
-            <a:r>
-              <a:rPr lang="en-US" dirty="0"/>
-              <a:t>Top Genres with the largest number of  titles</a:t>
-            </a:r>
-          </a:p>
-        </p:txBody>
-      </p:sp>
-      <p:sp>
-        <p:nvSpPr>
-          <p:cNvPr id="12" name="Date Placeholder 11">
-            <a:extLst>
-              <a:ext uri="{FF2B5EF4-FFF2-40B4-BE49-F238E27FC236}">
-                <a16:creationId xmlns:a16="http://schemas.microsoft.com/office/drawing/2014/main" id="{A341B71E-5290-4693-8035-44F1D53070AF}"/>
-              </a:ext>
-            </a:extLst>
-          </p:cNvPr>
-          <p:cNvSpPr>
-            <a:spLocks noGrp="1"/>
-          </p:cNvSpPr>
-          <p:nvPr>
-            <p:ph type="dt" sz="half" idx="10"/>
-          </p:nvPr>
-        </p:nvSpPr>
-        <p:spPr/>
-        <p:txBody>
-          <a:bodyPr/>
-          <a:lstStyle/>
-          <a:p>
-            <a:r>
-              <a:rPr lang="en-US" dirty="0"/>
-              <a:t>9/3/20XX</a:t>
-            </a:r>
-          </a:p>
-        </p:txBody>
-      </p:sp>
-      <p:sp>
-        <p:nvSpPr>
-          <p:cNvPr id="13" name="Footer Placeholder 12">
-            <a:extLst>
-              <a:ext uri="{FF2B5EF4-FFF2-40B4-BE49-F238E27FC236}">
-                <a16:creationId xmlns:a16="http://schemas.microsoft.com/office/drawing/2014/main" id="{81FCE4EA-92D0-4D04-BA86-2FFFEC99A0AE}"/>
-              </a:ext>
-            </a:extLst>
-          </p:cNvPr>
-          <p:cNvSpPr>
-            <a:spLocks noGrp="1"/>
-          </p:cNvSpPr>
-          <p:nvPr>
-            <p:ph type="ftr" sz="quarter" idx="11"/>
-          </p:nvPr>
-        </p:nvSpPr>
-        <p:spPr/>
-        <p:txBody>
-          <a:bodyPr/>
-          <a:lstStyle/>
-          <a:p>
-            <a:r>
-              <a:rPr lang="en-US" dirty="0"/>
-              <a:t>Presentation Title</a:t>
-            </a:r>
-          </a:p>
-        </p:txBody>
-      </p:sp>
-      <p:sp>
-        <p:nvSpPr>
-          <p:cNvPr id="14" name="Slide Number Placeholder 13">
-            <a:extLst>
-              <a:ext uri="{FF2B5EF4-FFF2-40B4-BE49-F238E27FC236}">
-                <a16:creationId xmlns:a16="http://schemas.microsoft.com/office/drawing/2014/main" id="{7D2D9DB8-6AAC-452C-8711-DA2E869FD12D}"/>
-              </a:ext>
-            </a:extLst>
-          </p:cNvPr>
-          <p:cNvSpPr>
-            <a:spLocks noGrp="1"/>
-          </p:cNvSpPr>
-          <p:nvPr>
-            <p:ph type="sldNum" sz="quarter" idx="12"/>
-          </p:nvPr>
-        </p:nvSpPr>
-        <p:spPr/>
-        <p:txBody>
-          <a:bodyPr/>
-          <a:lstStyle/>
-          <a:p>
-            <a:fld id="{B9713C8C-8E70-45D5-AE59-23E60168254E}" type="slidenum">
-              <a:rPr lang="en-US" smtClean="0"/>
-              <a:t>13</a:t>
-            </a:fld>
-            <a:endParaRPr lang="en-US" dirty="0"/>
-          </a:p>
-        </p:txBody>
-      </p:sp>
-      <p:pic>
-        <p:nvPicPr>
           <p:cNvPr id="11" name="Content Placeholder 10" descr="Application&#10;&#10;Description automatically generated with low confidence">
             <a:extLst>
               <a:ext uri="{FF2B5EF4-FFF2-40B4-BE49-F238E27FC236}">
@@ -40138,7 +40004,7 @@
 </p:sld>
 </file>
 
-<file path=ppt/slides/slide14.xml><?xml version="1.0" encoding="utf-8"?>
+<file path=ppt/slides/slide13.xml><?xml version="1.0" encoding="utf-8"?>
 <p:sld xmlns:a="http://schemas.openxmlformats.org/drawingml/2006/main" xmlns:r="http://schemas.openxmlformats.org/officeDocument/2006/relationships" xmlns:p="http://schemas.openxmlformats.org/presentationml/2006/main">
   <p:cSld>
     <p:spTree>
@@ -40178,40 +40044,11 @@
           <a:p>
             <a:r>
               <a:rPr lang="en-US" dirty="0"/>
-              <a:t>Top producing countries</a:t>
+              <a:t>Top movie producing countries</a:t>
             </a:r>
           </a:p>
         </p:txBody>
       </p:sp>
-      <p:pic>
-        <p:nvPicPr>
-          <p:cNvPr id="8" name="Content Placeholder 7" descr="Text&#10;&#10;Description automatically generated with low confidence">
-            <a:extLst>
-              <a:ext uri="{FF2B5EF4-FFF2-40B4-BE49-F238E27FC236}">
-                <a16:creationId xmlns:a16="http://schemas.microsoft.com/office/drawing/2014/main" id="{F4549F85-11D5-400F-97CD-EDDFFFFC21EA}"/>
-              </a:ext>
-            </a:extLst>
-          </p:cNvPr>
-          <p:cNvPicPr>
-            <a:picLocks noGrp="1" noChangeAspect="1"/>
-          </p:cNvPicPr>
-          <p:nvPr>
-            <p:ph idx="1"/>
-          </p:nvPr>
-        </p:nvPicPr>
-        <p:blipFill>
-          <a:blip r:embed="rId3"/>
-          <a:stretch>
-            <a:fillRect/>
-          </a:stretch>
-        </p:blipFill>
-        <p:spPr>
-          <a:xfrm>
-            <a:off x="838200" y="2533491"/>
-            <a:ext cx="10515600" cy="2810670"/>
-          </a:xfrm>
-        </p:spPr>
-      </p:pic>
       <p:sp>
         <p:nvSpPr>
           <p:cNvPr id="4" name="Date Placeholder 3">
@@ -40234,10 +40071,9 @@
           <a:lstStyle/>
           <a:p>
             <a:r>
-              <a:rPr lang="en-US"/>
-              <a:t>9/3/20XX</a:t>
+              <a:rPr lang="en-US" dirty="0"/>
+              <a:t>4/29/2022</a:t>
             </a:r>
-            <a:endParaRPr lang="en-US" dirty="0"/>
           </a:p>
         </p:txBody>
       </p:sp>
@@ -40263,10 +40099,9 @@
           <a:lstStyle/>
           <a:p>
             <a:r>
-              <a:rPr lang="en-US"/>
-              <a:t>Presentation Title</a:t>
+              <a:rPr lang="en-US" dirty="0"/>
+              <a:t>Netflix</a:t>
             </a:r>
-            <a:endParaRPr lang="en-US" dirty="0"/>
           </a:p>
         </p:txBody>
       </p:sp>
@@ -40293,12 +40128,41 @@
           <a:p>
             <a:fld id="{B9713C8C-8E70-45D5-AE59-23E60168254E}" type="slidenum">
               <a:rPr lang="en-US" smtClean="0"/>
-              <a:t>14</a:t>
+              <a:t>13</a:t>
             </a:fld>
             <a:endParaRPr lang="en-US" dirty="0"/>
           </a:p>
         </p:txBody>
       </p:sp>
+      <p:pic>
+        <p:nvPicPr>
+          <p:cNvPr id="14" name="Content Placeholder 13" descr="Chart&#10;&#10;Description automatically generated">
+            <a:extLst>
+              <a:ext uri="{FF2B5EF4-FFF2-40B4-BE49-F238E27FC236}">
+                <a16:creationId xmlns:a16="http://schemas.microsoft.com/office/drawing/2014/main" id="{8D0B37B9-6030-444E-94CF-6CD4907A8D10}"/>
+              </a:ext>
+            </a:extLst>
+          </p:cNvPr>
+          <p:cNvPicPr>
+            <a:picLocks noGrp="1" noChangeAspect="1"/>
+          </p:cNvPicPr>
+          <p:nvPr>
+            <p:ph idx="1"/>
+          </p:nvPr>
+        </p:nvPicPr>
+        <p:blipFill>
+          <a:blip r:embed="rId3"/>
+          <a:stretch>
+            <a:fillRect/>
+          </a:stretch>
+        </p:blipFill>
+        <p:spPr>
+          <a:xfrm>
+            <a:off x="1894114" y="1579649"/>
+            <a:ext cx="8871014" cy="4776701"/>
+          </a:xfrm>
+        </p:spPr>
+      </p:pic>
     </p:spTree>
     <p:extLst>
       <p:ext uri="{BB962C8B-B14F-4D97-AF65-F5344CB8AC3E}">
@@ -40312,7 +40176,7 @@
 </p:sld>
 </file>
 
-<file path=ppt/slides/slide15.xml><?xml version="1.0" encoding="utf-8"?>
+<file path=ppt/slides/slide14.xml><?xml version="1.0" encoding="utf-8"?>
 <p:sld xmlns:a="http://schemas.openxmlformats.org/drawingml/2006/main" xmlns:r="http://schemas.openxmlformats.org/officeDocument/2006/relationships" xmlns:p="http://schemas.openxmlformats.org/presentationml/2006/main">
   <p:cSld>
     <p:spTree>
@@ -40477,7 +40341,7 @@
           <a:p>
             <a:fld id="{B9713C8C-8E70-45D5-AE59-23E60168254E}" type="slidenum">
               <a:rPr lang="en-US" smtClean="0"/>
-              <a:t>15</a:t>
+              <a:t>14</a:t>
             </a:fld>
             <a:endParaRPr lang="en-US" dirty="0"/>
           </a:p>
@@ -40496,7 +40360,7 @@
 </p:sld>
 </file>
 
-<file path=ppt/slides/slide16.xml><?xml version="1.0" encoding="utf-8"?>
+<file path=ppt/slides/slide15.xml><?xml version="1.0" encoding="utf-8"?>
 <p:sld xmlns:a="http://schemas.openxmlformats.org/drawingml/2006/main" xmlns:r="http://schemas.openxmlformats.org/officeDocument/2006/relationships" xmlns:p="http://schemas.openxmlformats.org/presentationml/2006/main">
   <p:cSld>
     <p:spTree>
@@ -40543,62 +40407,6 @@
       </p:sp>
       <p:sp>
         <p:nvSpPr>
-          <p:cNvPr id="12" name="Date Placeholder 11">
-            <a:extLst>
-              <a:ext uri="{FF2B5EF4-FFF2-40B4-BE49-F238E27FC236}">
-                <a16:creationId xmlns:a16="http://schemas.microsoft.com/office/drawing/2014/main" id="{A341B71E-5290-4693-8035-44F1D53070AF}"/>
-              </a:ext>
-            </a:extLst>
-          </p:cNvPr>
-          <p:cNvSpPr>
-            <a:spLocks noGrp="1"/>
-          </p:cNvSpPr>
-          <p:nvPr>
-            <p:ph type="dt" sz="half" idx="10"/>
-          </p:nvPr>
-        </p:nvSpPr>
-        <p:spPr/>
-        <p:txBody>
-          <a:bodyPr/>
-          <a:lstStyle/>
-          <a:p>
-            <a:r>
-              <a:rPr lang="en-US" dirty="0"/>
-              <a:t>9/3/20XX</a:t>
-            </a:r>
-          </a:p>
-        </p:txBody>
-      </p:sp>
-      <p:sp>
-        <p:nvSpPr>
-          <p:cNvPr id="13" name="Footer Placeholder 12">
-            <a:extLst>
-              <a:ext uri="{FF2B5EF4-FFF2-40B4-BE49-F238E27FC236}">
-                <a16:creationId xmlns:a16="http://schemas.microsoft.com/office/drawing/2014/main" id="{81FCE4EA-92D0-4D04-BA86-2FFFEC99A0AE}"/>
-              </a:ext>
-            </a:extLst>
-          </p:cNvPr>
-          <p:cNvSpPr>
-            <a:spLocks noGrp="1"/>
-          </p:cNvSpPr>
-          <p:nvPr>
-            <p:ph type="ftr" sz="quarter" idx="11"/>
-          </p:nvPr>
-        </p:nvSpPr>
-        <p:spPr/>
-        <p:txBody>
-          <a:bodyPr/>
-          <a:lstStyle/>
-          <a:p>
-            <a:r>
-              <a:rPr lang="en-US" dirty="0"/>
-              <a:t>Presentation Title</a:t>
-            </a:r>
-          </a:p>
-        </p:txBody>
-      </p:sp>
-      <p:sp>
-        <p:nvSpPr>
           <p:cNvPr id="14" name="Slide Number Placeholder 13">
             <a:extLst>
               <a:ext uri="{FF2B5EF4-FFF2-40B4-BE49-F238E27FC236}">
@@ -40620,7 +40428,7 @@
           <a:p>
             <a:fld id="{B9713C8C-8E70-45D5-AE59-23E60168254E}" type="slidenum">
               <a:rPr lang="en-US" smtClean="0"/>
-              <a:t>16</a:t>
+              <a:t>15</a:t>
             </a:fld>
             <a:endParaRPr lang="en-US" dirty="0"/>
           </a:p>
@@ -40628,40 +40436,10 @@
       </p:sp>
       <p:pic>
         <p:nvPicPr>
-          <p:cNvPr id="8" name="Picture 7" descr="Chart, scatter chart&#10;&#10;Description automatically generated">
+          <p:cNvPr id="6" name="Content Placeholder 5" descr="Chart, scatter chart&#10;&#10;Description automatically generated">
             <a:extLst>
               <a:ext uri="{FF2B5EF4-FFF2-40B4-BE49-F238E27FC236}">
-                <a16:creationId xmlns:a16="http://schemas.microsoft.com/office/drawing/2014/main" id="{A5F86858-BA19-476A-AEF4-F1E23D9FD315}"/>
-              </a:ext>
-            </a:extLst>
-          </p:cNvPr>
-          <p:cNvPicPr>
-            <a:picLocks noChangeAspect="1"/>
-          </p:cNvPicPr>
-          <p:nvPr/>
-        </p:nvPicPr>
-        <p:blipFill>
-          <a:blip r:embed="rId3"/>
-          <a:stretch>
-            <a:fillRect/>
-          </a:stretch>
-        </p:blipFill>
-        <p:spPr>
-          <a:xfrm>
-            <a:off x="0" y="136525"/>
-            <a:ext cx="12100512" cy="3321709"/>
-          </a:xfrm>
-          <a:prstGeom prst="rect">
-            <a:avLst/>
-          </a:prstGeom>
-        </p:spPr>
-      </p:pic>
-      <p:pic>
-        <p:nvPicPr>
-          <p:cNvPr id="15" name="Content Placeholder 14" descr="Chart, scatter chart&#10;&#10;Description automatically generated">
-            <a:extLst>
-              <a:ext uri="{FF2B5EF4-FFF2-40B4-BE49-F238E27FC236}">
-                <a16:creationId xmlns:a16="http://schemas.microsoft.com/office/drawing/2014/main" id="{C3F3B601-E2A3-4661-A469-5B27C82054E1}"/>
+                <a16:creationId xmlns:a16="http://schemas.microsoft.com/office/drawing/2014/main" id="{98E4CC82-7614-4489-B49D-5362A38E5919}"/>
               </a:ext>
             </a:extLst>
           </p:cNvPr>
@@ -40673,6 +40451,33 @@
           </p:nvPr>
         </p:nvPicPr>
         <p:blipFill>
+          <a:blip r:embed="rId3"/>
+          <a:stretch>
+            <a:fillRect/>
+          </a:stretch>
+        </p:blipFill>
+        <p:spPr>
+          <a:xfrm>
+            <a:off x="2505259" y="1271812"/>
+            <a:ext cx="9686741" cy="2829376"/>
+          </a:xfrm>
+        </p:spPr>
+      </p:pic>
+      <p:pic>
+        <p:nvPicPr>
+          <p:cNvPr id="9" name="Picture 8" descr="Chart, scatter chart&#10;&#10;Description automatically generated">
+            <a:extLst>
+              <a:ext uri="{FF2B5EF4-FFF2-40B4-BE49-F238E27FC236}">
+                <a16:creationId xmlns:a16="http://schemas.microsoft.com/office/drawing/2014/main" id="{AC571B51-1E2E-45DC-88D8-60C4591B949E}"/>
+              </a:ext>
+            </a:extLst>
+          </p:cNvPr>
+          <p:cNvPicPr>
+            <a:picLocks noChangeAspect="1"/>
+          </p:cNvPicPr>
+          <p:nvPr/>
+        </p:nvPicPr>
+        <p:blipFill>
           <a:blip r:embed="rId4"/>
           <a:stretch>
             <a:fillRect/>
@@ -40680,9 +40485,12 @@
         </p:blipFill>
         <p:spPr>
           <a:xfrm>
-            <a:off x="220853" y="3437672"/>
-            <a:ext cx="11971147" cy="3420328"/>
+            <a:off x="2535000" y="4101188"/>
+            <a:ext cx="9656999" cy="2756812"/>
           </a:xfrm>
+          <a:prstGeom prst="rect">
+            <a:avLst/>
+          </a:prstGeom>
         </p:spPr>
       </p:pic>
     </p:spTree>
@@ -40698,7 +40506,7 @@
 </p:sld>
 </file>
 
-<file path=ppt/slides/slide17.xml><?xml version="1.0" encoding="utf-8"?>
+<file path=ppt/slides/slide16.xml><?xml version="1.0" encoding="utf-8"?>
 <p:sld xmlns:a="http://schemas.openxmlformats.org/drawingml/2006/main" xmlns:r="http://schemas.openxmlformats.org/officeDocument/2006/relationships" xmlns:p="http://schemas.openxmlformats.org/presentationml/2006/main">
   <p:cSld>
     <p:spTree>
@@ -40851,7 +40659,7 @@
           <a:p>
             <a:fld id="{B9713C8C-8E70-45D5-AE59-23E60168254E}" type="slidenum">
               <a:rPr lang="en-US" smtClean="0"/>
-              <a:t>17</a:t>
+              <a:t>16</a:t>
             </a:fld>
             <a:endParaRPr lang="en-US" dirty="0"/>
           </a:p>
@@ -40905,7 +40713,7 @@
 </p:sld>
 </file>
 
-<file path=ppt/slides/slide18.xml><?xml version="1.0" encoding="utf-8"?>
+<file path=ppt/slides/slide17.xml><?xml version="1.0" encoding="utf-8"?>
 <p:sld xmlns:a="http://schemas.openxmlformats.org/drawingml/2006/main" xmlns:r="http://schemas.openxmlformats.org/officeDocument/2006/relationships" xmlns:p="http://schemas.openxmlformats.org/presentationml/2006/main">
   <p:cSld>
     <p:spTree>
@@ -41030,7 +40838,7 @@
           <a:p>
             <a:fld id="{B9713C8C-8E70-45D5-AE59-23E60168254E}" type="slidenum">
               <a:rPr lang="en-US" smtClean="0"/>
-              <a:t>18</a:t>
+              <a:t>17</a:t>
             </a:fld>
             <a:endParaRPr lang="en-US" dirty="0"/>
           </a:p>
@@ -41074,7 +40882,7 @@
 </p:sld>
 </file>
 
-<file path=ppt/slides/slide19.xml><?xml version="1.0" encoding="utf-8"?>
+<file path=ppt/slides/slide18.xml><?xml version="1.0" encoding="utf-8"?>
 <p:sld xmlns:a="http://schemas.openxmlformats.org/drawingml/2006/main" xmlns:r="http://schemas.openxmlformats.org/officeDocument/2006/relationships" xmlns:p="http://schemas.openxmlformats.org/presentationml/2006/main">
   <p:cSld>
     <p:spTree>
@@ -41198,7 +41006,7 @@
           <a:p>
             <a:fld id="{B9713C8C-8E70-45D5-AE59-23E60168254E}" type="slidenum">
               <a:rPr lang="en-US" smtClean="0"/>
-              <a:t>19</a:t>
+              <a:t>18</a:t>
             </a:fld>
             <a:endParaRPr lang="en-US" dirty="0"/>
           </a:p>
@@ -41259,6 +41067,182 @@
     <p:extLst>
       <p:ext uri="{BB962C8B-B14F-4D97-AF65-F5344CB8AC3E}">
         <p14:creationId xmlns:p14="http://schemas.microsoft.com/office/powerpoint/2010/main" val="2284775098"/>
+      </p:ext>
+    </p:extLst>
+  </p:cSld>
+  <p:clrMapOvr>
+    <a:masterClrMapping/>
+  </p:clrMapOvr>
+</p:sld>
+</file>
+
+<file path=ppt/slides/slide19.xml><?xml version="1.0" encoding="utf-8"?>
+<p:sld xmlns:a="http://schemas.openxmlformats.org/drawingml/2006/main" xmlns:r="http://schemas.openxmlformats.org/officeDocument/2006/relationships" xmlns:p="http://schemas.openxmlformats.org/presentationml/2006/main">
+  <p:cSld>
+    <p:spTree>
+      <p:nvGrpSpPr>
+        <p:cNvPr id="1" name=""/>
+        <p:cNvGrpSpPr/>
+        <p:nvPr/>
+      </p:nvGrpSpPr>
+      <p:grpSpPr>
+        <a:xfrm>
+          <a:off x="0" y="0"/>
+          <a:ext cx="0" cy="0"/>
+          <a:chOff x="0" y="0"/>
+          <a:chExt cx="0" cy="0"/>
+        </a:xfrm>
+      </p:grpSpPr>
+      <p:pic>
+        <p:nvPicPr>
+          <p:cNvPr id="17" name="Picture Placeholder 16" descr="A group of people posing for the camera&#10;&#10;Description automatically generated">
+            <a:extLst>
+              <a:ext uri="{FF2B5EF4-FFF2-40B4-BE49-F238E27FC236}">
+                <a16:creationId xmlns:a16="http://schemas.microsoft.com/office/drawing/2014/main" id="{CBAD6E17-CBCF-41A0-AFA6-40E7F7808E7C}"/>
+              </a:ext>
+            </a:extLst>
+          </p:cNvPr>
+          <p:cNvPicPr>
+            <a:picLocks noGrp="1" noChangeAspect="1"/>
+          </p:cNvPicPr>
+          <p:nvPr>
+            <p:ph type="pic" sz="quarter" idx="13"/>
+          </p:nvPr>
+        </p:nvPicPr>
+        <p:blipFill rotWithShape="1">
+          <a:blip r:embed="rId2"/>
+          <a:srcRect l="13582" r="13582"/>
+          <a:stretch/>
+        </p:blipFill>
+        <p:spPr>
+          <a:xfrm>
+            <a:off x="20" y="10"/>
+            <a:ext cx="6105116" cy="4190990"/>
+          </a:xfrm>
+          <a:noFill/>
+        </p:spPr>
+      </p:pic>
+      <p:sp>
+        <p:nvSpPr>
+          <p:cNvPr id="4" name="Title 3">
+            <a:extLst>
+              <a:ext uri="{FF2B5EF4-FFF2-40B4-BE49-F238E27FC236}">
+                <a16:creationId xmlns:a16="http://schemas.microsoft.com/office/drawing/2014/main" id="{8CA6E381-7CDD-4999-B9C7-CD31E749FD95}"/>
+              </a:ext>
+            </a:extLst>
+          </p:cNvPr>
+          <p:cNvSpPr>
+            <a:spLocks noGrp="1"/>
+          </p:cNvSpPr>
+          <p:nvPr>
+            <p:ph type="title"/>
+          </p:nvPr>
+        </p:nvSpPr>
+        <p:spPr>
+          <a:xfrm>
+            <a:off x="6739128" y="1280160"/>
+            <a:ext cx="4617720" cy="2578608"/>
+          </a:xfrm>
+        </p:spPr>
+        <p:txBody>
+          <a:bodyPr anchor="b">
+            <a:normAutofit/>
+          </a:bodyPr>
+          <a:lstStyle/>
+          <a:p>
+            <a:r>
+              <a:rPr lang="en-US" dirty="0"/>
+              <a:t>Thank you</a:t>
+            </a:r>
+          </a:p>
+        </p:txBody>
+      </p:sp>
+      <p:sp>
+        <p:nvSpPr>
+          <p:cNvPr id="26" name="Footer Placeholder 5">
+            <a:extLst>
+              <a:ext uri="{FF2B5EF4-FFF2-40B4-BE49-F238E27FC236}">
+                <a16:creationId xmlns:a16="http://schemas.microsoft.com/office/drawing/2014/main" id="{EADA098B-F015-5FF4-2A19-2D32BD753ECC}"/>
+              </a:ext>
+            </a:extLst>
+          </p:cNvPr>
+          <p:cNvSpPr>
+            <a:spLocks noGrp="1"/>
+          </p:cNvSpPr>
+          <p:nvPr>
+            <p:ph type="ftr" sz="quarter" idx="11"/>
+          </p:nvPr>
+        </p:nvSpPr>
+        <p:spPr>
+          <a:xfrm>
+            <a:off x="6739128" y="6356350"/>
+            <a:ext cx="4114800" cy="365125"/>
+          </a:xfrm>
+        </p:spPr>
+        <p:txBody>
+          <a:bodyPr/>
+          <a:lstStyle/>
+          <a:p>
+            <a:pPr algn="l">
+              <a:spcAft>
+                <a:spcPts val="600"/>
+              </a:spcAft>
+            </a:pPr>
+            <a:r>
+              <a:rPr lang="en-US" dirty="0"/>
+              <a:t>Netflix</a:t>
+            </a:r>
+          </a:p>
+        </p:txBody>
+      </p:sp>
+      <p:sp>
+        <p:nvSpPr>
+          <p:cNvPr id="32" name="Slide Number Placeholder 6">
+            <a:extLst>
+              <a:ext uri="{FF2B5EF4-FFF2-40B4-BE49-F238E27FC236}">
+                <a16:creationId xmlns:a16="http://schemas.microsoft.com/office/drawing/2014/main" id="{DE3F7F6C-80AA-3E4C-87DC-4A9234EB5D77}"/>
+              </a:ext>
+            </a:extLst>
+          </p:cNvPr>
+          <p:cNvSpPr>
+            <a:spLocks noGrp="1"/>
+          </p:cNvSpPr>
+          <p:nvPr>
+            <p:ph type="sldNum" sz="quarter" idx="12"/>
+          </p:nvPr>
+        </p:nvSpPr>
+        <p:spPr>
+          <a:xfrm>
+            <a:off x="8610600" y="6356350"/>
+            <a:ext cx="2743200" cy="365125"/>
+          </a:xfrm>
+        </p:spPr>
+        <p:txBody>
+          <a:bodyPr/>
+          <a:lstStyle/>
+          <a:p>
+            <a:pPr>
+              <a:spcAft>
+                <a:spcPts val="600"/>
+              </a:spcAft>
+            </a:pPr>
+            <a:fld id="{B9713C8C-8E70-45D5-AE59-23E60168254E}" type="slidenum">
+              <a:rPr lang="en-US" smtClean="0"/>
+              <a:pPr>
+                <a:spcAft>
+                  <a:spcPts val="600"/>
+                </a:spcAft>
+              </a:pPr>
+              <a:t>19</a:t>
+            </a:fld>
+            <a:endParaRPr lang="en-US"/>
+          </a:p>
+        </p:txBody>
+      </p:sp>
+    </p:spTree>
+    <p:extLst>
+      <p:ext uri="{BB962C8B-B14F-4D97-AF65-F5344CB8AC3E}">
+        <p14:creationId xmlns:p14="http://schemas.microsoft.com/office/powerpoint/2010/main" val="2420767862"/>
       </p:ext>
     </p:extLst>
   </p:cSld>
@@ -41500,182 +41484,6 @@
     <p:extLst>
       <p:ext uri="{BB962C8B-B14F-4D97-AF65-F5344CB8AC3E}">
         <p14:creationId xmlns:p14="http://schemas.microsoft.com/office/powerpoint/2010/main" val="3386965950"/>
-      </p:ext>
-    </p:extLst>
-  </p:cSld>
-  <p:clrMapOvr>
-    <a:masterClrMapping/>
-  </p:clrMapOvr>
-</p:sld>
-</file>
-
-<file path=ppt/slides/slide20.xml><?xml version="1.0" encoding="utf-8"?>
-<p:sld xmlns:a="http://schemas.openxmlformats.org/drawingml/2006/main" xmlns:r="http://schemas.openxmlformats.org/officeDocument/2006/relationships" xmlns:p="http://schemas.openxmlformats.org/presentationml/2006/main">
-  <p:cSld>
-    <p:spTree>
-      <p:nvGrpSpPr>
-        <p:cNvPr id="1" name=""/>
-        <p:cNvGrpSpPr/>
-        <p:nvPr/>
-      </p:nvGrpSpPr>
-      <p:grpSpPr>
-        <a:xfrm>
-          <a:off x="0" y="0"/>
-          <a:ext cx="0" cy="0"/>
-          <a:chOff x="0" y="0"/>
-          <a:chExt cx="0" cy="0"/>
-        </a:xfrm>
-      </p:grpSpPr>
-      <p:pic>
-        <p:nvPicPr>
-          <p:cNvPr id="17" name="Picture Placeholder 16" descr="A group of people posing for the camera&#10;&#10;Description automatically generated">
-            <a:extLst>
-              <a:ext uri="{FF2B5EF4-FFF2-40B4-BE49-F238E27FC236}">
-                <a16:creationId xmlns:a16="http://schemas.microsoft.com/office/drawing/2014/main" id="{CBAD6E17-CBCF-41A0-AFA6-40E7F7808E7C}"/>
-              </a:ext>
-            </a:extLst>
-          </p:cNvPr>
-          <p:cNvPicPr>
-            <a:picLocks noGrp="1" noChangeAspect="1"/>
-          </p:cNvPicPr>
-          <p:nvPr>
-            <p:ph type="pic" sz="quarter" idx="13"/>
-          </p:nvPr>
-        </p:nvPicPr>
-        <p:blipFill rotWithShape="1">
-          <a:blip r:embed="rId2"/>
-          <a:srcRect l="13582" r="13582"/>
-          <a:stretch/>
-        </p:blipFill>
-        <p:spPr>
-          <a:xfrm>
-            <a:off x="20" y="10"/>
-            <a:ext cx="6105116" cy="4190990"/>
-          </a:xfrm>
-          <a:noFill/>
-        </p:spPr>
-      </p:pic>
-      <p:sp>
-        <p:nvSpPr>
-          <p:cNvPr id="4" name="Title 3">
-            <a:extLst>
-              <a:ext uri="{FF2B5EF4-FFF2-40B4-BE49-F238E27FC236}">
-                <a16:creationId xmlns:a16="http://schemas.microsoft.com/office/drawing/2014/main" id="{8CA6E381-7CDD-4999-B9C7-CD31E749FD95}"/>
-              </a:ext>
-            </a:extLst>
-          </p:cNvPr>
-          <p:cNvSpPr>
-            <a:spLocks noGrp="1"/>
-          </p:cNvSpPr>
-          <p:nvPr>
-            <p:ph type="title"/>
-          </p:nvPr>
-        </p:nvSpPr>
-        <p:spPr>
-          <a:xfrm>
-            <a:off x="6739128" y="1280160"/>
-            <a:ext cx="4617720" cy="2578608"/>
-          </a:xfrm>
-        </p:spPr>
-        <p:txBody>
-          <a:bodyPr anchor="b">
-            <a:normAutofit/>
-          </a:bodyPr>
-          <a:lstStyle/>
-          <a:p>
-            <a:r>
-              <a:rPr lang="en-US" dirty="0"/>
-              <a:t>Thank you</a:t>
-            </a:r>
-          </a:p>
-        </p:txBody>
-      </p:sp>
-      <p:sp>
-        <p:nvSpPr>
-          <p:cNvPr id="26" name="Footer Placeholder 5">
-            <a:extLst>
-              <a:ext uri="{FF2B5EF4-FFF2-40B4-BE49-F238E27FC236}">
-                <a16:creationId xmlns:a16="http://schemas.microsoft.com/office/drawing/2014/main" id="{EADA098B-F015-5FF4-2A19-2D32BD753ECC}"/>
-              </a:ext>
-            </a:extLst>
-          </p:cNvPr>
-          <p:cNvSpPr>
-            <a:spLocks noGrp="1"/>
-          </p:cNvSpPr>
-          <p:nvPr>
-            <p:ph type="ftr" sz="quarter" idx="11"/>
-          </p:nvPr>
-        </p:nvSpPr>
-        <p:spPr>
-          <a:xfrm>
-            <a:off x="6739128" y="6356350"/>
-            <a:ext cx="4114800" cy="365125"/>
-          </a:xfrm>
-        </p:spPr>
-        <p:txBody>
-          <a:bodyPr/>
-          <a:lstStyle/>
-          <a:p>
-            <a:pPr algn="l">
-              <a:spcAft>
-                <a:spcPts val="600"/>
-              </a:spcAft>
-            </a:pPr>
-            <a:r>
-              <a:rPr lang="en-US" dirty="0"/>
-              <a:t>Netflix</a:t>
-            </a:r>
-          </a:p>
-        </p:txBody>
-      </p:sp>
-      <p:sp>
-        <p:nvSpPr>
-          <p:cNvPr id="32" name="Slide Number Placeholder 6">
-            <a:extLst>
-              <a:ext uri="{FF2B5EF4-FFF2-40B4-BE49-F238E27FC236}">
-                <a16:creationId xmlns:a16="http://schemas.microsoft.com/office/drawing/2014/main" id="{DE3F7F6C-80AA-3E4C-87DC-4A9234EB5D77}"/>
-              </a:ext>
-            </a:extLst>
-          </p:cNvPr>
-          <p:cNvSpPr>
-            <a:spLocks noGrp="1"/>
-          </p:cNvSpPr>
-          <p:nvPr>
-            <p:ph type="sldNum" sz="quarter" idx="12"/>
-          </p:nvPr>
-        </p:nvSpPr>
-        <p:spPr>
-          <a:xfrm>
-            <a:off x="8610600" y="6356350"/>
-            <a:ext cx="2743200" cy="365125"/>
-          </a:xfrm>
-        </p:spPr>
-        <p:txBody>
-          <a:bodyPr/>
-          <a:lstStyle/>
-          <a:p>
-            <a:pPr>
-              <a:spcAft>
-                <a:spcPts val="600"/>
-              </a:spcAft>
-            </a:pPr>
-            <a:fld id="{B9713C8C-8E70-45D5-AE59-23E60168254E}" type="slidenum">
-              <a:rPr lang="en-US" smtClean="0"/>
-              <a:pPr>
-                <a:spcAft>
-                  <a:spcPts val="600"/>
-                </a:spcAft>
-              </a:pPr>
-              <a:t>20</a:t>
-            </a:fld>
-            <a:endParaRPr lang="en-US"/>
-          </a:p>
-        </p:txBody>
-      </p:sp>
-    </p:spTree>
-    <p:extLst>
-      <p:ext uri="{BB962C8B-B14F-4D97-AF65-F5344CB8AC3E}">
-        <p14:creationId xmlns:p14="http://schemas.microsoft.com/office/powerpoint/2010/main" val="2420767862"/>
       </p:ext>
     </p:extLst>
   </p:cSld>

</xml_diff>

<commit_message>
presentation edits, added questions to notes
</commit_message>
<xml_diff>
--- a/Project_1.pptx
+++ b/Project_1.pptx
@@ -194,7 +194,7 @@
 <file path=ppt/revisionInfo.xml><?xml version="1.0" encoding="utf-8"?>
 <p1510:revInfo xmlns:a="http://schemas.openxmlformats.org/drawingml/2006/main" xmlns:r="http://schemas.openxmlformats.org/officeDocument/2006/relationships" xmlns:p1510="http://schemas.microsoft.com/office/powerpoint/2015/10/main">
   <p1510:revLst>
-    <p1510:client id="{F777C335-4339-49C5-8275-414B08422B2B}" v="24" dt="2022-04-29T21:35:28.897"/>
+    <p1510:client id="{F777C335-4339-49C5-8275-414B08422B2B}" v="27" dt="2022-04-30T00:21:11.258"/>
   </p1510:revLst>
 </p1510:revInfo>
 </file>
@@ -203,8 +203,8 @@
 <pc:chgInfo xmlns:a="http://schemas.openxmlformats.org/drawingml/2006/main" xmlns:r="http://schemas.openxmlformats.org/officeDocument/2006/relationships" xmlns:ac="http://schemas.microsoft.com/office/drawing/2013/main/command" xmlns:pc="http://schemas.microsoft.com/office/powerpoint/2013/main/command">
   <pc:docChgLst>
     <pc:chgData name="Stefanie Gagnon" userId="f874ef52da13a6b2" providerId="LiveId" clId="{F777C335-4339-49C5-8275-414B08422B2B}"/>
-    <pc:docChg chg="undo custSel addSld delSld modSld sldOrd modSection">
-      <pc:chgData name="Stefanie Gagnon" userId="f874ef52da13a6b2" providerId="LiveId" clId="{F777C335-4339-49C5-8275-414B08422B2B}" dt="2022-04-29T21:36:21.378" v="2472" actId="14100"/>
+    <pc:docChg chg="undo redo custSel addSld delSld modSld sldOrd modSection">
+      <pc:chgData name="Stefanie Gagnon" userId="f874ef52da13a6b2" providerId="LiveId" clId="{F777C335-4339-49C5-8275-414B08422B2B}" dt="2022-04-30T01:12:55.519" v="2558" actId="27636"/>
       <pc:docMkLst>
         <pc:docMk/>
       </pc:docMkLst>
@@ -270,8 +270,8 @@
           <pc:sldMk cId="1497105360" sldId="397"/>
         </pc:sldMkLst>
       </pc:sldChg>
-      <pc:sldChg chg="modSp mod">
-        <pc:chgData name="Stefanie Gagnon" userId="f874ef52da13a6b2" providerId="LiveId" clId="{F777C335-4339-49C5-8275-414B08422B2B}" dt="2022-04-29T15:17:01.031" v="1598" actId="33524"/>
+      <pc:sldChg chg="modSp mod modNotesTx">
+        <pc:chgData name="Stefanie Gagnon" userId="f874ef52da13a6b2" providerId="LiveId" clId="{F777C335-4339-49C5-8275-414B08422B2B}" dt="2022-04-30T01:09:42.387" v="2532"/>
         <pc:sldMkLst>
           <pc:docMk/>
           <pc:sldMk cId="2849151971" sldId="402"/>
@@ -736,14 +736,22 @@
           <pc:sldMk cId="3425695329" sldId="421"/>
         </pc:sldMkLst>
       </pc:sldChg>
-      <pc:sldChg chg="addSp modSp mod modNotesTx">
-        <pc:chgData name="Stefanie Gagnon" userId="f874ef52da13a6b2" providerId="LiveId" clId="{F777C335-4339-49C5-8275-414B08422B2B}" dt="2022-04-29T16:30:36.852" v="2248" actId="20577"/>
+      <pc:sldChg chg="addSp delSp modSp mod modNotesTx">
+        <pc:chgData name="Stefanie Gagnon" userId="f874ef52da13a6b2" providerId="LiveId" clId="{F777C335-4339-49C5-8275-414B08422B2B}" dt="2022-04-30T00:21:49.832" v="2522" actId="20577"/>
         <pc:sldMkLst>
           <pc:docMk/>
           <pc:sldMk cId="236167648" sldId="422"/>
         </pc:sldMkLst>
+        <pc:spChg chg="mod">
+          <ac:chgData name="Stefanie Gagnon" userId="f874ef52da13a6b2" providerId="LiveId" clId="{F777C335-4339-49C5-8275-414B08422B2B}" dt="2022-04-30T00:20:38.086" v="2513" actId="20577"/>
+          <ac:spMkLst>
+            <pc:docMk/>
+            <pc:sldMk cId="236167648" sldId="422"/>
+            <ac:spMk id="2" creationId="{6CFECE77-7A17-4D27-8F36-82EC388F8C9D}"/>
+          </ac:spMkLst>
+        </pc:spChg>
         <pc:spChg chg="add mod">
-          <ac:chgData name="Stefanie Gagnon" userId="f874ef52da13a6b2" providerId="LiveId" clId="{F777C335-4339-49C5-8275-414B08422B2B}" dt="2022-04-29T16:29:49.227" v="2219" actId="255"/>
+          <ac:chgData name="Stefanie Gagnon" userId="f874ef52da13a6b2" providerId="LiveId" clId="{F777C335-4339-49C5-8275-414B08422B2B}" dt="2022-04-30T00:21:49.832" v="2522" actId="20577"/>
           <ac:spMkLst>
             <pc:docMk/>
             <pc:sldMk cId="236167648" sldId="422"/>
@@ -766,9 +774,49 @@
             <ac:spMk id="5" creationId="{E45EACE6-95E1-43CA-BF8E-3C66DA81B333}"/>
           </ac:spMkLst>
         </pc:spChg>
+        <pc:spChg chg="add del mod">
+          <ac:chgData name="Stefanie Gagnon" userId="f874ef52da13a6b2" providerId="LiveId" clId="{F777C335-4339-49C5-8275-414B08422B2B}" dt="2022-04-30T00:17:18.207" v="2482" actId="478"/>
+          <ac:spMkLst>
+            <pc:docMk/>
+            <pc:sldMk cId="236167648" sldId="422"/>
+            <ac:spMk id="11" creationId="{AE338F79-4840-41F5-A797-C98A2867ED12}"/>
+          </ac:spMkLst>
+        </pc:spChg>
+        <pc:picChg chg="del mod">
+          <ac:chgData name="Stefanie Gagnon" userId="f874ef52da13a6b2" providerId="LiveId" clId="{F777C335-4339-49C5-8275-414B08422B2B}" dt="2022-04-30T00:16:58.910" v="2478" actId="478"/>
+          <ac:picMkLst>
+            <pc:docMk/>
+            <pc:sldMk cId="236167648" sldId="422"/>
+            <ac:picMk id="8" creationId="{F36DB7C0-55F9-41F8-940B-5A9B39305B00}"/>
+          </ac:picMkLst>
+        </pc:picChg>
+        <pc:picChg chg="add del mod">
+          <ac:chgData name="Stefanie Gagnon" userId="f874ef52da13a6b2" providerId="LiveId" clId="{F777C335-4339-49C5-8275-414B08422B2B}" dt="2022-04-30T00:19:20.365" v="2490" actId="478"/>
+          <ac:picMkLst>
+            <pc:docMk/>
+            <pc:sldMk cId="236167648" sldId="422"/>
+            <ac:picMk id="9" creationId="{A688F6D2-3FFA-45C2-8A81-F29C6A94D3A1}"/>
+          </ac:picMkLst>
+        </pc:picChg>
+        <pc:picChg chg="add del mod">
+          <ac:chgData name="Stefanie Gagnon" userId="f874ef52da13a6b2" providerId="LiveId" clId="{F777C335-4339-49C5-8275-414B08422B2B}" dt="2022-04-30T00:21:13.531" v="2517" actId="478"/>
+          <ac:picMkLst>
+            <pc:docMk/>
+            <pc:sldMk cId="236167648" sldId="422"/>
+            <ac:picMk id="13" creationId="{6277F644-545A-44E3-9314-F9ACABD52EEC}"/>
+          </ac:picMkLst>
+        </pc:picChg>
+        <pc:picChg chg="add mod">
+          <ac:chgData name="Stefanie Gagnon" userId="f874ef52da13a6b2" providerId="LiveId" clId="{F777C335-4339-49C5-8275-414B08422B2B}" dt="2022-04-30T00:21:30.122" v="2521" actId="1076"/>
+          <ac:picMkLst>
+            <pc:docMk/>
+            <pc:sldMk cId="236167648" sldId="422"/>
+            <ac:picMk id="15" creationId="{C44EE9DE-3694-4B88-B92E-2DB4BE502B2F}"/>
+          </ac:picMkLst>
+        </pc:picChg>
       </pc:sldChg>
       <pc:sldChg chg="addSp delSp modSp mod modNotesTx">
-        <pc:chgData name="Stefanie Gagnon" userId="f874ef52da13a6b2" providerId="LiveId" clId="{F777C335-4339-49C5-8275-414B08422B2B}" dt="2022-04-29T21:36:21.378" v="2472" actId="14100"/>
+        <pc:chgData name="Stefanie Gagnon" userId="f874ef52da13a6b2" providerId="LiveId" clId="{F777C335-4339-49C5-8275-414B08422B2B}" dt="2022-04-30T01:04:30.412" v="2525"/>
         <pc:sldMkLst>
           <pc:docMk/>
           <pc:sldMk cId="3353992094" sldId="423"/>
@@ -1020,7 +1068,7 @@
         </pc:picChg>
       </pc:sldChg>
       <pc:sldChg chg="modSp mod ord modNotesTx">
-        <pc:chgData name="Stefanie Gagnon" userId="f874ef52da13a6b2" providerId="LiveId" clId="{F777C335-4339-49C5-8275-414B08422B2B}" dt="2022-04-29T16:48:33.825" v="2275" actId="20577"/>
+        <pc:chgData name="Stefanie Gagnon" userId="f874ef52da13a6b2" providerId="LiveId" clId="{F777C335-4339-49C5-8275-414B08422B2B}" dt="2022-04-30T01:12:55.519" v="2558" actId="27636"/>
         <pc:sldMkLst>
           <pc:docMk/>
           <pc:sldMk cId="2284775098" sldId="427"/>
@@ -1050,7 +1098,7 @@
           </ac:spMkLst>
         </pc:spChg>
         <pc:spChg chg="mod">
-          <ac:chgData name="Stefanie Gagnon" userId="f874ef52da13a6b2" providerId="LiveId" clId="{F777C335-4339-49C5-8275-414B08422B2B}" dt="2022-04-29T16:13:56.501" v="1620" actId="20577"/>
+          <ac:chgData name="Stefanie Gagnon" userId="f874ef52da13a6b2" providerId="LiveId" clId="{F777C335-4339-49C5-8275-414B08422B2B}" dt="2022-04-30T01:12:55.519" v="2558" actId="27636"/>
           <ac:spMkLst>
             <pc:docMk/>
             <pc:sldMk cId="2284775098" sldId="427"/>
@@ -6139,6 +6187,156 @@
           <a:lstStyle/>
           <a:p>
             <a:r>
+              <a:rPr lang="en-US" b="0" i="1" dirty="0">
+                <a:solidFill>
+                  <a:srgbClr val="1D1C1D"/>
+                </a:solidFill>
+                <a:effectLst/>
+                <a:latin typeface="Slack-Lato"/>
+              </a:rPr>
+              <a:t> What are all the current genres offered?* Which type of genres have the largest titles</a:t>
+            </a:r>
+          </a:p>
+          <a:p>
+            <a:r>
+              <a:rPr lang="en-US" b="0" i="1" dirty="0">
+                <a:solidFill>
+                  <a:srgbClr val="1D1C1D"/>
+                </a:solidFill>
+                <a:effectLst/>
+                <a:latin typeface="Slack-Lato"/>
+              </a:rPr>
+              <a:t>How many countries have productions on Netflix? Which country is the largest content production on the Netflix</a:t>
+            </a:r>
+          </a:p>
+          <a:p>
+            <a:r>
+              <a:rPr lang="en-US" b="0" i="1" dirty="0">
+                <a:solidFill>
+                  <a:srgbClr val="1D1C1D"/>
+                </a:solidFill>
+                <a:effectLst/>
+                <a:latin typeface="Slack-Lato"/>
+              </a:rPr>
+              <a:t>Is there any correlation between run time and </a:t>
+            </a:r>
+            <a:r>
+              <a:rPr lang="en-US" b="0" i="1" dirty="0" err="1">
+                <a:solidFill>
+                  <a:srgbClr val="1D1C1D"/>
+                </a:solidFill>
+                <a:effectLst/>
+                <a:latin typeface="Slack-Lato"/>
+              </a:rPr>
+              <a:t>Imdb</a:t>
+            </a:r>
+            <a:r>
+              <a:rPr lang="en-US" b="0" i="1" dirty="0">
+                <a:solidFill>
+                  <a:srgbClr val="1D1C1D"/>
+                </a:solidFill>
+                <a:effectLst/>
+                <a:latin typeface="Slack-Lato"/>
+              </a:rPr>
+              <a:t> scores?</a:t>
+            </a:r>
+          </a:p>
+          <a:p>
+            <a:r>
+              <a:rPr lang="en-US" b="0" i="1" dirty="0">
+                <a:solidFill>
+                  <a:srgbClr val="1D1C1D"/>
+                </a:solidFill>
+                <a:effectLst/>
+                <a:latin typeface="Slack-Lato"/>
+              </a:rPr>
+              <a:t>How long (duration) are they?* How s average run time?</a:t>
+            </a:r>
+            <a:endParaRPr lang="en-US" dirty="0"/>
+          </a:p>
+        </p:txBody>
+      </p:sp>
+      <p:sp>
+        <p:nvSpPr>
+          <p:cNvPr id="4" name="Slide Number Placeholder 3"/>
+          <p:cNvSpPr>
+            <a:spLocks noGrp="1"/>
+          </p:cNvSpPr>
+          <p:nvPr>
+            <p:ph type="sldNum" sz="quarter" idx="5"/>
+          </p:nvPr>
+        </p:nvSpPr>
+        <p:spPr/>
+        <p:txBody>
+          <a:bodyPr/>
+          <a:lstStyle/>
+          <a:p>
+            <a:fld id="{0D0EDF81-139F-488C-872B-4720FBA6BF98}" type="slidenum">
+              <a:rPr lang="en-US" smtClean="0"/>
+              <a:t>5</a:t>
+            </a:fld>
+            <a:endParaRPr lang="en-US" dirty="0"/>
+          </a:p>
+        </p:txBody>
+      </p:sp>
+    </p:spTree>
+    <p:extLst>
+      <p:ext uri="{BB962C8B-B14F-4D97-AF65-F5344CB8AC3E}">
+        <p14:creationId xmlns:p14="http://schemas.microsoft.com/office/powerpoint/2010/main" val="1481082798"/>
+      </p:ext>
+    </p:extLst>
+  </p:cSld>
+  <p:clrMapOvr>
+    <a:masterClrMapping/>
+  </p:clrMapOvr>
+</p:notes>
+</file>
+
+<file path=ppt/notesSlides/notesSlide2.xml><?xml version="1.0" encoding="utf-8"?>
+<p:notes xmlns:a="http://schemas.openxmlformats.org/drawingml/2006/main" xmlns:r="http://schemas.openxmlformats.org/officeDocument/2006/relationships" xmlns:p="http://schemas.openxmlformats.org/presentationml/2006/main">
+  <p:cSld>
+    <p:spTree>
+      <p:nvGrpSpPr>
+        <p:cNvPr id="1" name=""/>
+        <p:cNvGrpSpPr/>
+        <p:nvPr/>
+      </p:nvGrpSpPr>
+      <p:grpSpPr>
+        <a:xfrm>
+          <a:off x="0" y="0"/>
+          <a:ext cx="0" cy="0"/>
+          <a:chOff x="0" y="0"/>
+          <a:chExt cx="0" cy="0"/>
+        </a:xfrm>
+      </p:grpSpPr>
+      <p:sp>
+        <p:nvSpPr>
+          <p:cNvPr id="2" name="Slide Image Placeholder 1"/>
+          <p:cNvSpPr>
+            <a:spLocks noGrp="1" noRot="1" noChangeAspect="1"/>
+          </p:cNvSpPr>
+          <p:nvPr>
+            <p:ph type="sldImg"/>
+          </p:nvPr>
+        </p:nvSpPr>
+        <p:spPr/>
+      </p:sp>
+      <p:sp>
+        <p:nvSpPr>
+          <p:cNvPr id="3" name="Notes Placeholder 2"/>
+          <p:cNvSpPr>
+            <a:spLocks noGrp="1"/>
+          </p:cNvSpPr>
+          <p:nvPr>
+            <p:ph type="body" idx="1"/>
+          </p:nvPr>
+        </p:nvSpPr>
+        <p:spPr/>
+        <p:txBody>
+          <a:bodyPr/>
+          <a:lstStyle/>
+          <a:p>
+            <a:r>
               <a:rPr lang="en-US" dirty="0"/>
               <a:t>We used csv files for creating the 2005 and 2021 Netflix </a:t>
             </a:r>
@@ -6230,7 +6428,7 @@
 </p:notes>
 </file>
 
-<file path=ppt/notesSlides/notesSlide2.xml><?xml version="1.0" encoding="utf-8"?>
+<file path=ppt/notesSlides/notesSlide3.xml><?xml version="1.0" encoding="utf-8"?>
 <p:notes xmlns:a="http://schemas.openxmlformats.org/drawingml/2006/main" xmlns:r="http://schemas.openxmlformats.org/officeDocument/2006/relationships" xmlns:p="http://schemas.openxmlformats.org/presentationml/2006/main">
   <p:cSld>
     <p:spTree>
@@ -6314,7 +6512,7 @@
 </p:notes>
 </file>
 
-<file path=ppt/notesSlides/notesSlide3.xml><?xml version="1.0" encoding="utf-8"?>
+<file path=ppt/notesSlides/notesSlide4.xml><?xml version="1.0" encoding="utf-8"?>
 <p:notes xmlns:a="http://schemas.openxmlformats.org/drawingml/2006/main" xmlns:r="http://schemas.openxmlformats.org/officeDocument/2006/relationships" xmlns:p="http://schemas.openxmlformats.org/presentationml/2006/main">
   <p:cSld>
     <p:spTree>
@@ -6401,7 +6599,7 @@
 </p:notes>
 </file>
 
-<file path=ppt/notesSlides/notesSlide4.xml><?xml version="1.0" encoding="utf-8"?>
+<file path=ppt/notesSlides/notesSlide5.xml><?xml version="1.0" encoding="utf-8"?>
 <p:notes xmlns:a="http://schemas.openxmlformats.org/drawingml/2006/main" xmlns:r="http://schemas.openxmlformats.org/officeDocument/2006/relationships" xmlns:p="http://schemas.openxmlformats.org/presentationml/2006/main">
   <p:cSld>
     <p:spTree>
@@ -6444,6 +6642,22 @@
         <p:txBody>
           <a:bodyPr/>
           <a:lstStyle/>
+          <a:p>
+            <a:endParaRPr lang="en-US" dirty="0"/>
+          </a:p>
+          <a:p>
+            <a:r>
+              <a:rPr lang="en-US" b="0" i="1" dirty="0">
+                <a:solidFill>
+                  <a:srgbClr val="1D1C1D"/>
+                </a:solidFill>
+                <a:effectLst/>
+                <a:latin typeface="Slack-Lato"/>
+              </a:rPr>
+              <a:t>How many countries have productions on Netflix? Which country is the largest content production on the Netflix</a:t>
+            </a:r>
+            <a:endParaRPr lang="en-US" dirty="0"/>
+          </a:p>
           <a:p>
             <a:r>
               <a:rPr lang="en-US" dirty="0"/>
@@ -6494,7 +6708,7 @@
 </p:notes>
 </file>
 
-<file path=ppt/notesSlides/notesSlide5.xml><?xml version="1.0" encoding="utf-8"?>
+<file path=ppt/notesSlides/notesSlide6.xml><?xml version="1.0" encoding="utf-8"?>
 <p:notes xmlns:a="http://schemas.openxmlformats.org/drawingml/2006/main" xmlns:r="http://schemas.openxmlformats.org/officeDocument/2006/relationships" xmlns:p="http://schemas.openxmlformats.org/presentationml/2006/main">
   <p:cSld>
     <p:spTree>
@@ -6593,7 +6807,7 @@
 </p:notes>
 </file>
 
-<file path=ppt/notesSlides/notesSlide6.xml><?xml version="1.0" encoding="utf-8"?>
+<file path=ppt/notesSlides/notesSlide7.xml><?xml version="1.0" encoding="utf-8"?>
 <p:notes xmlns:a="http://schemas.openxmlformats.org/drawingml/2006/main" xmlns:r="http://schemas.openxmlformats.org/officeDocument/2006/relationships" xmlns:p="http://schemas.openxmlformats.org/presentationml/2006/main">
   <p:cSld>
     <p:spTree>
@@ -6692,7 +6906,7 @@
 </p:notes>
 </file>
 
-<file path=ppt/notesSlides/notesSlide7.xml><?xml version="1.0" encoding="utf-8"?>
+<file path=ppt/notesSlides/notesSlide8.xml><?xml version="1.0" encoding="utf-8"?>
 <p:notes xmlns:a="http://schemas.openxmlformats.org/drawingml/2006/main" xmlns:r="http://schemas.openxmlformats.org/officeDocument/2006/relationships" xmlns:p="http://schemas.openxmlformats.org/presentationml/2006/main">
   <p:cSld>
     <p:spTree>
@@ -40545,41 +40759,16 @@
           <a:lstStyle/>
           <a:p>
             <a:r>
+              <a:rPr lang="en-US" dirty="0" err="1"/>
+              <a:t>Imdb</a:t>
+            </a:r>
+            <a:r>
               <a:rPr lang="en-US" dirty="0"/>
-              <a:t>Ratings vs Run time</a:t>
+              <a:t> Score and Run time</a:t>
             </a:r>
           </a:p>
         </p:txBody>
       </p:sp>
-      <p:pic>
-        <p:nvPicPr>
-          <p:cNvPr id="8" name="Content Placeholder 7" descr="Chart, scatter chart&#10;&#10;Description automatically generated">
-            <a:extLst>
-              <a:ext uri="{FF2B5EF4-FFF2-40B4-BE49-F238E27FC236}">
-                <a16:creationId xmlns:a16="http://schemas.microsoft.com/office/drawing/2014/main" id="{F36DB7C0-55F9-41F8-940B-5A9B39305B00}"/>
-              </a:ext>
-            </a:extLst>
-          </p:cNvPr>
-          <p:cNvPicPr>
-            <a:picLocks noGrp="1" noChangeAspect="1"/>
-          </p:cNvPicPr>
-          <p:nvPr>
-            <p:ph idx="1"/>
-          </p:nvPr>
-        </p:nvPicPr>
-        <p:blipFill>
-          <a:blip r:embed="rId3"/>
-          <a:stretch>
-            <a:fillRect/>
-          </a:stretch>
-        </p:blipFill>
-        <p:spPr>
-          <a:xfrm>
-            <a:off x="838200" y="2777331"/>
-            <a:ext cx="10515600" cy="2628900"/>
-          </a:xfrm>
-        </p:spPr>
-      </p:pic>
       <p:sp>
         <p:nvSpPr>
           <p:cNvPr id="4" name="Date Placeholder 3">
@@ -40679,7 +40868,7 @@
         </p:nvSpPr>
         <p:spPr>
           <a:xfrm>
-            <a:off x="1469571" y="2024743"/>
+            <a:off x="1785257" y="1772686"/>
             <a:ext cx="6683829" cy="400110"/>
           </a:xfrm>
           <a:prstGeom prst="rect">
@@ -40695,11 +40884,41 @@
           <a:p>
             <a:r>
               <a:rPr lang="en-US" sz="2000" dirty="0"/>
-              <a:t>Average runtime for a movie is 101 mins</a:t>
+              <a:t>Average run time for a movie is 101 mins</a:t>
             </a:r>
           </a:p>
         </p:txBody>
       </p:sp>
+      <p:pic>
+        <p:nvPicPr>
+          <p:cNvPr id="15" name="Picture 14" descr="Chart, scatter chart&#10;&#10;Description automatically generated">
+            <a:extLst>
+              <a:ext uri="{FF2B5EF4-FFF2-40B4-BE49-F238E27FC236}">
+                <a16:creationId xmlns:a16="http://schemas.microsoft.com/office/drawing/2014/main" id="{C44EE9DE-3694-4B88-B92E-2DB4BE502B2F}"/>
+              </a:ext>
+            </a:extLst>
+          </p:cNvPr>
+          <p:cNvPicPr>
+            <a:picLocks noChangeAspect="1"/>
+          </p:cNvPicPr>
+          <p:nvPr/>
+        </p:nvPicPr>
+        <p:blipFill>
+          <a:blip r:embed="rId3"/>
+          <a:stretch>
+            <a:fillRect/>
+          </a:stretch>
+        </p:blipFill>
+        <p:spPr>
+          <a:xfrm>
+            <a:off x="-1132114" y="2416627"/>
+            <a:ext cx="14456228" cy="3614057"/>
+          </a:xfrm>
+          <a:prstGeom prst="rect">
+            <a:avLst/>
+          </a:prstGeom>
+        </p:spPr>
+      </p:pic>
     </p:spTree>
     <p:extLst>
       <p:ext uri="{BB962C8B-B14F-4D97-AF65-F5344CB8AC3E}">
@@ -41031,7 +41250,7 @@
         <p:spPr/>
         <p:txBody>
           <a:bodyPr>
-            <a:normAutofit/>
+            <a:normAutofit fontScale="92500" lnSpcReduction="10000"/>
           </a:bodyPr>
           <a:lstStyle/>
           <a:p>
@@ -41049,13 +41268,30 @@
           <a:p>
             <a:r>
               <a:rPr lang="en-US" dirty="0"/>
-              <a:t>Top 5 Rating types: TV_MA, TV-14, TV-PG, R, PG-13, TV-Y</a:t>
+              <a:t>Top 5 Rating types: TV_MA, TV-14, TV-PG, R, PG-13</a:t>
+            </a:r>
+            <a:r>
+              <a:rPr lang="en-US"/>
+              <a:t>, TV-Y  </a:t>
+            </a:r>
+            <a:endParaRPr lang="en-US" dirty="0"/>
+          </a:p>
+          <a:p>
+            <a:r>
+              <a:rPr lang="en-US" dirty="0"/>
+              <a:t>Percentage of Movie is higher TV show</a:t>
             </a:r>
           </a:p>
           <a:p>
             <a:r>
               <a:rPr lang="en-US" dirty="0"/>
-              <a:t>Most of runtimes are from 50 -150mins  </a:t>
+              <a:t>Most of runtimes are from 50 -150mins , average is 101 mins</a:t>
+            </a:r>
+          </a:p>
+          <a:p>
+            <a:r>
+              <a:rPr lang="en-US" dirty="0"/>
+              <a:t>There is not much relationship between rating and year</a:t>
             </a:r>
           </a:p>
           <a:p>
@@ -43035,21 +43271,21 @@
 </file>
 
 <file path=customXml/item1.xml><?xml version="1.0" encoding="utf-8"?>
+<?mso-contentType ?>
+<FormTemplates xmlns="http://schemas.microsoft.com/sharepoint/v3/contenttype/forms">
+  <Display>DocumentLibraryForm</Display>
+  <Edit>DocumentLibraryForm</Edit>
+  <New>DocumentLibraryForm</New>
+</FormTemplates>
+</file>
+
+<file path=customXml/item2.xml><?xml version="1.0" encoding="utf-8"?>
 <p:properties xmlns:p="http://schemas.microsoft.com/office/2006/metadata/properties" xmlns:xsi="http://www.w3.org/2001/XMLSchema-instance" xmlns:pc="http://schemas.microsoft.com/office/infopath/2007/PartnerControls">
   <documentManagement>
     <Status xmlns="71af3243-3dd4-4a8d-8c0d-dd76da1f02a5">Not started</Status>
     <MediaServiceKeyPoints xmlns="71af3243-3dd4-4a8d-8c0d-dd76da1f02a5" xsi:nil="true"/>
   </documentManagement>
 </p:properties>
-</file>
-
-<file path=customXml/item2.xml><?xml version="1.0" encoding="utf-8"?>
-<?mso-contentType ?>
-<FormTemplates xmlns="http://schemas.microsoft.com/sharepoint/v3/contenttype/forms">
-  <Display>DocumentLibraryForm</Display>
-  <Edit>DocumentLibraryForm</Edit>
-  <New>DocumentLibraryForm</New>
-</FormTemplates>
 </file>
 
 <file path=customXml/item3.xml><?xml version="1.0" encoding="utf-8"?>
@@ -43274,19 +43510,19 @@
 </file>
 
 <file path=customXml/itemProps1.xml><?xml version="1.0" encoding="utf-8"?>
+<ds:datastoreItem xmlns:ds="http://schemas.openxmlformats.org/officeDocument/2006/customXml" ds:itemID="{C0DCE9DA-F7FD-45FA-83B7-D9813A44258A}">
+  <ds:schemaRefs>
+    <ds:schemaRef ds:uri="http://schemas.microsoft.com/sharepoint/v3/contenttype/forms"/>
+  </ds:schemaRefs>
+</ds:datastoreItem>
+</file>
+
+<file path=customXml/itemProps2.xml><?xml version="1.0" encoding="utf-8"?>
 <ds:datastoreItem xmlns:ds="http://schemas.openxmlformats.org/officeDocument/2006/customXml" ds:itemID="{9DFCC198-DBFA-46B2-A241-8E3888E63670}">
   <ds:schemaRefs>
     <ds:schemaRef ds:uri="http://schemas.microsoft.com/office/2006/metadata/properties"/>
     <ds:schemaRef ds:uri="http://schemas.microsoft.com/office/infopath/2007/PartnerControls"/>
     <ds:schemaRef ds:uri="71af3243-3dd4-4a8d-8c0d-dd76da1f02a5"/>
-  </ds:schemaRefs>
-</ds:datastoreItem>
-</file>
-
-<file path=customXml/itemProps2.xml><?xml version="1.0" encoding="utf-8"?>
-<ds:datastoreItem xmlns:ds="http://schemas.openxmlformats.org/officeDocument/2006/customXml" ds:itemID="{C0DCE9DA-F7FD-45FA-83B7-D9813A44258A}">
-  <ds:schemaRefs>
-    <ds:schemaRef ds:uri="http://schemas.microsoft.com/sharepoint/v3/contenttype/forms"/>
   </ds:schemaRefs>
 </ds:datastoreItem>
 </file>

</xml_diff>

<commit_message>
fixed graph labels, final edits to graphs and pp
</commit_message>
<xml_diff>
--- a/Project_1.pptx
+++ b/Project_1.pptx
@@ -196,7 +196,7 @@
 <file path=ppt/revisionInfo.xml><?xml version="1.0" encoding="utf-8"?>
 <p1510:revInfo xmlns:a="http://schemas.openxmlformats.org/drawingml/2006/main" xmlns:r="http://schemas.openxmlformats.org/officeDocument/2006/relationships" xmlns:p1510="http://schemas.microsoft.com/office/powerpoint/2015/10/main">
   <p1510:revLst>
-    <p1510:client id="{F777C335-4339-49C5-8275-414B08422B2B}" v="27" dt="2022-04-30T00:21:11.258"/>
+    <p1510:client id="{6109B3D3-2B14-432F-A724-8C96588F7165}" v="6" dt="2022-05-02T13:43:20.310"/>
   </p1510:revLst>
 </p1510:revInfo>
 </file>
@@ -1215,6 +1215,262 @@
             <pc:docMk/>
             <pc:sldMk cId="3004099782" sldId="428"/>
             <ac:picMk id="41" creationId="{D67CA551-B856-4FBC-9D20-BD732A0DDDE5}"/>
+          </ac:picMkLst>
+        </pc:picChg>
+      </pc:sldChg>
+    </pc:docChg>
+  </pc:docChgLst>
+  <pc:docChgLst>
+    <pc:chgData name="Stefanie Gagnon" userId="f874ef52da13a6b2" providerId="LiveId" clId="{6109B3D3-2B14-432F-A724-8C96588F7165}"/>
+    <pc:docChg chg="custSel modSld">
+      <pc:chgData name="Stefanie Gagnon" userId="f874ef52da13a6b2" providerId="LiveId" clId="{6109B3D3-2B14-432F-A724-8C96588F7165}" dt="2022-05-02T13:47:45.578" v="121" actId="20577"/>
+      <pc:docMkLst>
+        <pc:docMk/>
+      </pc:docMkLst>
+      <pc:sldChg chg="delSp mod">
+        <pc:chgData name="Stefanie Gagnon" userId="f874ef52da13a6b2" providerId="LiveId" clId="{6109B3D3-2B14-432F-A724-8C96588F7165}" dt="2022-05-02T13:46:16.452" v="77" actId="478"/>
+        <pc:sldMkLst>
+          <pc:docMk/>
+          <pc:sldMk cId="2849151971" sldId="402"/>
+        </pc:sldMkLst>
+        <pc:spChg chg="del">
+          <ac:chgData name="Stefanie Gagnon" userId="f874ef52da13a6b2" providerId="LiveId" clId="{6109B3D3-2B14-432F-A724-8C96588F7165}" dt="2022-05-02T13:46:14.060" v="76" actId="478"/>
+          <ac:spMkLst>
+            <pc:docMk/>
+            <pc:sldMk cId="2849151971" sldId="402"/>
+            <ac:spMk id="12" creationId="{9C693BAD-6B4E-48AD-88BF-D933B374A1F1}"/>
+          </ac:spMkLst>
+        </pc:spChg>
+        <pc:spChg chg="del">
+          <ac:chgData name="Stefanie Gagnon" userId="f874ef52da13a6b2" providerId="LiveId" clId="{6109B3D3-2B14-432F-A724-8C96588F7165}" dt="2022-05-02T13:46:16.452" v="77" actId="478"/>
+          <ac:spMkLst>
+            <pc:docMk/>
+            <pc:sldMk cId="2849151971" sldId="402"/>
+            <ac:spMk id="13" creationId="{1B9E4CF7-70FB-40DF-BE47-6E5AE3154753}"/>
+          </ac:spMkLst>
+        </pc:spChg>
+      </pc:sldChg>
+      <pc:sldChg chg="delSp mod">
+        <pc:chgData name="Stefanie Gagnon" userId="f874ef52da13a6b2" providerId="LiveId" clId="{6109B3D3-2B14-432F-A724-8C96588F7165}" dt="2022-05-02T13:46:07.692" v="75" actId="478"/>
+        <pc:sldMkLst>
+          <pc:docMk/>
+          <pc:sldMk cId="1912948986" sldId="403"/>
+        </pc:sldMkLst>
+        <pc:spChg chg="del">
+          <ac:chgData name="Stefanie Gagnon" userId="f874ef52da13a6b2" providerId="LiveId" clId="{6109B3D3-2B14-432F-A724-8C96588F7165}" dt="2022-05-02T13:46:07.692" v="75" actId="478"/>
+          <ac:spMkLst>
+            <pc:docMk/>
+            <pc:sldMk cId="1912948986" sldId="403"/>
+            <ac:spMk id="26" creationId="{0E469817-940E-4A7E-82D2-9FC9B4D3AA33}"/>
+          </ac:spMkLst>
+        </pc:spChg>
+      </pc:sldChg>
+      <pc:sldChg chg="delSp modSp mod">
+        <pc:chgData name="Stefanie Gagnon" userId="f874ef52da13a6b2" providerId="LiveId" clId="{6109B3D3-2B14-432F-A724-8C96588F7165}" dt="2022-05-02T13:46:00.001" v="74" actId="478"/>
+        <pc:sldMkLst>
+          <pc:docMk/>
+          <pc:sldMk cId="3386965950" sldId="406"/>
+        </pc:sldMkLst>
+        <pc:spChg chg="del">
+          <ac:chgData name="Stefanie Gagnon" userId="f874ef52da13a6b2" providerId="LiveId" clId="{6109B3D3-2B14-432F-A724-8C96588F7165}" dt="2022-05-02T13:46:00.001" v="74" actId="478"/>
+          <ac:spMkLst>
+            <pc:docMk/>
+            <pc:sldMk cId="3386965950" sldId="406"/>
+            <ac:spMk id="30" creationId="{F66896BE-3509-49D5-A28D-97859D7434FE}"/>
+          </ac:spMkLst>
+        </pc:spChg>
+        <pc:spChg chg="del mod">
+          <ac:chgData name="Stefanie Gagnon" userId="f874ef52da13a6b2" providerId="LiveId" clId="{6109B3D3-2B14-432F-A724-8C96588F7165}" dt="2022-05-02T13:45:55.285" v="73" actId="478"/>
+          <ac:spMkLst>
+            <pc:docMk/>
+            <pc:sldMk cId="3386965950" sldId="406"/>
+            <ac:spMk id="31" creationId="{72FA7226-D67B-432B-A25E-F3656C32D1CD}"/>
+          </ac:spMkLst>
+        </pc:spChg>
+      </pc:sldChg>
+      <pc:sldChg chg="delSp mod">
+        <pc:chgData name="Stefanie Gagnon" userId="f874ef52da13a6b2" providerId="LiveId" clId="{6109B3D3-2B14-432F-A724-8C96588F7165}" dt="2022-05-02T13:46:22.970" v="79" actId="478"/>
+        <pc:sldMkLst>
+          <pc:docMk/>
+          <pc:sldMk cId="2357171705" sldId="414"/>
+        </pc:sldMkLst>
+        <pc:spChg chg="del">
+          <ac:chgData name="Stefanie Gagnon" userId="f874ef52da13a6b2" providerId="LiveId" clId="{6109B3D3-2B14-432F-A724-8C96588F7165}" dt="2022-05-02T13:46:22.970" v="79" actId="478"/>
+          <ac:spMkLst>
+            <pc:docMk/>
+            <pc:sldMk cId="2357171705" sldId="414"/>
+            <ac:spMk id="6" creationId="{FFA9757F-0365-4F15-86D3-6165DFD49085}"/>
+          </ac:spMkLst>
+        </pc:spChg>
+        <pc:spChg chg="del">
+          <ac:chgData name="Stefanie Gagnon" userId="f874ef52da13a6b2" providerId="LiveId" clId="{6109B3D3-2B14-432F-A724-8C96588F7165}" dt="2022-05-02T13:46:20.363" v="78" actId="478"/>
+          <ac:spMkLst>
+            <pc:docMk/>
+            <pc:sldMk cId="2357171705" sldId="414"/>
+            <ac:spMk id="7" creationId="{BD13B003-BFA7-43DB-9005-32EFF68D1340}"/>
+          </ac:spMkLst>
+        </pc:spChg>
+      </pc:sldChg>
+      <pc:sldChg chg="addSp delSp modSp mod">
+        <pc:chgData name="Stefanie Gagnon" userId="f874ef52da13a6b2" providerId="LiveId" clId="{6109B3D3-2B14-432F-A724-8C96588F7165}" dt="2022-05-02T13:34:47.991" v="26" actId="14100"/>
+        <pc:sldMkLst>
+          <pc:docMk/>
+          <pc:sldMk cId="2235685552" sldId="419"/>
+        </pc:sldMkLst>
+        <pc:spChg chg="add del mod">
+          <ac:chgData name="Stefanie Gagnon" userId="f874ef52da13a6b2" providerId="LiveId" clId="{6109B3D3-2B14-432F-A724-8C96588F7165}" dt="2022-05-02T13:34:31.305" v="21" actId="931"/>
+          <ac:spMkLst>
+            <pc:docMk/>
+            <pc:sldMk cId="2235685552" sldId="419"/>
+            <ac:spMk id="4" creationId="{DF3D50E9-C606-4263-94C3-06221890CC26}"/>
+          </ac:spMkLst>
+        </pc:spChg>
+        <pc:picChg chg="add mod">
+          <ac:chgData name="Stefanie Gagnon" userId="f874ef52da13a6b2" providerId="LiveId" clId="{6109B3D3-2B14-432F-A724-8C96588F7165}" dt="2022-05-02T13:34:47.991" v="26" actId="14100"/>
+          <ac:picMkLst>
+            <pc:docMk/>
+            <pc:sldMk cId="2235685552" sldId="419"/>
+            <ac:picMk id="6" creationId="{F3E5F44A-5CEC-4A7B-B5A0-7FE3B5B5500D}"/>
+          </ac:picMkLst>
+        </pc:picChg>
+        <pc:picChg chg="del">
+          <ac:chgData name="Stefanie Gagnon" userId="f874ef52da13a6b2" providerId="LiveId" clId="{6109B3D3-2B14-432F-A724-8C96588F7165}" dt="2022-05-02T13:34:25.048" v="20" actId="478"/>
+          <ac:picMkLst>
+            <pc:docMk/>
+            <pc:sldMk cId="2235685552" sldId="419"/>
+            <ac:picMk id="11" creationId="{21D6C733-5147-4FFB-B7DD-83C4FD40AD19}"/>
+          </ac:picMkLst>
+        </pc:picChg>
+      </pc:sldChg>
+      <pc:sldChg chg="addSp delSp modSp mod">
+        <pc:chgData name="Stefanie Gagnon" userId="f874ef52da13a6b2" providerId="LiveId" clId="{6109B3D3-2B14-432F-A724-8C96588F7165}" dt="2022-05-02T13:44:48.932" v="71" actId="1076"/>
+        <pc:sldMkLst>
+          <pc:docMk/>
+          <pc:sldMk cId="2343488884" sldId="420"/>
+        </pc:sldMkLst>
+        <pc:spChg chg="mod">
+          <ac:chgData name="Stefanie Gagnon" userId="f874ef52da13a6b2" providerId="LiveId" clId="{6109B3D3-2B14-432F-A724-8C96588F7165}" dt="2022-05-02T13:43:48.500" v="64" actId="1076"/>
+          <ac:spMkLst>
+            <pc:docMk/>
+            <pc:sldMk cId="2343488884" sldId="420"/>
+            <ac:spMk id="2" creationId="{6D602820-7F02-4F5F-8933-C0B61CFA2E08}"/>
+          </ac:spMkLst>
+        </pc:spChg>
+        <pc:spChg chg="add del mod">
+          <ac:chgData name="Stefanie Gagnon" userId="f874ef52da13a6b2" providerId="LiveId" clId="{6109B3D3-2B14-432F-A724-8C96588F7165}" dt="2022-05-02T13:38:18.316" v="30" actId="931"/>
+          <ac:spMkLst>
+            <pc:docMk/>
+            <pc:sldMk cId="2343488884" sldId="420"/>
+            <ac:spMk id="4" creationId="{C39960F3-C7A8-4D6F-831B-9C7F5A54C42D}"/>
+          </ac:spMkLst>
+        </pc:spChg>
+        <pc:spChg chg="add del mod">
+          <ac:chgData name="Stefanie Gagnon" userId="f874ef52da13a6b2" providerId="LiveId" clId="{6109B3D3-2B14-432F-A724-8C96588F7165}" dt="2022-05-02T13:42:49.645" v="53" actId="478"/>
+          <ac:spMkLst>
+            <pc:docMk/>
+            <pc:sldMk cId="2343488884" sldId="420"/>
+            <ac:spMk id="16" creationId="{75A82F3D-1AB6-410F-838D-5DA78358E204}"/>
+          </ac:spMkLst>
+        </pc:spChg>
+        <pc:picChg chg="del">
+          <ac:chgData name="Stefanie Gagnon" userId="f874ef52da13a6b2" providerId="LiveId" clId="{6109B3D3-2B14-432F-A724-8C96588F7165}" dt="2022-05-02T13:37:55.643" v="27" actId="478"/>
+          <ac:picMkLst>
+            <pc:docMk/>
+            <pc:sldMk cId="2343488884" sldId="420"/>
+            <ac:picMk id="6" creationId="{98E4CC82-7614-4489-B49D-5362A38E5919}"/>
+          </ac:picMkLst>
+        </pc:picChg>
+        <pc:picChg chg="add del mod">
+          <ac:chgData name="Stefanie Gagnon" userId="f874ef52da13a6b2" providerId="LiveId" clId="{6109B3D3-2B14-432F-A724-8C96588F7165}" dt="2022-05-02T13:40:07.344" v="52" actId="478"/>
+          <ac:picMkLst>
+            <pc:docMk/>
+            <pc:sldMk cId="2343488884" sldId="420"/>
+            <ac:picMk id="8" creationId="{F5AC7685-4F5F-460D-8D11-0BE111CF88F4}"/>
+          </ac:picMkLst>
+        </pc:picChg>
+        <pc:picChg chg="del mod">
+          <ac:chgData name="Stefanie Gagnon" userId="f874ef52da13a6b2" providerId="LiveId" clId="{6109B3D3-2B14-432F-A724-8C96588F7165}" dt="2022-05-02T13:38:01.703" v="29" actId="478"/>
+          <ac:picMkLst>
+            <pc:docMk/>
+            <pc:sldMk cId="2343488884" sldId="420"/>
+            <ac:picMk id="9" creationId="{AC571B51-1E2E-45DC-88D8-60C4591B949E}"/>
+          </ac:picMkLst>
+        </pc:picChg>
+        <pc:picChg chg="add del mod">
+          <ac:chgData name="Stefanie Gagnon" userId="f874ef52da13a6b2" providerId="LiveId" clId="{6109B3D3-2B14-432F-A724-8C96588F7165}" dt="2022-05-02T13:40:05.437" v="51" actId="478"/>
+          <ac:picMkLst>
+            <pc:docMk/>
+            <pc:sldMk cId="2343488884" sldId="420"/>
+            <ac:picMk id="12" creationId="{3E26A517-D35F-4E6A-882C-4140D328BE5B}"/>
+          </ac:picMkLst>
+        </pc:picChg>
+        <pc:picChg chg="add mod">
+          <ac:chgData name="Stefanie Gagnon" userId="f874ef52da13a6b2" providerId="LiveId" clId="{6109B3D3-2B14-432F-A724-8C96588F7165}" dt="2022-05-02T13:44:48.932" v="71" actId="1076"/>
+          <ac:picMkLst>
+            <pc:docMk/>
+            <pc:sldMk cId="2343488884" sldId="420"/>
+            <ac:picMk id="18" creationId="{D2946C92-CE16-48B5-85AC-B7D7620F960A}"/>
+          </ac:picMkLst>
+        </pc:picChg>
+        <pc:picChg chg="add mod">
+          <ac:chgData name="Stefanie Gagnon" userId="f874ef52da13a6b2" providerId="LiveId" clId="{6109B3D3-2B14-432F-A724-8C96588F7165}" dt="2022-05-02T13:44:41.147" v="70" actId="1076"/>
+          <ac:picMkLst>
+            <pc:docMk/>
+            <pc:sldMk cId="2343488884" sldId="420"/>
+            <ac:picMk id="20" creationId="{C3FE1740-3F0B-420F-917E-8CCCC2AC919D}"/>
+          </ac:picMkLst>
+        </pc:picChg>
+      </pc:sldChg>
+      <pc:sldChg chg="modNotesTx">
+        <pc:chgData name="Stefanie Gagnon" userId="f874ef52da13a6b2" providerId="LiveId" clId="{6109B3D3-2B14-432F-A724-8C96588F7165}" dt="2022-05-02T13:34:11.976" v="19" actId="20577"/>
+        <pc:sldMkLst>
+          <pc:docMk/>
+          <pc:sldMk cId="898263839" sldId="424"/>
+        </pc:sldMkLst>
+      </pc:sldChg>
+      <pc:sldChg chg="modSp mod">
+        <pc:chgData name="Stefanie Gagnon" userId="f874ef52da13a6b2" providerId="LiveId" clId="{6109B3D3-2B14-432F-A724-8C96588F7165}" dt="2022-05-02T13:47:45.578" v="121" actId="20577"/>
+        <pc:sldMkLst>
+          <pc:docMk/>
+          <pc:sldMk cId="2284775098" sldId="427"/>
+        </pc:sldMkLst>
+        <pc:spChg chg="mod">
+          <ac:chgData name="Stefanie Gagnon" userId="f874ef52da13a6b2" providerId="LiveId" clId="{6109B3D3-2B14-432F-A724-8C96588F7165}" dt="2022-05-02T13:47:45.578" v="121" actId="20577"/>
+          <ac:spMkLst>
+            <pc:docMk/>
+            <pc:sldMk cId="2284775098" sldId="427"/>
+            <ac:spMk id="7" creationId="{57A8AF85-E3DB-4752-9A82-60FA201BA9C5}"/>
+          </ac:spMkLst>
+        </pc:spChg>
+      </pc:sldChg>
+      <pc:sldChg chg="addSp delSp modSp mod">
+        <pc:chgData name="Stefanie Gagnon" userId="f874ef52da13a6b2" providerId="LiveId" clId="{6109B3D3-2B14-432F-A724-8C96588F7165}" dt="2022-05-02T13:33:40.747" v="18" actId="1076"/>
+        <pc:sldMkLst>
+          <pc:docMk/>
+          <pc:sldMk cId="3004099782" sldId="428"/>
+        </pc:sldMkLst>
+        <pc:spChg chg="add del mod">
+          <ac:chgData name="Stefanie Gagnon" userId="f874ef52da13a6b2" providerId="LiveId" clId="{6109B3D3-2B14-432F-A724-8C96588F7165}" dt="2022-05-02T13:31:37.801" v="1" actId="931"/>
+          <ac:spMkLst>
+            <pc:docMk/>
+            <pc:sldMk cId="3004099782" sldId="428"/>
+            <ac:spMk id="6" creationId="{7372AA49-A0AA-4853-9730-516EEBFF8ABB}"/>
+          </ac:spMkLst>
+        </pc:spChg>
+        <pc:picChg chg="add mod modCrop">
+          <ac:chgData name="Stefanie Gagnon" userId="f874ef52da13a6b2" providerId="LiveId" clId="{6109B3D3-2B14-432F-A724-8C96588F7165}" dt="2022-05-02T13:33:40.747" v="18" actId="1076"/>
+          <ac:picMkLst>
+            <pc:docMk/>
+            <pc:sldMk cId="3004099782" sldId="428"/>
+            <ac:picMk id="9" creationId="{14B5F66F-9F25-4FA8-B802-B527419A7409}"/>
+          </ac:picMkLst>
+        </pc:picChg>
+        <pc:picChg chg="del">
+          <ac:chgData name="Stefanie Gagnon" userId="f874ef52da13a6b2" providerId="LiveId" clId="{6109B3D3-2B14-432F-A724-8C96588F7165}" dt="2022-05-02T13:31:20.866" v="0" actId="478"/>
+          <ac:picMkLst>
+            <pc:docMk/>
+            <pc:sldMk cId="3004099782" sldId="428"/>
+            <ac:picMk id="14" creationId="{CB83D6F1-EB3D-4B1B-B675-C84B3882FC23}"/>
           </ac:picMkLst>
         </pc:picChg>
       </pc:sldChg>
@@ -5877,7 +6133,7 @@
           <a:p>
             <a:fld id="{B860B616-BCB2-4E7C-BAA6-B90DF21B9EDF}" type="datetimeFigureOut">
               <a:rPr lang="en-US" smtClean="0"/>
-              <a:t>4/30/2022</a:t>
+              <a:t>5/2/2022</a:t>
             </a:fld>
             <a:endParaRPr lang="en-US" dirty="0"/>
           </a:p>
@@ -6814,10 +7070,7 @@
           <a:bodyPr/>
           <a:lstStyle/>
           <a:p>
-            <a:r>
-              <a:rPr lang="en-US" dirty="0"/>
-              <a:t>Change axis titles for 2005</a:t>
-            </a:r>
+            <a:endParaRPr lang="en-US" dirty="0"/>
           </a:p>
         </p:txBody>
       </p:sp>
@@ -40298,10 +40551,10 @@
       </p:pic>
       <p:pic>
         <p:nvPicPr>
-          <p:cNvPr id="14" name="Content Placeholder 13" descr="Chart, bar chart&#10;&#10;Description automatically generated with medium confidence">
+          <p:cNvPr id="9" name="Content Placeholder 8" descr="Chart, bar chart&#10;&#10;Description automatically generated">
             <a:extLst>
               <a:ext uri="{FF2B5EF4-FFF2-40B4-BE49-F238E27FC236}">
-                <a16:creationId xmlns:a16="http://schemas.microsoft.com/office/drawing/2014/main" id="{CB83D6F1-EB3D-4B1B-B675-C84B3882FC23}"/>
+                <a16:creationId xmlns:a16="http://schemas.microsoft.com/office/drawing/2014/main" id="{14B5F66F-9F25-4FA8-B802-B527419A7409}"/>
               </a:ext>
             </a:extLst>
           </p:cNvPr>
@@ -40314,13 +40567,13 @@
         </p:nvPicPr>
         <p:blipFill rotWithShape="1">
           <a:blip r:embed="rId4"/>
-          <a:srcRect l="7926" r="5765"/>
+          <a:srcRect l="4582" t="1820" r="5715"/>
           <a:stretch/>
         </p:blipFill>
         <p:spPr>
           <a:xfrm>
-            <a:off x="290456" y="3452756"/>
-            <a:ext cx="11284772" cy="3268719"/>
+            <a:off x="0" y="3416572"/>
+            <a:ext cx="12022183" cy="3304903"/>
           </a:xfrm>
         </p:spPr>
       </p:pic>
@@ -40554,10 +40807,10 @@
       </p:sp>
       <p:pic>
         <p:nvPicPr>
-          <p:cNvPr id="11" name="Content Placeholder 10" descr="Application&#10;&#10;Description automatically generated with low confidence">
+          <p:cNvPr id="6" name="Content Placeholder 5" descr="Chart&#10;&#10;Description automatically generated">
             <a:extLst>
               <a:ext uri="{FF2B5EF4-FFF2-40B4-BE49-F238E27FC236}">
-                <a16:creationId xmlns:a16="http://schemas.microsoft.com/office/drawing/2014/main" id="{21D6C733-5147-4FFB-B7DD-83C4FD40AD19}"/>
+                <a16:creationId xmlns:a16="http://schemas.microsoft.com/office/drawing/2014/main" id="{F3E5F44A-5CEC-4A7B-B5A0-7FE3B5B5500D}"/>
               </a:ext>
             </a:extLst>
           </p:cNvPr>
@@ -40576,8 +40829,8 @@
         </p:blipFill>
         <p:spPr>
           <a:xfrm>
-            <a:off x="838200" y="2777331"/>
-            <a:ext cx="10515600" cy="2628900"/>
+            <a:off x="233592" y="2468880"/>
+            <a:ext cx="11958408" cy="3383279"/>
           </a:xfrm>
         </p:spPr>
       </p:pic>
@@ -40745,7 +40998,7 @@
         </p:nvSpPr>
         <p:spPr>
           <a:xfrm>
-            <a:off x="418655" y="365125"/>
+            <a:off x="483969" y="80938"/>
             <a:ext cx="10515600" cy="1325563"/>
           </a:xfrm>
         </p:spPr>
@@ -40789,65 +41042,6 @@
           </a:p>
         </p:txBody>
       </p:sp>
-      <p:pic>
-        <p:nvPicPr>
-          <p:cNvPr id="6" name="Content Placeholder 5" descr="Chart, scatter chart&#10;&#10;Description automatically generated">
-            <a:extLst>
-              <a:ext uri="{FF2B5EF4-FFF2-40B4-BE49-F238E27FC236}">
-                <a16:creationId xmlns:a16="http://schemas.microsoft.com/office/drawing/2014/main" id="{98E4CC82-7614-4489-B49D-5362A38E5919}"/>
-              </a:ext>
-            </a:extLst>
-          </p:cNvPr>
-          <p:cNvPicPr>
-            <a:picLocks noGrp="1" noChangeAspect="1"/>
-          </p:cNvPicPr>
-          <p:nvPr>
-            <p:ph idx="1"/>
-          </p:nvPr>
-        </p:nvPicPr>
-        <p:blipFill>
-          <a:blip r:embed="rId3"/>
-          <a:stretch>
-            <a:fillRect/>
-          </a:stretch>
-        </p:blipFill>
-        <p:spPr>
-          <a:xfrm>
-            <a:off x="2505259" y="1271812"/>
-            <a:ext cx="9686741" cy="2829376"/>
-          </a:xfrm>
-        </p:spPr>
-      </p:pic>
-      <p:pic>
-        <p:nvPicPr>
-          <p:cNvPr id="9" name="Picture 8" descr="Chart, scatter chart&#10;&#10;Description automatically generated">
-            <a:extLst>
-              <a:ext uri="{FF2B5EF4-FFF2-40B4-BE49-F238E27FC236}">
-                <a16:creationId xmlns:a16="http://schemas.microsoft.com/office/drawing/2014/main" id="{AC571B51-1E2E-45DC-88D8-60C4591B949E}"/>
-              </a:ext>
-            </a:extLst>
-          </p:cNvPr>
-          <p:cNvPicPr>
-            <a:picLocks noChangeAspect="1"/>
-          </p:cNvPicPr>
-          <p:nvPr/>
-        </p:nvPicPr>
-        <p:blipFill>
-          <a:blip r:embed="rId4"/>
-          <a:stretch>
-            <a:fillRect/>
-          </a:stretch>
-        </p:blipFill>
-        <p:spPr>
-          <a:xfrm>
-            <a:off x="2535000" y="4101188"/>
-            <a:ext cx="9656999" cy="2756812"/>
-          </a:xfrm>
-          <a:prstGeom prst="rect">
-            <a:avLst/>
-          </a:prstGeom>
-        </p:spPr>
-      </p:pic>
       <p:sp>
         <p:nvSpPr>
           <p:cNvPr id="7" name="TextBox 6">
@@ -40954,6 +41148,66 @@
           </a:p>
         </p:txBody>
       </p:sp>
+      <p:pic>
+        <p:nvPicPr>
+          <p:cNvPr id="18" name="Picture 17" descr="Chart, scatter chart&#10;&#10;Description automatically generated">
+            <a:extLst>
+              <a:ext uri="{FF2B5EF4-FFF2-40B4-BE49-F238E27FC236}">
+                <a16:creationId xmlns:a16="http://schemas.microsoft.com/office/drawing/2014/main" id="{D2946C92-CE16-48B5-85AC-B7D7620F960A}"/>
+              </a:ext>
+            </a:extLst>
+          </p:cNvPr>
+          <p:cNvPicPr>
+            <a:picLocks noChangeAspect="1"/>
+          </p:cNvPicPr>
+          <p:nvPr/>
+        </p:nvPicPr>
+        <p:blipFill>
+          <a:blip r:embed="rId3"/>
+          <a:stretch>
+            <a:fillRect/>
+          </a:stretch>
+        </p:blipFill>
+        <p:spPr>
+          <a:xfrm>
+            <a:off x="2444435" y="1136173"/>
+            <a:ext cx="9435738" cy="2825891"/>
+          </a:xfrm>
+          <a:prstGeom prst="rect">
+            <a:avLst/>
+          </a:prstGeom>
+        </p:spPr>
+      </p:pic>
+      <p:pic>
+        <p:nvPicPr>
+          <p:cNvPr id="20" name="Picture 19" descr="Chart, scatter chart&#10;&#10;Description automatically generated">
+            <a:extLst>
+              <a:ext uri="{FF2B5EF4-FFF2-40B4-BE49-F238E27FC236}">
+                <a16:creationId xmlns:a16="http://schemas.microsoft.com/office/drawing/2014/main" id="{C3FE1740-3F0B-420F-917E-8CCCC2AC919D}"/>
+              </a:ext>
+            </a:extLst>
+          </p:cNvPr>
+          <p:cNvPicPr>
+            <a:picLocks noChangeAspect="1"/>
+          </p:cNvPicPr>
+          <p:nvPr/>
+        </p:nvPicPr>
+        <p:blipFill>
+          <a:blip r:embed="rId4"/>
+          <a:stretch>
+            <a:fillRect/>
+          </a:stretch>
+        </p:blipFill>
+        <p:spPr>
+          <a:xfrm>
+            <a:off x="2444435" y="3962064"/>
+            <a:ext cx="9435738" cy="2852478"/>
+          </a:xfrm>
+          <a:prstGeom prst="rect">
+            <a:avLst/>
+          </a:prstGeom>
+        </p:spPr>
+      </p:pic>
     </p:spTree>
     <p:extLst>
       <p:ext uri="{BB962C8B-B14F-4D97-AF65-F5344CB8AC3E}">
@@ -41338,8 +41592,13 @@
           <a:p>
             <a:r>
               <a:rPr lang="en-US" dirty="0"/>
-              <a:t>Percentage of Movie is higher TV show</a:t>
+              <a:t>Higher percentage of movie </a:t>
             </a:r>
+            <a:r>
+              <a:rPr lang="en-US"/>
+              <a:t>data available </a:t>
+            </a:r>
+            <a:endParaRPr lang="en-US" dirty="0"/>
           </a:p>
           <a:p>
             <a:r>
@@ -41550,62 +41809,6 @@
           <a:chExt cx="0" cy="0"/>
         </a:xfrm>
       </p:grpSpPr>
-      <p:sp>
-        <p:nvSpPr>
-          <p:cNvPr id="30" name="Date Placeholder 29">
-            <a:extLst>
-              <a:ext uri="{FF2B5EF4-FFF2-40B4-BE49-F238E27FC236}">
-                <a16:creationId xmlns:a16="http://schemas.microsoft.com/office/drawing/2014/main" id="{F66896BE-3509-49D5-A28D-97859D7434FE}"/>
-              </a:ext>
-            </a:extLst>
-          </p:cNvPr>
-          <p:cNvSpPr>
-            <a:spLocks noGrp="1"/>
-          </p:cNvSpPr>
-          <p:nvPr>
-            <p:ph type="dt" sz="half" idx="10"/>
-          </p:nvPr>
-        </p:nvSpPr>
-        <p:spPr/>
-        <p:txBody>
-          <a:bodyPr/>
-          <a:lstStyle/>
-          <a:p>
-            <a:r>
-              <a:rPr lang="en-US" dirty="0"/>
-              <a:t>4/28/2022</a:t>
-            </a:r>
-          </a:p>
-        </p:txBody>
-      </p:sp>
-      <p:sp>
-        <p:nvSpPr>
-          <p:cNvPr id="31" name="Footer Placeholder 30">
-            <a:extLst>
-              <a:ext uri="{FF2B5EF4-FFF2-40B4-BE49-F238E27FC236}">
-                <a16:creationId xmlns:a16="http://schemas.microsoft.com/office/drawing/2014/main" id="{72FA7226-D67B-432B-A25E-F3656C32D1CD}"/>
-              </a:ext>
-            </a:extLst>
-          </p:cNvPr>
-          <p:cNvSpPr>
-            <a:spLocks noGrp="1"/>
-          </p:cNvSpPr>
-          <p:nvPr>
-            <p:ph type="ftr" sz="quarter" idx="11"/>
-          </p:nvPr>
-        </p:nvSpPr>
-        <p:spPr/>
-        <p:txBody>
-          <a:bodyPr/>
-          <a:lstStyle/>
-          <a:p>
-            <a:r>
-              <a:rPr lang="en-US" dirty="0"/>
-              <a:t>Netflix</a:t>
-            </a:r>
-          </a:p>
-        </p:txBody>
-      </p:sp>
       <p:sp>
         <p:nvSpPr>
           <p:cNvPr id="32" name="Slide Number Placeholder 31">
@@ -42163,46 +42366,6 @@
       </p:sp>
       <p:sp>
         <p:nvSpPr>
-          <p:cNvPr id="26" name="Footer Placeholder 25">
-            <a:extLst>
-              <a:ext uri="{FF2B5EF4-FFF2-40B4-BE49-F238E27FC236}">
-                <a16:creationId xmlns:a16="http://schemas.microsoft.com/office/drawing/2014/main" id="{0E469817-940E-4A7E-82D2-9FC9B4D3AA33}"/>
-              </a:ext>
-            </a:extLst>
-          </p:cNvPr>
-          <p:cNvSpPr>
-            <a:spLocks noGrp="1"/>
-          </p:cNvSpPr>
-          <p:nvPr>
-            <p:ph type="ftr" sz="quarter" idx="11"/>
-          </p:nvPr>
-        </p:nvSpPr>
-        <p:spPr>
-          <a:xfrm>
-            <a:off x="6739128" y="6356350"/>
-            <a:ext cx="4114800" cy="365125"/>
-          </a:xfrm>
-        </p:spPr>
-        <p:txBody>
-          <a:bodyPr anchor="ctr">
-            <a:normAutofit/>
-          </a:bodyPr>
-          <a:lstStyle/>
-          <a:p>
-            <a:pPr>
-              <a:spcAft>
-                <a:spcPts val="600"/>
-              </a:spcAft>
-            </a:pPr>
-            <a:r>
-              <a:rPr lang="en-US" dirty="0"/>
-              <a:t>Netflix</a:t>
-            </a:r>
-          </a:p>
-        </p:txBody>
-      </p:sp>
-      <p:sp>
-        <p:nvSpPr>
           <p:cNvPr id="33" name="Slide Number Placeholder 6">
             <a:extLst>
               <a:ext uri="{FF2B5EF4-FFF2-40B4-BE49-F238E27FC236}">
@@ -42388,62 +42551,6 @@
       </p:sp>
       <p:sp>
         <p:nvSpPr>
-          <p:cNvPr id="12" name="Date Placeholder 11">
-            <a:extLst>
-              <a:ext uri="{FF2B5EF4-FFF2-40B4-BE49-F238E27FC236}">
-                <a16:creationId xmlns:a16="http://schemas.microsoft.com/office/drawing/2014/main" id="{9C693BAD-6B4E-48AD-88BF-D933B374A1F1}"/>
-              </a:ext>
-            </a:extLst>
-          </p:cNvPr>
-          <p:cNvSpPr>
-            <a:spLocks noGrp="1"/>
-          </p:cNvSpPr>
-          <p:nvPr>
-            <p:ph type="dt" sz="half" idx="10"/>
-          </p:nvPr>
-        </p:nvSpPr>
-        <p:spPr/>
-        <p:txBody>
-          <a:bodyPr/>
-          <a:lstStyle/>
-          <a:p>
-            <a:r>
-              <a:rPr lang="en-US" dirty="0"/>
-              <a:t>4/29/2022</a:t>
-            </a:r>
-          </a:p>
-        </p:txBody>
-      </p:sp>
-      <p:sp>
-        <p:nvSpPr>
-          <p:cNvPr id="13" name="Footer Placeholder 12">
-            <a:extLst>
-              <a:ext uri="{FF2B5EF4-FFF2-40B4-BE49-F238E27FC236}">
-                <a16:creationId xmlns:a16="http://schemas.microsoft.com/office/drawing/2014/main" id="{1B9E4CF7-70FB-40DF-BE47-6E5AE3154753}"/>
-              </a:ext>
-            </a:extLst>
-          </p:cNvPr>
-          <p:cNvSpPr>
-            <a:spLocks noGrp="1"/>
-          </p:cNvSpPr>
-          <p:nvPr>
-            <p:ph type="ftr" sz="quarter" idx="11"/>
-          </p:nvPr>
-        </p:nvSpPr>
-        <p:spPr/>
-        <p:txBody>
-          <a:bodyPr/>
-          <a:lstStyle/>
-          <a:p>
-            <a:r>
-              <a:rPr lang="en-US" dirty="0"/>
-              <a:t>Netflix</a:t>
-            </a:r>
-          </a:p>
-        </p:txBody>
-      </p:sp>
-      <p:sp>
-        <p:nvSpPr>
           <p:cNvPr id="14" name="Slide Number Placeholder 13">
             <a:extLst>
               <a:ext uri="{FF2B5EF4-FFF2-40B4-BE49-F238E27FC236}">
@@ -42600,62 +42707,6 @@
           </a:graphicData>
         </a:graphic>
       </p:graphicFrame>
-      <p:sp>
-        <p:nvSpPr>
-          <p:cNvPr id="6" name="Date Placeholder 5">
-            <a:extLst>
-              <a:ext uri="{FF2B5EF4-FFF2-40B4-BE49-F238E27FC236}">
-                <a16:creationId xmlns:a16="http://schemas.microsoft.com/office/drawing/2014/main" id="{FFA9757F-0365-4F15-86D3-6165DFD49085}"/>
-              </a:ext>
-            </a:extLst>
-          </p:cNvPr>
-          <p:cNvSpPr>
-            <a:spLocks noGrp="1"/>
-          </p:cNvSpPr>
-          <p:nvPr>
-            <p:ph type="dt" sz="half" idx="10"/>
-          </p:nvPr>
-        </p:nvSpPr>
-        <p:spPr/>
-        <p:txBody>
-          <a:bodyPr/>
-          <a:lstStyle/>
-          <a:p>
-            <a:r>
-              <a:rPr lang="en-US" dirty="0"/>
-              <a:t>4/29/2022</a:t>
-            </a:r>
-          </a:p>
-        </p:txBody>
-      </p:sp>
-      <p:sp>
-        <p:nvSpPr>
-          <p:cNvPr id="7" name="Footer Placeholder 6">
-            <a:extLst>
-              <a:ext uri="{FF2B5EF4-FFF2-40B4-BE49-F238E27FC236}">
-                <a16:creationId xmlns:a16="http://schemas.microsoft.com/office/drawing/2014/main" id="{BD13B003-BFA7-43DB-9005-32EFF68D1340}"/>
-              </a:ext>
-            </a:extLst>
-          </p:cNvPr>
-          <p:cNvSpPr>
-            <a:spLocks noGrp="1"/>
-          </p:cNvSpPr>
-          <p:nvPr>
-            <p:ph type="ftr" sz="quarter" idx="11"/>
-          </p:nvPr>
-        </p:nvSpPr>
-        <p:spPr/>
-        <p:txBody>
-          <a:bodyPr/>
-          <a:lstStyle/>
-          <a:p>
-            <a:r>
-              <a:rPr lang="en-US" dirty="0"/>
-              <a:t>Netflix</a:t>
-            </a:r>
-          </a:p>
-        </p:txBody>
-      </p:sp>
       <p:sp>
         <p:nvSpPr>
           <p:cNvPr id="8" name="Slide Number Placeholder 7">
@@ -43688,21 +43739,21 @@
 </file>
 
 <file path=customXml/item1.xml><?xml version="1.0" encoding="utf-8"?>
+<p:properties xmlns:p="http://schemas.microsoft.com/office/2006/metadata/properties" xmlns:xsi="http://www.w3.org/2001/XMLSchema-instance" xmlns:pc="http://schemas.microsoft.com/office/infopath/2007/PartnerControls">
+  <documentManagement>
+    <Status xmlns="71af3243-3dd4-4a8d-8c0d-dd76da1f02a5">Not started</Status>
+    <MediaServiceKeyPoints xmlns="71af3243-3dd4-4a8d-8c0d-dd76da1f02a5" xsi:nil="true"/>
+  </documentManagement>
+</p:properties>
+</file>
+
+<file path=customXml/item2.xml><?xml version="1.0" encoding="utf-8"?>
 <?mso-contentType ?>
 <FormTemplates xmlns="http://schemas.microsoft.com/sharepoint/v3/contenttype/forms">
   <Display>DocumentLibraryForm</Display>
   <Edit>DocumentLibraryForm</Edit>
   <New>DocumentLibraryForm</New>
 </FormTemplates>
-</file>
-
-<file path=customXml/item2.xml><?xml version="1.0" encoding="utf-8"?>
-<p:properties xmlns:p="http://schemas.microsoft.com/office/2006/metadata/properties" xmlns:xsi="http://www.w3.org/2001/XMLSchema-instance" xmlns:pc="http://schemas.microsoft.com/office/infopath/2007/PartnerControls">
-  <documentManagement>
-    <Status xmlns="71af3243-3dd4-4a8d-8c0d-dd76da1f02a5">Not started</Status>
-    <MediaServiceKeyPoints xmlns="71af3243-3dd4-4a8d-8c0d-dd76da1f02a5" xsi:nil="true"/>
-  </documentManagement>
-</p:properties>
 </file>
 
 <file path=customXml/item3.xml><?xml version="1.0" encoding="utf-8"?>
@@ -43927,19 +43978,19 @@
 </file>
 
 <file path=customXml/itemProps1.xml><?xml version="1.0" encoding="utf-8"?>
-<ds:datastoreItem xmlns:ds="http://schemas.openxmlformats.org/officeDocument/2006/customXml" ds:itemID="{C0DCE9DA-F7FD-45FA-83B7-D9813A44258A}">
+<ds:datastoreItem xmlns:ds="http://schemas.openxmlformats.org/officeDocument/2006/customXml" ds:itemID="{9DFCC198-DBFA-46B2-A241-8E3888E63670}">
   <ds:schemaRefs>
-    <ds:schemaRef ds:uri="http://schemas.microsoft.com/sharepoint/v3/contenttype/forms"/>
+    <ds:schemaRef ds:uri="http://schemas.microsoft.com/office/2006/metadata/properties"/>
+    <ds:schemaRef ds:uri="http://schemas.microsoft.com/office/infopath/2007/PartnerControls"/>
+    <ds:schemaRef ds:uri="71af3243-3dd4-4a8d-8c0d-dd76da1f02a5"/>
   </ds:schemaRefs>
 </ds:datastoreItem>
 </file>
 
 <file path=customXml/itemProps2.xml><?xml version="1.0" encoding="utf-8"?>
-<ds:datastoreItem xmlns:ds="http://schemas.openxmlformats.org/officeDocument/2006/customXml" ds:itemID="{9DFCC198-DBFA-46B2-A241-8E3888E63670}">
+<ds:datastoreItem xmlns:ds="http://schemas.openxmlformats.org/officeDocument/2006/customXml" ds:itemID="{C0DCE9DA-F7FD-45FA-83B7-D9813A44258A}">
   <ds:schemaRefs>
-    <ds:schemaRef ds:uri="http://schemas.microsoft.com/office/2006/metadata/properties"/>
-    <ds:schemaRef ds:uri="http://schemas.microsoft.com/office/infopath/2007/PartnerControls"/>
-    <ds:schemaRef ds:uri="71af3243-3dd4-4a8d-8c0d-dd76da1f02a5"/>
+    <ds:schemaRef ds:uri="http://schemas.microsoft.com/sharepoint/v3/contenttype/forms"/>
   </ds:schemaRefs>
 </ds:datastoreItem>
 </file>

</xml_diff>

<commit_message>
swithed around a couple slides, 12 & 13
</commit_message>
<xml_diff>
--- a/Project_1.pptx
+++ b/Project_1.pptx
@@ -19,8 +19,8 @@
     <p:sldId id="426" r:id="rId13"/>
     <p:sldId id="418" r:id="rId14"/>
     <p:sldId id="428" r:id="rId15"/>
-    <p:sldId id="424" r:id="rId16"/>
-    <p:sldId id="419" r:id="rId17"/>
+    <p:sldId id="419" r:id="rId16"/>
+    <p:sldId id="424" r:id="rId17"/>
     <p:sldId id="423" r:id="rId18"/>
     <p:sldId id="420" r:id="rId19"/>
     <p:sldId id="422" r:id="rId20"/>
@@ -147,8 +147,8 @@
             <p14:sldId id="426"/>
             <p14:sldId id="418"/>
             <p14:sldId id="428"/>
+            <p14:sldId id="419"/>
             <p14:sldId id="424"/>
-            <p14:sldId id="419"/>
             <p14:sldId id="423"/>
             <p14:sldId id="420"/>
             <p14:sldId id="422"/>
@@ -1224,8 +1224,8 @@
   </pc:docChgLst>
   <pc:docChgLst>
     <pc:chgData name="Stefanie Gagnon" userId="f874ef52da13a6b2" providerId="LiveId" clId="{6109B3D3-2B14-432F-A724-8C96588F7165}"/>
-    <pc:docChg chg="undo custSel addSld delSld modSld modSection">
-      <pc:chgData name="Stefanie Gagnon" userId="f874ef52da13a6b2" providerId="LiveId" clId="{6109B3D3-2B14-432F-A724-8C96588F7165}" dt="2022-05-02T15:21:18.442" v="1532" actId="1076"/>
+    <pc:docChg chg="undo custSel addSld delSld modSld sldOrd modSection">
+      <pc:chgData name="Stefanie Gagnon" userId="f874ef52da13a6b2" providerId="LiveId" clId="{6109B3D3-2B14-432F-A724-8C96588F7165}" dt="2022-05-02T15:37:34.561" v="1534"/>
       <pc:docMkLst>
         <pc:docMk/>
       </pc:docMkLst>
@@ -1343,8 +1343,8 @@
           </ac:spMkLst>
         </pc:spChg>
       </pc:sldChg>
-      <pc:sldChg chg="addSp delSp modSp mod">
-        <pc:chgData name="Stefanie Gagnon" userId="f874ef52da13a6b2" providerId="LiveId" clId="{6109B3D3-2B14-432F-A724-8C96588F7165}" dt="2022-05-02T13:34:47.991" v="26" actId="14100"/>
+      <pc:sldChg chg="addSp delSp modSp mod ord">
+        <pc:chgData name="Stefanie Gagnon" userId="f874ef52da13a6b2" providerId="LiveId" clId="{6109B3D3-2B14-432F-A724-8C96588F7165}" dt="2022-05-02T15:37:34.561" v="1534"/>
         <pc:sldMkLst>
           <pc:docMk/>
           <pc:sldMk cId="2235685552" sldId="419"/>
@@ -7297,7 +7297,7 @@
           <a:p>
             <a:fld id="{0D0EDF81-139F-488C-872B-4720FBA6BF98}" type="slidenum">
               <a:rPr lang="en-US" smtClean="0"/>
-              <a:t>12</a:t>
+              <a:t>13</a:t>
             </a:fld>
             <a:endParaRPr lang="en-US" dirty="0"/>
           </a:p>
@@ -40885,6 +40885,122 @@
             <p:ph type="title"/>
           </p:nvPr>
         </p:nvSpPr>
+        <p:spPr/>
+        <p:txBody>
+          <a:bodyPr/>
+          <a:lstStyle/>
+          <a:p>
+            <a:r>
+              <a:rPr lang="en-US" dirty="0"/>
+              <a:t>Top Genres with the largest number of  titles</a:t>
+            </a:r>
+          </a:p>
+        </p:txBody>
+      </p:sp>
+      <p:sp>
+        <p:nvSpPr>
+          <p:cNvPr id="14" name="Slide Number Placeholder 13">
+            <a:extLst>
+              <a:ext uri="{FF2B5EF4-FFF2-40B4-BE49-F238E27FC236}">
+                <a16:creationId xmlns:a16="http://schemas.microsoft.com/office/drawing/2014/main" id="{7D2D9DB8-6AAC-452C-8711-DA2E869FD12D}"/>
+              </a:ext>
+            </a:extLst>
+          </p:cNvPr>
+          <p:cNvSpPr>
+            <a:spLocks noGrp="1"/>
+          </p:cNvSpPr>
+          <p:nvPr>
+            <p:ph type="sldNum" sz="quarter" idx="12"/>
+          </p:nvPr>
+        </p:nvSpPr>
+        <p:spPr/>
+        <p:txBody>
+          <a:bodyPr/>
+          <a:lstStyle/>
+          <a:p>
+            <a:fld id="{B9713C8C-8E70-45D5-AE59-23E60168254E}" type="slidenum">
+              <a:rPr lang="en-US" smtClean="0"/>
+              <a:t>12</a:t>
+            </a:fld>
+            <a:endParaRPr lang="en-US" dirty="0"/>
+          </a:p>
+        </p:txBody>
+      </p:sp>
+      <p:pic>
+        <p:nvPicPr>
+          <p:cNvPr id="6" name="Content Placeholder 5" descr="Chart&#10;&#10;Description automatically generated">
+            <a:extLst>
+              <a:ext uri="{FF2B5EF4-FFF2-40B4-BE49-F238E27FC236}">
+                <a16:creationId xmlns:a16="http://schemas.microsoft.com/office/drawing/2014/main" id="{F3E5F44A-5CEC-4A7B-B5A0-7FE3B5B5500D}"/>
+              </a:ext>
+            </a:extLst>
+          </p:cNvPr>
+          <p:cNvPicPr>
+            <a:picLocks noGrp="1" noChangeAspect="1"/>
+          </p:cNvPicPr>
+          <p:nvPr>
+            <p:ph idx="1"/>
+          </p:nvPr>
+        </p:nvPicPr>
+        <p:blipFill>
+          <a:blip r:embed="rId2"/>
+          <a:stretch>
+            <a:fillRect/>
+          </a:stretch>
+        </p:blipFill>
+        <p:spPr>
+          <a:xfrm>
+            <a:off x="233592" y="2468880"/>
+            <a:ext cx="11958408" cy="3383279"/>
+          </a:xfrm>
+        </p:spPr>
+      </p:pic>
+    </p:spTree>
+    <p:extLst>
+      <p:ext uri="{BB962C8B-B14F-4D97-AF65-F5344CB8AC3E}">
+        <p14:creationId xmlns:p14="http://schemas.microsoft.com/office/powerpoint/2010/main" val="2235685552"/>
+      </p:ext>
+    </p:extLst>
+  </p:cSld>
+  <p:clrMapOvr>
+    <a:masterClrMapping/>
+  </p:clrMapOvr>
+</p:sld>
+</file>
+
+<file path=ppt/slides/slide13.xml><?xml version="1.0" encoding="utf-8"?>
+<p:sld xmlns:a="http://schemas.openxmlformats.org/drawingml/2006/main" xmlns:r="http://schemas.openxmlformats.org/officeDocument/2006/relationships" xmlns:p="http://schemas.openxmlformats.org/presentationml/2006/main">
+  <p:cSld>
+    <p:spTree>
+      <p:nvGrpSpPr>
+        <p:cNvPr id="1" name=""/>
+        <p:cNvGrpSpPr/>
+        <p:nvPr/>
+      </p:nvGrpSpPr>
+      <p:grpSpPr>
+        <a:xfrm>
+          <a:off x="0" y="0"/>
+          <a:ext cx="0" cy="0"/>
+          <a:chOff x="0" y="0"/>
+          <a:chExt cx="0" cy="0"/>
+        </a:xfrm>
+      </p:grpSpPr>
+      <p:sp>
+        <p:nvSpPr>
+          <p:cNvPr id="2" name="Title 1">
+            <a:extLst>
+              <a:ext uri="{FF2B5EF4-FFF2-40B4-BE49-F238E27FC236}">
+                <a16:creationId xmlns:a16="http://schemas.microsoft.com/office/drawing/2014/main" id="{6D602820-7F02-4F5F-8933-C0B61CFA2E08}"/>
+              </a:ext>
+            </a:extLst>
+          </p:cNvPr>
+          <p:cNvSpPr>
+            <a:spLocks noGrp="1"/>
+          </p:cNvSpPr>
+          <p:nvPr>
+            <p:ph type="title"/>
+          </p:nvPr>
+        </p:nvSpPr>
         <p:spPr>
           <a:xfrm>
             <a:off x="838200" y="365125"/>
@@ -40974,7 +41090,7 @@
                   <a:spcPts val="600"/>
                 </a:spcAft>
               </a:pPr>
-              <a:t>12</a:t>
+              <a:t>13</a:t>
             </a:fld>
             <a:endParaRPr lang="en-US"/>
           </a:p>
@@ -40984,122 +41100,6 @@
     <p:extLst>
       <p:ext uri="{BB962C8B-B14F-4D97-AF65-F5344CB8AC3E}">
         <p14:creationId xmlns:p14="http://schemas.microsoft.com/office/powerpoint/2010/main" val="898263839"/>
-      </p:ext>
-    </p:extLst>
-  </p:cSld>
-  <p:clrMapOvr>
-    <a:masterClrMapping/>
-  </p:clrMapOvr>
-</p:sld>
-</file>
-
-<file path=ppt/slides/slide13.xml><?xml version="1.0" encoding="utf-8"?>
-<p:sld xmlns:a="http://schemas.openxmlformats.org/drawingml/2006/main" xmlns:r="http://schemas.openxmlformats.org/officeDocument/2006/relationships" xmlns:p="http://schemas.openxmlformats.org/presentationml/2006/main">
-  <p:cSld>
-    <p:spTree>
-      <p:nvGrpSpPr>
-        <p:cNvPr id="1" name=""/>
-        <p:cNvGrpSpPr/>
-        <p:nvPr/>
-      </p:nvGrpSpPr>
-      <p:grpSpPr>
-        <a:xfrm>
-          <a:off x="0" y="0"/>
-          <a:ext cx="0" cy="0"/>
-          <a:chOff x="0" y="0"/>
-          <a:chExt cx="0" cy="0"/>
-        </a:xfrm>
-      </p:grpSpPr>
-      <p:sp>
-        <p:nvSpPr>
-          <p:cNvPr id="2" name="Title 1">
-            <a:extLst>
-              <a:ext uri="{FF2B5EF4-FFF2-40B4-BE49-F238E27FC236}">
-                <a16:creationId xmlns:a16="http://schemas.microsoft.com/office/drawing/2014/main" id="{6D602820-7F02-4F5F-8933-C0B61CFA2E08}"/>
-              </a:ext>
-            </a:extLst>
-          </p:cNvPr>
-          <p:cNvSpPr>
-            <a:spLocks noGrp="1"/>
-          </p:cNvSpPr>
-          <p:nvPr>
-            <p:ph type="title"/>
-          </p:nvPr>
-        </p:nvSpPr>
-        <p:spPr/>
-        <p:txBody>
-          <a:bodyPr/>
-          <a:lstStyle/>
-          <a:p>
-            <a:r>
-              <a:rPr lang="en-US" dirty="0"/>
-              <a:t>Top Genres with the largest number of  titles</a:t>
-            </a:r>
-          </a:p>
-        </p:txBody>
-      </p:sp>
-      <p:sp>
-        <p:nvSpPr>
-          <p:cNvPr id="14" name="Slide Number Placeholder 13">
-            <a:extLst>
-              <a:ext uri="{FF2B5EF4-FFF2-40B4-BE49-F238E27FC236}">
-                <a16:creationId xmlns:a16="http://schemas.microsoft.com/office/drawing/2014/main" id="{7D2D9DB8-6AAC-452C-8711-DA2E869FD12D}"/>
-              </a:ext>
-            </a:extLst>
-          </p:cNvPr>
-          <p:cNvSpPr>
-            <a:spLocks noGrp="1"/>
-          </p:cNvSpPr>
-          <p:nvPr>
-            <p:ph type="sldNum" sz="quarter" idx="12"/>
-          </p:nvPr>
-        </p:nvSpPr>
-        <p:spPr/>
-        <p:txBody>
-          <a:bodyPr/>
-          <a:lstStyle/>
-          <a:p>
-            <a:fld id="{B9713C8C-8E70-45D5-AE59-23E60168254E}" type="slidenum">
-              <a:rPr lang="en-US" smtClean="0"/>
-              <a:t>13</a:t>
-            </a:fld>
-            <a:endParaRPr lang="en-US" dirty="0"/>
-          </a:p>
-        </p:txBody>
-      </p:sp>
-      <p:pic>
-        <p:nvPicPr>
-          <p:cNvPr id="6" name="Content Placeholder 5" descr="Chart&#10;&#10;Description automatically generated">
-            <a:extLst>
-              <a:ext uri="{FF2B5EF4-FFF2-40B4-BE49-F238E27FC236}">
-                <a16:creationId xmlns:a16="http://schemas.microsoft.com/office/drawing/2014/main" id="{F3E5F44A-5CEC-4A7B-B5A0-7FE3B5B5500D}"/>
-              </a:ext>
-            </a:extLst>
-          </p:cNvPr>
-          <p:cNvPicPr>
-            <a:picLocks noGrp="1" noChangeAspect="1"/>
-          </p:cNvPicPr>
-          <p:nvPr>
-            <p:ph idx="1"/>
-          </p:nvPr>
-        </p:nvPicPr>
-        <p:blipFill>
-          <a:blip r:embed="rId2"/>
-          <a:stretch>
-            <a:fillRect/>
-          </a:stretch>
-        </p:blipFill>
-        <p:spPr>
-          <a:xfrm>
-            <a:off x="233592" y="2468880"/>
-            <a:ext cx="11958408" cy="3383279"/>
-          </a:xfrm>
-        </p:spPr>
-      </p:pic>
-    </p:spTree>
-    <p:extLst>
-      <p:ext uri="{BB962C8B-B14F-4D97-AF65-F5344CB8AC3E}">
-        <p14:creationId xmlns:p14="http://schemas.microsoft.com/office/powerpoint/2010/main" val="2235685552"/>
       </p:ext>
     </p:extLst>
   </p:cSld>
@@ -44371,21 +44371,21 @@
 </file>
 
 <file path=customXml/item1.xml><?xml version="1.0" encoding="utf-8"?>
+<p:properties xmlns:p="http://schemas.microsoft.com/office/2006/metadata/properties" xmlns:xsi="http://www.w3.org/2001/XMLSchema-instance" xmlns:pc="http://schemas.microsoft.com/office/infopath/2007/PartnerControls">
+  <documentManagement>
+    <Status xmlns="71af3243-3dd4-4a8d-8c0d-dd76da1f02a5">Not started</Status>
+    <MediaServiceKeyPoints xmlns="71af3243-3dd4-4a8d-8c0d-dd76da1f02a5" xsi:nil="true"/>
+  </documentManagement>
+</p:properties>
+</file>
+
+<file path=customXml/item2.xml><?xml version="1.0" encoding="utf-8"?>
 <?mso-contentType ?>
 <FormTemplates xmlns="http://schemas.microsoft.com/sharepoint/v3/contenttype/forms">
   <Display>DocumentLibraryForm</Display>
   <Edit>DocumentLibraryForm</Edit>
   <New>DocumentLibraryForm</New>
 </FormTemplates>
-</file>
-
-<file path=customXml/item2.xml><?xml version="1.0" encoding="utf-8"?>
-<p:properties xmlns:p="http://schemas.microsoft.com/office/2006/metadata/properties" xmlns:xsi="http://www.w3.org/2001/XMLSchema-instance" xmlns:pc="http://schemas.microsoft.com/office/infopath/2007/PartnerControls">
-  <documentManagement>
-    <Status xmlns="71af3243-3dd4-4a8d-8c0d-dd76da1f02a5">Not started</Status>
-    <MediaServiceKeyPoints xmlns="71af3243-3dd4-4a8d-8c0d-dd76da1f02a5" xsi:nil="true"/>
-  </documentManagement>
-</p:properties>
 </file>
 
 <file path=customXml/item3.xml><?xml version="1.0" encoding="utf-8"?>
@@ -44610,19 +44610,19 @@
 </file>
 
 <file path=customXml/itemProps1.xml><?xml version="1.0" encoding="utf-8"?>
-<ds:datastoreItem xmlns:ds="http://schemas.openxmlformats.org/officeDocument/2006/customXml" ds:itemID="{C0DCE9DA-F7FD-45FA-83B7-D9813A44258A}">
+<ds:datastoreItem xmlns:ds="http://schemas.openxmlformats.org/officeDocument/2006/customXml" ds:itemID="{9DFCC198-DBFA-46B2-A241-8E3888E63670}">
   <ds:schemaRefs>
-    <ds:schemaRef ds:uri="http://schemas.microsoft.com/sharepoint/v3/contenttype/forms"/>
+    <ds:schemaRef ds:uri="http://schemas.microsoft.com/office/2006/metadata/properties"/>
+    <ds:schemaRef ds:uri="http://schemas.microsoft.com/office/infopath/2007/PartnerControls"/>
+    <ds:schemaRef ds:uri="71af3243-3dd4-4a8d-8c0d-dd76da1f02a5"/>
   </ds:schemaRefs>
 </ds:datastoreItem>
 </file>
 
 <file path=customXml/itemProps2.xml><?xml version="1.0" encoding="utf-8"?>
-<ds:datastoreItem xmlns:ds="http://schemas.openxmlformats.org/officeDocument/2006/customXml" ds:itemID="{9DFCC198-DBFA-46B2-A241-8E3888E63670}">
+<ds:datastoreItem xmlns:ds="http://schemas.openxmlformats.org/officeDocument/2006/customXml" ds:itemID="{C0DCE9DA-F7FD-45FA-83B7-D9813A44258A}">
   <ds:schemaRefs>
-    <ds:schemaRef ds:uri="http://schemas.microsoft.com/office/2006/metadata/properties"/>
-    <ds:schemaRef ds:uri="http://schemas.microsoft.com/office/infopath/2007/PartnerControls"/>
-    <ds:schemaRef ds:uri="71af3243-3dd4-4a8d-8c0d-dd76da1f02a5"/>
+    <ds:schemaRef ds:uri="http://schemas.microsoft.com/sharepoint/v3/contenttype/forms"/>
   </ds:schemaRefs>
 </ds:datastoreItem>
 </file>

</xml_diff>